<commit_message>
~ Avancement du PowerPoint.
</commit_message>
<xml_diff>
--- a/documents/presentation.pptx
+++ b/documents/presentation.pptx
@@ -17,8 +17,8 @@
     <p:sldId id="269" r:id="rId8"/>
     <p:sldId id="270" r:id="rId9"/>
     <p:sldId id="272" r:id="rId10"/>
-    <p:sldId id="271" r:id="rId11"/>
-    <p:sldId id="268" r:id="rId12"/>
+    <p:sldId id="268" r:id="rId11"/>
+    <p:sldId id="274" r:id="rId12"/>
     <p:sldId id="264" r:id="rId13"/>
   </p:sldIdLst>
   <p:sldSz cx="9144000" cy="6858000" type="screen4x3"/>
@@ -233,7 +233,8 @@
           <a:p>
             <a:fld id="{D761A794-15E8-4C19-9429-90557F78B1C8}" type="datetimeFigureOut">
               <a:rPr lang="fr-FR" smtClean="0"/>
-              <a:t>13/01/2010</a:t>
+              <a:pPr/>
+              <a:t>14/01/2010</a:t>
             </a:fld>
             <a:endParaRPr lang="fr-CH"/>
           </a:p>
@@ -394,6 +395,7 @@
           <a:p>
             <a:fld id="{BA64795F-8A88-462F-B7DA-E81DC07A4301}" type="slidenum">
               <a:rPr lang="fr-CH" smtClean="0"/>
+              <a:pPr/>
               <a:t>‹N°›</a:t>
             </a:fld>
             <a:endParaRPr lang="fr-CH"/>
@@ -565,6 +567,7 @@
           <a:p>
             <a:fld id="{BA64795F-8A88-462F-B7DA-E81DC07A4301}" type="slidenum">
               <a:rPr lang="fr-CH" smtClean="0"/>
+              <a:pPr/>
               <a:t>1</a:t>
             </a:fld>
             <a:endParaRPr lang="fr-CH"/>
@@ -710,7 +713,8 @@
           <a:p>
             <a:fld id="{1FD82F67-3604-455A-AA94-463E3F4A9835}" type="datetime1">
               <a:rPr lang="fr-CH" smtClean="0"/>
-              <a:t>13.01.2010</a:t>
+              <a:pPr/>
+              <a:t>14.01.2010</a:t>
             </a:fld>
             <a:endParaRPr lang="fr-FR"/>
           </a:p>
@@ -895,7 +899,8 @@
           <a:p>
             <a:fld id="{55B3CD59-5DD5-41C3-B883-761C206A7252}" type="datetime1">
               <a:rPr lang="fr-CH" smtClean="0"/>
-              <a:t>13.01.2010</a:t>
+              <a:pPr/>
+              <a:t>14.01.2010</a:t>
             </a:fld>
             <a:endParaRPr lang="fr-FR"/>
           </a:p>
@@ -1090,7 +1095,8 @@
           <a:p>
             <a:fld id="{3B04A12F-0005-45B2-8940-F8EFEAD0E451}" type="datetime1">
               <a:rPr lang="fr-CH" smtClean="0"/>
-              <a:t>13.01.2010</a:t>
+              <a:pPr/>
+              <a:t>14.01.2010</a:t>
             </a:fld>
             <a:endParaRPr lang="fr-FR"/>
           </a:p>
@@ -1404,7 +1410,8 @@
           <a:p>
             <a:fld id="{529FBE9A-CF7D-433F-8346-C0E52BDADA61}" type="datetime1">
               <a:rPr lang="fr-CH" smtClean="0"/>
-              <a:t>13.01.2010</a:t>
+              <a:pPr/>
+              <a:t>14.01.2010</a:t>
             </a:fld>
             <a:endParaRPr lang="fr-FR"/>
           </a:p>
@@ -1586,7 +1593,8 @@
           <a:p>
             <a:fld id="{FE683641-4180-4030-9871-18F1FE65C087}" type="datetime1">
               <a:rPr lang="fr-CH" smtClean="0"/>
-              <a:t>13.01.2010</a:t>
+              <a:pPr/>
+              <a:t>14.01.2010</a:t>
             </a:fld>
             <a:endParaRPr lang="fr-FR"/>
           </a:p>
@@ -1781,7 +1789,8 @@
           <a:p>
             <a:fld id="{DE3EECC3-BAC3-4A29-8636-7743FF9A3806}" type="datetime1">
               <a:rPr lang="fr-CH" smtClean="0"/>
-              <a:t>13.01.2010</a:t>
+              <a:pPr/>
+              <a:t>14.01.2010</a:t>
             </a:fld>
             <a:endParaRPr lang="fr-FR"/>
           </a:p>
@@ -1988,7 +1997,8 @@
           <a:p>
             <a:fld id="{F154968F-2762-4F3B-BC70-F7C39B89A9B8}" type="datetime1">
               <a:rPr lang="fr-CH" smtClean="0"/>
-              <a:t>13.01.2010</a:t>
+              <a:pPr/>
+              <a:t>14.01.2010</a:t>
             </a:fld>
             <a:endParaRPr lang="fr-FR"/>
           </a:p>
@@ -2291,7 +2301,8 @@
           <a:p>
             <a:fld id="{05BFEB41-E5CB-4CD1-9B55-92701C8EBC84}" type="datetime1">
               <a:rPr lang="fr-CH" smtClean="0"/>
-              <a:t>13.01.2010</a:t>
+              <a:pPr/>
+              <a:t>14.01.2010</a:t>
             </a:fld>
             <a:endParaRPr lang="fr-FR"/>
           </a:p>
@@ -2728,7 +2739,8 @@
           <a:p>
             <a:fld id="{2F6C9831-039A-4F5C-8AD2-A3AB876185B4}" type="datetime1">
               <a:rPr lang="fr-CH" smtClean="0"/>
-              <a:t>13.01.2010</a:t>
+              <a:pPr/>
+              <a:t>14.01.2010</a:t>
             </a:fld>
             <a:endParaRPr lang="fr-FR"/>
           </a:p>
@@ -2861,7 +2873,8 @@
           <a:p>
             <a:fld id="{DFFDC1B0-BD04-46D2-99EE-B853352D89B2}" type="datetime1">
               <a:rPr lang="fr-CH" smtClean="0"/>
-              <a:t>13.01.2010</a:t>
+              <a:pPr/>
+              <a:t>14.01.2010</a:t>
             </a:fld>
             <a:endParaRPr lang="fr-FR"/>
           </a:p>
@@ -2971,7 +2984,8 @@
           <a:p>
             <a:fld id="{0EE68050-7145-4A91-894E-A242682B636F}" type="datetime1">
               <a:rPr lang="fr-CH" smtClean="0"/>
-              <a:t>13.01.2010</a:t>
+              <a:pPr/>
+              <a:t>14.01.2010</a:t>
             </a:fld>
             <a:endParaRPr lang="fr-FR"/>
           </a:p>
@@ -3263,7 +3277,8 @@
           <a:p>
             <a:fld id="{3A01947D-F275-402E-B528-25DF2F067B3A}" type="datetime1">
               <a:rPr lang="fr-CH" smtClean="0"/>
-              <a:t>13.01.2010</a:t>
+              <a:pPr/>
+              <a:t>14.01.2010</a:t>
             </a:fld>
             <a:endParaRPr lang="fr-FR"/>
           </a:p>
@@ -3531,7 +3546,8 @@
           <a:p>
             <a:fld id="{99628070-4574-4C78-8FCC-ABF8CA883542}" type="datetime1">
               <a:rPr lang="fr-CH" smtClean="0"/>
-              <a:t>13.01.2010</a:t>
+              <a:pPr/>
+              <a:t>14.01.2010</a:t>
             </a:fld>
             <a:endParaRPr lang="fr-FR"/>
           </a:p>
@@ -3783,7 +3799,8 @@
           <a:p>
             <a:fld id="{0EBF62BA-94E3-4FC8-A8F1-27E713C8C858}" type="datetime1">
               <a:rPr lang="fr-CH" smtClean="0"/>
-              <a:t>13.01.2010</a:t>
+              <a:pPr/>
+              <a:t>14.01.2010</a:t>
             </a:fld>
             <a:endParaRPr lang="fr-FR"/>
           </a:p>
@@ -4406,8 +4423,8 @@
         </p:blipFill>
         <p:spPr bwMode="auto">
           <a:xfrm>
-            <a:off x="3352800" y="2819400"/>
-            <a:ext cx="2590800" cy="2095500"/>
+            <a:off x="3122601" y="2727469"/>
+            <a:ext cx="2898798" cy="2344616"/>
           </a:xfrm>
           <a:prstGeom prst="rect">
             <a:avLst/>
@@ -4690,7 +4707,7 @@
         </p:blipFill>
         <p:spPr>
           <a:xfrm>
-            <a:off x="647700" y="5638800"/>
+            <a:off x="647700" y="5768813"/>
             <a:ext cx="1714500" cy="544714"/>
           </a:xfrm>
           <a:prstGeom prst="rect">
@@ -4712,7 +4729,7 @@
         </p:blipFill>
         <p:spPr>
           <a:xfrm>
-            <a:off x="7467600" y="5638800"/>
+            <a:off x="7467600" y="5768813"/>
             <a:ext cx="1064834" cy="542925"/>
           </a:xfrm>
           <a:prstGeom prst="rect">
@@ -4757,7 +4774,7 @@
       </p:grpSpPr>
       <p:sp>
         <p:nvSpPr>
-          <p:cNvPr id="30724" name="Rectangle 4"/>
+          <p:cNvPr id="27652" name="Rectangle 4"/>
           <p:cNvSpPr>
             <a:spLocks noChangeArrowheads="1"/>
           </p:cNvSpPr>
@@ -4801,7 +4818,7 @@
       </p:sp>
       <p:sp>
         <p:nvSpPr>
-          <p:cNvPr id="30725" name="Text Box 5"/>
+          <p:cNvPr id="27653" name="Text Box 5"/>
           <p:cNvSpPr txBox="1">
             <a:spLocks noChangeArrowheads="1"/>
           </p:cNvSpPr>
@@ -4832,7 +4849,7 @@
           <a:p>
             <a:pPr algn="ctr"/>
             <a:r>
-              <a:rPr lang="fr-CH" sz="2000" b="1" u="none" dirty="0">
+              <a:rPr lang="fr-CH" sz="2000" b="1" u="none">
                 <a:solidFill>
                   <a:schemeClr val="bg1"/>
                 </a:solidFill>
@@ -4843,9 +4860,9 @@
                 </a:effectLst>
                 <a:latin typeface="Trebuchet MS" pitchFamily="34" charset="0"/>
               </a:rPr>
-              <a:t>AVENIR DU PROJET</a:t>
-            </a:r>
-            <a:endParaRPr lang="fr-FR" sz="2000" b="1" u="none" dirty="0">
+              <a:t>CONCLUSION</a:t>
+            </a:r>
+            <a:endParaRPr lang="fr-FR" sz="2000" b="1" u="none">
               <a:solidFill>
                 <a:schemeClr val="bg1"/>
               </a:solidFill>
@@ -4861,7 +4878,44 @@
       </p:sp>
       <p:sp>
         <p:nvSpPr>
-          <p:cNvPr id="30802" name="Rectangle 82"/>
+          <p:cNvPr id="27656" name="Rectangle 8"/>
+          <p:cNvSpPr>
+            <a:spLocks noChangeArrowheads="1"/>
+          </p:cNvSpPr>
+          <p:nvPr/>
+        </p:nvSpPr>
+        <p:spPr bwMode="auto">
+          <a:xfrm>
+            <a:off x="0" y="703263"/>
+            <a:ext cx="184150" cy="366712"/>
+          </a:xfrm>
+          <a:prstGeom prst="rect">
+            <a:avLst/>
+          </a:prstGeom>
+          <a:noFill/>
+          <a:ln w="9525">
+            <a:noFill/>
+            <a:miter lim="800000"/>
+            <a:headEnd/>
+            <a:tailEnd/>
+          </a:ln>
+          <a:effectLst/>
+        </p:spPr>
+        <p:txBody>
+          <a:bodyPr wrap="none" anchor="ctr">
+            <a:spAutoFit/>
+          </a:bodyPr>
+          <a:lstStyle/>
+          <a:p>
+            <a:endParaRPr lang="fr-FR" u="none">
+              <a:latin typeface="Trebuchet MS" pitchFamily="34" charset="0"/>
+            </a:endParaRPr>
+          </a:p>
+        </p:txBody>
+      </p:sp>
+      <p:sp>
+        <p:nvSpPr>
+          <p:cNvPr id="27755" name="Rectangle 107"/>
           <p:cNvSpPr>
             <a:spLocks noChangeArrowheads="1"/>
           </p:cNvSpPr>
@@ -4906,7 +4960,7 @@
       </p:sp>
       <p:sp>
         <p:nvSpPr>
-          <p:cNvPr id="30803" name="Rectangle 83"/>
+          <p:cNvPr id="27756" name="Rectangle 108"/>
           <p:cNvSpPr>
             <a:spLocks noChangeArrowheads="1"/>
           </p:cNvSpPr>
@@ -4951,7 +5005,7 @@
       </p:sp>
       <p:sp>
         <p:nvSpPr>
-          <p:cNvPr id="32" name="Espace réservé du numéro de diapositive 31"/>
+          <p:cNvPr id="24" name="Espace réservé du numéro de diapositive 23"/>
           <p:cNvSpPr>
             <a:spLocks noGrp="1"/>
           </p:cNvSpPr>
@@ -4959,27 +5013,53 @@
             <p:ph type="sldNum" sz="quarter" idx="12"/>
           </p:nvPr>
         </p:nvSpPr>
-        <p:spPr/>
+        <p:spPr>
+          <a:xfrm>
+            <a:off x="6553200" y="6384972"/>
+            <a:ext cx="2133600" cy="476250"/>
+          </a:xfrm>
+        </p:spPr>
         <p:txBody>
           <a:bodyPr/>
           <a:lstStyle/>
           <a:p>
             <a:fld id="{420F5742-7484-4AFF-BE5C-C36DF30CE89D}" type="slidenum">
-              <a:rPr lang="fr-FR" smtClean="0"/>
+              <a:rPr lang="fr-FR" smtClean="0">
+                <a:solidFill>
+                  <a:schemeClr val="tx1">
+                    <a:lumMod val="65000"/>
+                    <a:lumOff val="35000"/>
+                  </a:schemeClr>
+                </a:solidFill>
+              </a:rPr>
               <a:pPr/>
               <a:t>10</a:t>
             </a:fld>
             <a:r>
-              <a:rPr lang="fr-FR" dirty="0" smtClean="0"/>
+              <a:rPr lang="fr-FR" dirty="0" smtClean="0">
+                <a:solidFill>
+                  <a:schemeClr val="tx1">
+                    <a:lumMod val="65000"/>
+                    <a:lumOff val="35000"/>
+                  </a:schemeClr>
+                </a:solidFill>
+              </a:rPr>
               <a:t>/11</a:t>
             </a:r>
-            <a:endParaRPr lang="fr-FR" dirty="0"/>
-          </a:p>
-        </p:txBody>
-      </p:sp>
-      <p:sp>
-        <p:nvSpPr>
-          <p:cNvPr id="33" name="Espace réservé de la date 32"/>
+            <a:endParaRPr lang="fr-FR" dirty="0">
+              <a:solidFill>
+                <a:schemeClr val="tx1">
+                  <a:lumMod val="65000"/>
+                  <a:lumOff val="35000"/>
+                </a:schemeClr>
+              </a:solidFill>
+            </a:endParaRPr>
+          </a:p>
+        </p:txBody>
+      </p:sp>
+      <p:sp>
+        <p:nvSpPr>
+          <p:cNvPr id="25" name="Espace réservé de la date 24"/>
           <p:cNvSpPr>
             <a:spLocks noGrp="1"/>
           </p:cNvSpPr>
@@ -4987,22 +5067,42 @@
             <p:ph type="dt" sz="half" idx="10"/>
           </p:nvPr>
         </p:nvSpPr>
-        <p:spPr/>
+        <p:spPr>
+          <a:xfrm>
+            <a:off x="457200" y="6384972"/>
+            <a:ext cx="2133600" cy="476250"/>
+          </a:xfrm>
+        </p:spPr>
         <p:txBody>
           <a:bodyPr/>
           <a:lstStyle/>
           <a:p>
-            <a:fld id="{E187F234-1A08-43DF-9DF4-8219E399273A}" type="datetime1">
-              <a:rPr lang="fr-CH" smtClean="0"/>
-              <a:t>13.01.2010</a:t>
+            <a:fld id="{16201E59-A73C-443E-9C03-DEC2A3D4E2AE}" type="datetime1">
+              <a:rPr lang="fr-CH" smtClean="0">
+                <a:solidFill>
+                  <a:schemeClr val="tx1">
+                    <a:lumMod val="65000"/>
+                    <a:lumOff val="35000"/>
+                  </a:schemeClr>
+                </a:solidFill>
+              </a:rPr>
+              <a:pPr/>
+              <a:t>14.01.2010</a:t>
             </a:fld>
-            <a:endParaRPr lang="fr-FR"/>
-          </a:p>
-        </p:txBody>
-      </p:sp>
-      <p:sp>
-        <p:nvSpPr>
-          <p:cNvPr id="34" name="Espace réservé du pied de page 33"/>
+            <a:endParaRPr lang="fr-FR" dirty="0">
+              <a:solidFill>
+                <a:schemeClr val="tx1">
+                  <a:lumMod val="65000"/>
+                  <a:lumOff val="35000"/>
+                </a:schemeClr>
+              </a:solidFill>
+            </a:endParaRPr>
+          </a:p>
+        </p:txBody>
+      </p:sp>
+      <p:sp>
+        <p:nvSpPr>
+          <p:cNvPr id="26" name="Espace réservé du pied de page 25"/>
           <p:cNvSpPr>
             <a:spLocks noGrp="1"/>
           </p:cNvSpPr>
@@ -5010,19 +5110,396 @@
             <p:ph type="ftr" sz="quarter" idx="11"/>
           </p:nvPr>
         </p:nvSpPr>
-        <p:spPr/>
+        <p:spPr>
+          <a:xfrm>
+            <a:off x="3124200" y="6384972"/>
+            <a:ext cx="2895600" cy="476250"/>
+          </a:xfrm>
+        </p:spPr>
         <p:txBody>
           <a:bodyPr/>
           <a:lstStyle/>
           <a:p>
             <a:r>
-              <a:rPr lang="fr-FR" smtClean="0"/>
+              <a:rPr lang="fr-FR" smtClean="0">
+                <a:solidFill>
+                  <a:schemeClr val="tx1">
+                    <a:lumMod val="65000"/>
+                    <a:lumOff val="35000"/>
+                  </a:schemeClr>
+                </a:solidFill>
+              </a:rPr>
               <a:t>ADO - PPZ - LFH</a:t>
             </a:r>
-            <a:endParaRPr lang="fr-FR"/>
-          </a:p>
-        </p:txBody>
-      </p:sp>
+            <a:endParaRPr lang="fr-FR">
+              <a:solidFill>
+                <a:schemeClr val="tx1">
+                  <a:lumMod val="65000"/>
+                  <a:lumOff val="35000"/>
+                </a:schemeClr>
+              </a:solidFill>
+            </a:endParaRPr>
+          </a:p>
+        </p:txBody>
+      </p:sp>
+      <p:sp>
+        <p:nvSpPr>
+          <p:cNvPr id="10" name="Text Box 49"/>
+          <p:cNvSpPr txBox="1">
+            <a:spLocks noChangeArrowheads="1"/>
+          </p:cNvSpPr>
+          <p:nvPr/>
+        </p:nvSpPr>
+        <p:spPr bwMode="auto">
+          <a:xfrm>
+            <a:off x="3786196" y="1421631"/>
+            <a:ext cx="2667000" cy="4445769"/>
+          </a:xfrm>
+          <a:prstGeom prst="rect">
+            <a:avLst/>
+          </a:prstGeom>
+          <a:noFill/>
+          <a:ln w="9525">
+            <a:noFill/>
+            <a:miter lim="800000"/>
+            <a:headEnd/>
+            <a:tailEnd/>
+          </a:ln>
+          <a:effectLst/>
+        </p:spPr>
+        <p:txBody>
+          <a:bodyPr wrap="square" anchor="ctr">
+            <a:spAutoFit/>
+          </a:bodyPr>
+          <a:lstStyle/>
+          <a:p>
+            <a:pPr marL="342900" indent="-342900">
+              <a:lnSpc>
+                <a:spcPct val="270000"/>
+              </a:lnSpc>
+            </a:pPr>
+            <a:r>
+              <a:rPr lang="fr-FR" u="none" dirty="0" smtClean="0">
+                <a:latin typeface="Trebuchet MS" pitchFamily="34" charset="0"/>
+              </a:rPr>
+              <a:t>Etat du projet</a:t>
+            </a:r>
+          </a:p>
+          <a:p>
+            <a:pPr marL="342900" indent="-342900">
+              <a:lnSpc>
+                <a:spcPct val="270000"/>
+              </a:lnSpc>
+            </a:pPr>
+            <a:r>
+              <a:rPr lang="fr-FR" u="none" dirty="0" smtClean="0">
+                <a:latin typeface="Trebuchet MS" pitchFamily="34" charset="0"/>
+              </a:rPr>
+              <a:t>Objectifs atteints</a:t>
+            </a:r>
+            <a:endParaRPr lang="fr-FR" u="none" dirty="0" smtClean="0">
+              <a:latin typeface="Trebuchet MS" pitchFamily="34" charset="0"/>
+            </a:endParaRPr>
+          </a:p>
+          <a:p>
+            <a:pPr marL="342900" indent="-342900">
+              <a:lnSpc>
+                <a:spcPct val="270000"/>
+              </a:lnSpc>
+            </a:pPr>
+            <a:r>
+              <a:rPr lang="fr-FR" u="none" dirty="0" smtClean="0">
+                <a:latin typeface="Trebuchet MS" pitchFamily="34" charset="0"/>
+              </a:rPr>
+              <a:t>Points positifs/négatifs</a:t>
+            </a:r>
+          </a:p>
+          <a:p>
+            <a:pPr marL="342900" indent="-342900">
+              <a:lnSpc>
+                <a:spcPct val="270000"/>
+              </a:lnSpc>
+            </a:pPr>
+            <a:r>
+              <a:rPr lang="fr-FR" u="none" dirty="0" smtClean="0">
+                <a:latin typeface="Trebuchet MS" pitchFamily="34" charset="0"/>
+              </a:rPr>
+              <a:t>Avenir du projet</a:t>
+            </a:r>
+          </a:p>
+          <a:p>
+            <a:pPr marL="342900" indent="-342900">
+              <a:lnSpc>
+                <a:spcPct val="270000"/>
+              </a:lnSpc>
+            </a:pPr>
+            <a:r>
+              <a:rPr lang="fr-FR" u="none" dirty="0" smtClean="0">
+                <a:latin typeface="Trebuchet MS" pitchFamily="34" charset="0"/>
+              </a:rPr>
+              <a:t>Futurs contributeurs</a:t>
+            </a:r>
+          </a:p>
+          <a:p>
+            <a:pPr marL="342900" indent="-342900">
+              <a:lnSpc>
+                <a:spcPct val="270000"/>
+              </a:lnSpc>
+            </a:pPr>
+            <a:r>
+              <a:rPr lang="fr-FR" u="none" dirty="0" smtClean="0">
+                <a:latin typeface="Trebuchet MS" pitchFamily="34" charset="0"/>
+              </a:rPr>
+              <a:t>Remerciements</a:t>
+            </a:r>
+          </a:p>
+        </p:txBody>
+      </p:sp>
+      <p:pic>
+        <p:nvPicPr>
+          <p:cNvPr id="1027" name="Picture 3" descr="C:\Documents and Settings\Administrateur\Bureau\images\gui_scripting.png"/>
+          <p:cNvPicPr>
+            <a:picLocks noChangeAspect="1" noChangeArrowheads="1"/>
+          </p:cNvPicPr>
+          <p:nvPr/>
+        </p:nvPicPr>
+        <p:blipFill>
+          <a:blip r:embed="rId2" cstate="print"/>
+          <a:srcRect/>
+          <a:stretch>
+            <a:fillRect/>
+          </a:stretch>
+        </p:blipFill>
+        <p:spPr bwMode="auto">
+          <a:xfrm>
+            <a:off x="2970196" y="1676399"/>
+            <a:ext cx="468000" cy="468000"/>
+          </a:xfrm>
+          <a:prstGeom prst="rect">
+            <a:avLst/>
+          </a:prstGeom>
+          <a:ln>
+            <a:noFill/>
+          </a:ln>
+          <a:effectLst>
+            <a:outerShdw blurRad="292100" dist="139700" dir="2700000" algn="tl" rotWithShape="0">
+              <a:srgbClr val="333333">
+                <a:alpha val="65000"/>
+              </a:srgbClr>
+            </a:outerShdw>
+          </a:effectLst>
+        </p:spPr>
+      </p:pic>
+      <p:pic>
+        <p:nvPicPr>
+          <p:cNvPr id="1028" name="Picture 4" descr="C:\Documents and Settings\Administrateur\Bureau\images\Objectives.png"/>
+          <p:cNvPicPr>
+            <a:picLocks noChangeAspect="1" noChangeArrowheads="1"/>
+          </p:cNvPicPr>
+          <p:nvPr/>
+        </p:nvPicPr>
+        <p:blipFill>
+          <a:blip r:embed="rId3" cstate="print"/>
+          <a:srcRect/>
+          <a:stretch>
+            <a:fillRect/>
+          </a:stretch>
+        </p:blipFill>
+        <p:spPr bwMode="auto">
+          <a:xfrm>
+            <a:off x="2972097" y="2427286"/>
+            <a:ext cx="468000" cy="468000"/>
+          </a:xfrm>
+          <a:prstGeom prst="rect">
+            <a:avLst/>
+          </a:prstGeom>
+          <a:ln>
+            <a:noFill/>
+          </a:ln>
+          <a:effectLst>
+            <a:outerShdw blurRad="292100" dist="139700" dir="2700000" algn="tl" rotWithShape="0">
+              <a:srgbClr val="333333">
+                <a:alpha val="65000"/>
+              </a:srgbClr>
+            </a:outerShdw>
+          </a:effectLst>
+        </p:spPr>
+      </p:pic>
+      <p:pic>
+        <p:nvPicPr>
+          <p:cNvPr id="1033" name="Picture 9" descr="C:\Documents and Settings\Administrateur\Bureau\images\negative.png"/>
+          <p:cNvPicPr>
+            <a:picLocks noChangeAspect="1" noChangeArrowheads="1"/>
+          </p:cNvPicPr>
+          <p:nvPr/>
+        </p:nvPicPr>
+        <p:blipFill>
+          <a:blip r:embed="rId4" cstate="print"/>
+          <a:srcRect/>
+          <a:stretch>
+            <a:fillRect/>
+          </a:stretch>
+        </p:blipFill>
+        <p:spPr bwMode="auto">
+          <a:xfrm>
+            <a:off x="3113096" y="3302000"/>
+            <a:ext cx="288000" cy="288000"/>
+          </a:xfrm>
+          <a:prstGeom prst="rect">
+            <a:avLst/>
+          </a:prstGeom>
+          <a:ln>
+            <a:noFill/>
+          </a:ln>
+          <a:effectLst>
+            <a:outerShdw blurRad="292100" dist="139700" dir="2700000" algn="tl" rotWithShape="0">
+              <a:srgbClr val="333333">
+                <a:alpha val="65000"/>
+              </a:srgbClr>
+            </a:outerShdw>
+          </a:effectLst>
+        </p:spPr>
+      </p:pic>
+      <p:pic>
+        <p:nvPicPr>
+          <p:cNvPr id="1032" name="Picture 8" descr="C:\Documents and Settings\Administrateur\Bureau\images\positive.png"/>
+          <p:cNvPicPr>
+            <a:picLocks noChangeAspect="1" noChangeArrowheads="1"/>
+          </p:cNvPicPr>
+          <p:nvPr/>
+        </p:nvPicPr>
+        <p:blipFill>
+          <a:blip r:embed="rId5" cstate="print"/>
+          <a:srcRect/>
+          <a:stretch>
+            <a:fillRect/>
+          </a:stretch>
+        </p:blipFill>
+        <p:spPr bwMode="auto">
+          <a:xfrm>
+            <a:off x="2935296" y="3200400"/>
+            <a:ext cx="288000" cy="288000"/>
+          </a:xfrm>
+          <a:prstGeom prst="rect">
+            <a:avLst/>
+          </a:prstGeom>
+          <a:ln>
+            <a:noFill/>
+          </a:ln>
+          <a:effectLst>
+            <a:outerShdw blurRad="292100" dist="139700" dir="2700000" algn="tl" rotWithShape="0">
+              <a:srgbClr val="333333">
+                <a:alpha val="65000"/>
+              </a:srgbClr>
+            </a:outerShdw>
+          </a:effectLst>
+        </p:spPr>
+      </p:pic>
+      <p:pic>
+        <p:nvPicPr>
+          <p:cNvPr id="1034" name="Picture 10" descr="C:\Documents and Settings\Administrateur\Bureau\images\jumelles-trouver-chercher-icone-6074-96.png"/>
+          <p:cNvPicPr>
+            <a:picLocks noChangeAspect="1" noChangeArrowheads="1"/>
+          </p:cNvPicPr>
+          <p:nvPr/>
+        </p:nvPicPr>
+        <p:blipFill>
+          <a:blip r:embed="rId6" cstate="print"/>
+          <a:srcRect/>
+          <a:stretch>
+            <a:fillRect/>
+          </a:stretch>
+        </p:blipFill>
+        <p:spPr bwMode="auto">
+          <a:xfrm>
+            <a:off x="2928916" y="3871912"/>
+            <a:ext cx="504000" cy="504000"/>
+          </a:xfrm>
+          <a:prstGeom prst="rect">
+            <a:avLst/>
+          </a:prstGeom>
+          <a:ln>
+            <a:noFill/>
+          </a:ln>
+          <a:effectLst>
+            <a:outerShdw blurRad="292100" dist="139700" dir="2700000" algn="tl" rotWithShape="0">
+              <a:srgbClr val="333333">
+                <a:alpha val="65000"/>
+              </a:srgbClr>
+            </a:outerShdw>
+          </a:effectLst>
+        </p:spPr>
+      </p:pic>
+      <p:pic>
+        <p:nvPicPr>
+          <p:cNvPr id="1035" name="Picture 11" descr="C:\Documents and Settings\Administrateur\Bureau\images\communautaires-aide-icone-8333-128.png"/>
+          <p:cNvPicPr>
+            <a:picLocks noChangeAspect="1" noChangeArrowheads="1"/>
+          </p:cNvPicPr>
+          <p:nvPr/>
+        </p:nvPicPr>
+        <p:blipFill>
+          <a:blip r:embed="rId7" cstate="print"/>
+          <a:srcRect/>
+          <a:stretch>
+            <a:fillRect/>
+          </a:stretch>
+        </p:blipFill>
+        <p:spPr bwMode="auto">
+          <a:xfrm>
+            <a:off x="2958300" y="4633929"/>
+            <a:ext cx="468000" cy="468000"/>
+          </a:xfrm>
+          <a:prstGeom prst="rect">
+            <a:avLst/>
+          </a:prstGeom>
+          <a:ln>
+            <a:noFill/>
+          </a:ln>
+          <a:effectLst>
+            <a:outerShdw blurRad="292100" dist="139700" dir="2700000" algn="tl" rotWithShape="0">
+              <a:srgbClr val="333333">
+                <a:alpha val="65000"/>
+              </a:srgbClr>
+            </a:outerShdw>
+          </a:effectLst>
+        </p:spPr>
+      </p:pic>
+      <p:pic>
+        <p:nvPicPr>
+          <p:cNvPr id="1036" name="Picture 12" descr="C:\Documents and Settings\Administrateur\Bureau\images\fleur-heureux-smiley-icone-7501-128.png"/>
+          <p:cNvPicPr>
+            <a:picLocks noChangeAspect="1" noChangeArrowheads="1"/>
+          </p:cNvPicPr>
+          <p:nvPr/>
+        </p:nvPicPr>
+        <p:blipFill>
+          <a:blip r:embed="rId8" cstate="print"/>
+          <a:srcRect/>
+          <a:stretch>
+            <a:fillRect/>
+          </a:stretch>
+        </p:blipFill>
+        <p:spPr bwMode="auto">
+          <a:xfrm>
+            <a:off x="2972097" y="5370569"/>
+            <a:ext cx="468000" cy="468000"/>
+          </a:xfrm>
+          <a:prstGeom prst="rect">
+            <a:avLst/>
+          </a:prstGeom>
+          <a:ln>
+            <a:noFill/>
+          </a:ln>
+          <a:effectLst>
+            <a:outerShdw blurRad="292100" dist="139700" dir="2700000" algn="tl" rotWithShape="0">
+              <a:srgbClr val="333333">
+                <a:alpha val="65000"/>
+              </a:srgbClr>
+            </a:outerShdw>
+          </a:effectLst>
+        </p:spPr>
+      </p:pic>
     </p:spTree>
   </p:cSld>
   <p:clrMapOvr>
@@ -5034,9 +5511,91 @@
   <p:timing>
     <p:tnLst>
       <p:par>
-        <p:cTn id="1" dur="indefinite" restart="never" nodeType="tmRoot"/>
+        <p:cTn id="1" dur="indefinite" restart="never" nodeType="tmRoot">
+          <p:childTnLst>
+            <p:seq concurrent="1" nextAc="seek">
+              <p:cTn id="2" dur="indefinite" nodeType="mainSeq">
+                <p:childTnLst>
+                  <p:par>
+                    <p:cTn id="3" fill="hold">
+                      <p:stCondLst>
+                        <p:cond delay="indefinite"/>
+                        <p:cond evt="onBegin" delay="0">
+                          <p:tn val="2"/>
+                        </p:cond>
+                      </p:stCondLst>
+                      <p:childTnLst>
+                        <p:par>
+                          <p:cTn id="4" fill="hold">
+                            <p:stCondLst>
+                              <p:cond delay="0"/>
+                            </p:stCondLst>
+                            <p:childTnLst>
+                              <p:par>
+                                <p:cTn id="5" presetID="10" presetClass="entr" presetSubtype="0" fill="hold" grpId="0" nodeType="withEffect">
+                                  <p:stCondLst>
+                                    <p:cond delay="0"/>
+                                  </p:stCondLst>
+                                  <p:childTnLst>
+                                    <p:set>
+                                      <p:cBhvr>
+                                        <p:cTn id="6" dur="1" fill="hold">
+                                          <p:stCondLst>
+                                            <p:cond delay="0"/>
+                                          </p:stCondLst>
+                                        </p:cTn>
+                                        <p:tgtEl>
+                                          <p:spTgt spid="10"/>
+                                        </p:tgtEl>
+                                        <p:attrNameLst>
+                                          <p:attrName>style.visibility</p:attrName>
+                                        </p:attrNameLst>
+                                      </p:cBhvr>
+                                      <p:to>
+                                        <p:strVal val="visible"/>
+                                      </p:to>
+                                    </p:set>
+                                    <p:animEffect transition="in" filter="fade">
+                                      <p:cBhvr>
+                                        <p:cTn id="7" dur="500"/>
+                                        <p:tgtEl>
+                                          <p:spTgt spid="10"/>
+                                        </p:tgtEl>
+                                      </p:cBhvr>
+                                    </p:animEffect>
+                                  </p:childTnLst>
+                                </p:cTn>
+                              </p:par>
+                            </p:childTnLst>
+                          </p:cTn>
+                        </p:par>
+                      </p:childTnLst>
+                    </p:cTn>
+                  </p:par>
+                </p:childTnLst>
+              </p:cTn>
+              <p:prevCondLst>
+                <p:cond evt="onPrev" delay="0">
+                  <p:tgtEl>
+                    <p:sldTgt/>
+                  </p:tgtEl>
+                </p:cond>
+              </p:prevCondLst>
+              <p:nextCondLst>
+                <p:cond evt="onNext" delay="0">
+                  <p:tgtEl>
+                    <p:sldTgt/>
+                  </p:tgtEl>
+                </p:cond>
+              </p:nextCondLst>
+            </p:seq>
+          </p:childTnLst>
+        </p:cTn>
       </p:par>
     </p:tnLst>
+    <p:bldLst>
+      <p:bldP spid="10" grpId="0"/>
+    </p:bldLst>
   </p:timing>
 </p:sld>
 </file>
@@ -5135,7 +5694,7 @@
           <a:p>
             <a:pPr algn="ctr"/>
             <a:r>
-              <a:rPr lang="fr-CH" sz="2000" b="1" u="none">
+              <a:rPr lang="fr-CH" sz="2000" b="1" u="none" dirty="0" smtClean="0">
                 <a:solidFill>
                   <a:schemeClr val="bg1"/>
                 </a:solidFill>
@@ -5146,9 +5705,9 @@
                 </a:effectLst>
                 <a:latin typeface="Trebuchet MS" pitchFamily="34" charset="0"/>
               </a:rPr>
-              <a:t>CONCLUSION</a:t>
-            </a:r>
-            <a:endParaRPr lang="fr-FR" sz="2000" b="1" u="none">
+              <a:t>DEMONSTRATION [AURELIEN]</a:t>
+            </a:r>
+            <a:endParaRPr lang="fr-FR" sz="2000" b="1" u="none" dirty="0">
               <a:solidFill>
                 <a:schemeClr val="bg1"/>
               </a:solidFill>
@@ -5299,21 +5858,47 @@
             <p:ph type="sldNum" sz="quarter" idx="12"/>
           </p:nvPr>
         </p:nvSpPr>
-        <p:spPr/>
+        <p:spPr>
+          <a:xfrm>
+            <a:off x="6553200" y="6384972"/>
+            <a:ext cx="2133600" cy="476250"/>
+          </a:xfrm>
+        </p:spPr>
         <p:txBody>
           <a:bodyPr/>
           <a:lstStyle/>
           <a:p>
             <a:fld id="{420F5742-7484-4AFF-BE5C-C36DF30CE89D}" type="slidenum">
-              <a:rPr lang="fr-FR" smtClean="0"/>
+              <a:rPr lang="fr-FR" smtClean="0">
+                <a:solidFill>
+                  <a:schemeClr val="tx1">
+                    <a:lumMod val="65000"/>
+                    <a:lumOff val="35000"/>
+                  </a:schemeClr>
+                </a:solidFill>
+              </a:rPr>
               <a:pPr/>
               <a:t>11</a:t>
             </a:fld>
             <a:r>
-              <a:rPr lang="fr-FR" dirty="0" smtClean="0"/>
+              <a:rPr lang="fr-FR" dirty="0" smtClean="0">
+                <a:solidFill>
+                  <a:schemeClr val="tx1">
+                    <a:lumMod val="65000"/>
+                    <a:lumOff val="35000"/>
+                  </a:schemeClr>
+                </a:solidFill>
+              </a:rPr>
               <a:t>/11</a:t>
             </a:r>
-            <a:endParaRPr lang="fr-FR" dirty="0"/>
+            <a:endParaRPr lang="fr-FR" dirty="0">
+              <a:solidFill>
+                <a:schemeClr val="tx1">
+                  <a:lumMod val="65000"/>
+                  <a:lumOff val="35000"/>
+                </a:schemeClr>
+              </a:solidFill>
+            </a:endParaRPr>
           </a:p>
         </p:txBody>
       </p:sp>
@@ -5327,16 +5912,36 @@
             <p:ph type="dt" sz="half" idx="10"/>
           </p:nvPr>
         </p:nvSpPr>
-        <p:spPr/>
+        <p:spPr>
+          <a:xfrm>
+            <a:off x="457200" y="6384972"/>
+            <a:ext cx="2133600" cy="476250"/>
+          </a:xfrm>
+        </p:spPr>
         <p:txBody>
           <a:bodyPr/>
           <a:lstStyle/>
           <a:p>
             <a:fld id="{16201E59-A73C-443E-9C03-DEC2A3D4E2AE}" type="datetime1">
-              <a:rPr lang="fr-CH" smtClean="0"/>
-              <a:t>13.01.2010</a:t>
+              <a:rPr lang="fr-CH" smtClean="0">
+                <a:solidFill>
+                  <a:schemeClr val="tx1">
+                    <a:lumMod val="65000"/>
+                    <a:lumOff val="35000"/>
+                  </a:schemeClr>
+                </a:solidFill>
+              </a:rPr>
+              <a:pPr/>
+              <a:t>14.01.2010</a:t>
             </a:fld>
-            <a:endParaRPr lang="fr-FR"/>
+            <a:endParaRPr lang="fr-FR" dirty="0">
+              <a:solidFill>
+                <a:schemeClr val="tx1">
+                  <a:lumMod val="65000"/>
+                  <a:lumOff val="35000"/>
+                </a:schemeClr>
+              </a:solidFill>
+            </a:endParaRPr>
           </a:p>
         </p:txBody>
       </p:sp>
@@ -5350,19 +5955,64 @@
             <p:ph type="ftr" sz="quarter" idx="11"/>
           </p:nvPr>
         </p:nvSpPr>
-        <p:spPr/>
+        <p:spPr>
+          <a:xfrm>
+            <a:off x="3124200" y="6384972"/>
+            <a:ext cx="2895600" cy="476250"/>
+          </a:xfrm>
+        </p:spPr>
         <p:txBody>
           <a:bodyPr/>
           <a:lstStyle/>
           <a:p>
             <a:r>
-              <a:rPr lang="fr-FR" smtClean="0"/>
+              <a:rPr lang="fr-FR" smtClean="0">
+                <a:solidFill>
+                  <a:schemeClr val="tx1">
+                    <a:lumMod val="65000"/>
+                    <a:lumOff val="35000"/>
+                  </a:schemeClr>
+                </a:solidFill>
+              </a:rPr>
               <a:t>ADO - PPZ - LFH</a:t>
             </a:r>
-            <a:endParaRPr lang="fr-FR"/>
-          </a:p>
-        </p:txBody>
-      </p:sp>
+            <a:endParaRPr lang="fr-FR">
+              <a:solidFill>
+                <a:schemeClr val="tx1">
+                  <a:lumMod val="65000"/>
+                  <a:lumOff val="35000"/>
+                </a:schemeClr>
+              </a:solidFill>
+            </a:endParaRPr>
+          </a:p>
+        </p:txBody>
+      </p:sp>
+      <p:pic>
+        <p:nvPicPr>
+          <p:cNvPr id="2051" name="Picture 3" descr="C:\Documents and Settings\Administrateur\Bureau\images\14.01.png"/>
+          <p:cNvPicPr>
+            <a:picLocks noChangeAspect="1" noChangeArrowheads="1"/>
+          </p:cNvPicPr>
+          <p:nvPr/>
+        </p:nvPicPr>
+        <p:blipFill>
+          <a:blip r:embed="rId2" cstate="print"/>
+          <a:srcRect/>
+          <a:stretch>
+            <a:fillRect/>
+          </a:stretch>
+        </p:blipFill>
+        <p:spPr bwMode="auto">
+          <a:xfrm>
+            <a:off x="1717851" y="1603350"/>
+            <a:ext cx="5811702" cy="4564125"/>
+          </a:xfrm>
+          <a:prstGeom prst="rect">
+            <a:avLst/>
+          </a:prstGeom>
+          <a:noFill/>
+        </p:spPr>
+      </p:pic>
     </p:spTree>
   </p:cSld>
   <p:clrMapOvr>
@@ -5602,10 +6252,10 @@
         </p:nvGrpSpPr>
         <p:grpSpPr bwMode="auto">
           <a:xfrm>
-            <a:off x="228600" y="1508125"/>
-            <a:ext cx="8153400" cy="4511675"/>
-            <a:chOff x="144" y="950"/>
-            <a:chExt cx="5136" cy="2842"/>
+            <a:off x="719138" y="1508125"/>
+            <a:ext cx="7662863" cy="4511675"/>
+            <a:chOff x="453" y="950"/>
+            <a:chExt cx="4827" cy="2842"/>
           </a:xfrm>
         </p:grpSpPr>
         <p:sp>
@@ -5794,8 +6444,8 @@
             <p:nvPr/>
           </p:nvSpPr>
           <p:spPr bwMode="auto">
-            <a:xfrm rot="-1945535">
-              <a:off x="1536" y="2678"/>
+            <a:xfrm rot="19654465">
+              <a:off x="1716" y="2336"/>
               <a:ext cx="288" cy="576"/>
             </a:xfrm>
             <a:prstGeom prst="rect">
@@ -5817,7 +6467,7 @@
             <a:lstStyle/>
             <a:p>
               <a:r>
-                <a:rPr lang="fr-CH" sz="5400" b="1" u="none">
+                <a:rPr lang="fr-CH" sz="5400" b="1" u="none" dirty="0">
                   <a:solidFill>
                     <a:srgbClr val="5F5F5F"/>
                   </a:solidFill>
@@ -5830,7 +6480,7 @@
                 </a:rPr>
                 <a:t>?</a:t>
               </a:r>
-              <a:endParaRPr lang="fr-FR" sz="5400" b="1" u="none">
+              <a:endParaRPr lang="fr-FR" sz="5400" b="1" u="none" dirty="0">
                 <a:solidFill>
                   <a:srgbClr val="5F5F5F"/>
                 </a:solidFill>
@@ -5972,7 +6622,7 @@
           </p:nvSpPr>
           <p:spPr bwMode="auto">
             <a:xfrm rot="598621">
-              <a:off x="144" y="2774"/>
+              <a:off x="453" y="2611"/>
               <a:ext cx="288" cy="826"/>
             </a:xfrm>
             <a:prstGeom prst="rect">
@@ -5994,7 +6644,7 @@
             <a:lstStyle/>
             <a:p>
               <a:r>
-                <a:rPr lang="fr-CH" sz="8000" b="1" u="none">
+                <a:rPr lang="fr-CH" sz="8000" b="1" u="none" dirty="0">
                   <a:solidFill>
                     <a:srgbClr val="5F5F5F"/>
                   </a:solidFill>
@@ -6007,7 +6657,7 @@
                 </a:rPr>
                 <a:t>?</a:t>
               </a:r>
-              <a:endParaRPr lang="fr-FR" sz="8000" b="1" u="none">
+              <a:endParaRPr lang="fr-FR" sz="8000" b="1" u="none" dirty="0">
                 <a:solidFill>
                   <a:srgbClr val="5F5F5F"/>
                 </a:solidFill>
@@ -6386,21 +7036,47 @@
             <p:ph type="sldNum" sz="quarter" idx="12"/>
           </p:nvPr>
         </p:nvSpPr>
-        <p:spPr/>
+        <p:spPr>
+          <a:xfrm>
+            <a:off x="6553200" y="6384972"/>
+            <a:ext cx="2133600" cy="476250"/>
+          </a:xfrm>
+        </p:spPr>
         <p:txBody>
           <a:bodyPr/>
           <a:lstStyle/>
           <a:p>
             <a:fld id="{D355F375-7DFD-484A-B427-E78E26E1C2CE}" type="slidenum">
-              <a:rPr lang="fr-FR" smtClean="0"/>
+              <a:rPr lang="fr-FR" smtClean="0">
+                <a:solidFill>
+                  <a:schemeClr val="tx1">
+                    <a:lumMod val="65000"/>
+                    <a:lumOff val="35000"/>
+                  </a:schemeClr>
+                </a:solidFill>
+              </a:rPr>
               <a:pPr/>
               <a:t>12</a:t>
             </a:fld>
             <a:r>
-              <a:rPr lang="fr-FR" dirty="0" smtClean="0"/>
+              <a:rPr lang="fr-FR" dirty="0" smtClean="0">
+                <a:solidFill>
+                  <a:schemeClr val="tx1">
+                    <a:lumMod val="65000"/>
+                    <a:lumOff val="35000"/>
+                  </a:schemeClr>
+                </a:solidFill>
+              </a:rPr>
               <a:t>/11</a:t>
             </a:r>
-            <a:endParaRPr lang="fr-FR" dirty="0"/>
+            <a:endParaRPr lang="fr-FR" dirty="0">
+              <a:solidFill>
+                <a:schemeClr val="tx1">
+                  <a:lumMod val="65000"/>
+                  <a:lumOff val="35000"/>
+                </a:schemeClr>
+              </a:solidFill>
+            </a:endParaRPr>
           </a:p>
         </p:txBody>
       </p:sp>
@@ -6414,16 +7090,36 @@
             <p:ph type="dt" sz="half" idx="10"/>
           </p:nvPr>
         </p:nvSpPr>
-        <p:spPr/>
+        <p:spPr>
+          <a:xfrm>
+            <a:off x="457200" y="6384972"/>
+            <a:ext cx="2133600" cy="476250"/>
+          </a:xfrm>
+        </p:spPr>
         <p:txBody>
           <a:bodyPr/>
           <a:lstStyle/>
           <a:p>
             <a:fld id="{89B5F8C9-A4FE-4DA3-9DF5-E9758EAF1C0F}" type="datetime1">
-              <a:rPr lang="fr-CH" smtClean="0"/>
-              <a:t>13.01.2010</a:t>
+              <a:rPr lang="fr-CH" smtClean="0">
+                <a:solidFill>
+                  <a:schemeClr val="tx1">
+                    <a:lumMod val="65000"/>
+                    <a:lumOff val="35000"/>
+                  </a:schemeClr>
+                </a:solidFill>
+              </a:rPr>
+              <a:pPr/>
+              <a:t>14.01.2010</a:t>
             </a:fld>
-            <a:endParaRPr lang="fr-FR"/>
+            <a:endParaRPr lang="fr-FR">
+              <a:solidFill>
+                <a:schemeClr val="tx1">
+                  <a:lumMod val="65000"/>
+                  <a:lumOff val="35000"/>
+                </a:schemeClr>
+              </a:solidFill>
+            </a:endParaRPr>
           </a:p>
         </p:txBody>
       </p:sp>
@@ -6437,16 +7133,35 @@
             <p:ph type="ftr" sz="quarter" idx="11"/>
           </p:nvPr>
         </p:nvSpPr>
-        <p:spPr/>
+        <p:spPr>
+          <a:xfrm>
+            <a:off x="3124200" y="6384972"/>
+            <a:ext cx="2895600" cy="476250"/>
+          </a:xfrm>
+        </p:spPr>
         <p:txBody>
           <a:bodyPr/>
           <a:lstStyle/>
           <a:p>
             <a:r>
-              <a:rPr lang="fr-FR" smtClean="0"/>
+              <a:rPr lang="fr-FR" smtClean="0">
+                <a:solidFill>
+                  <a:schemeClr val="tx1">
+                    <a:lumMod val="65000"/>
+                    <a:lumOff val="35000"/>
+                  </a:schemeClr>
+                </a:solidFill>
+              </a:rPr>
               <a:t>ADO - PPZ - LFH</a:t>
             </a:r>
-            <a:endParaRPr lang="fr-FR"/>
+            <a:endParaRPr lang="fr-FR">
+              <a:solidFill>
+                <a:schemeClr val="tx1">
+                  <a:lumMod val="65000"/>
+                  <a:lumOff val="35000"/>
+                </a:schemeClr>
+              </a:solidFill>
+            </a:endParaRPr>
           </a:p>
         </p:txBody>
       </p:sp>
@@ -6767,21 +7482,47 @@
             <p:ph type="sldNum" sz="quarter" idx="12"/>
           </p:nvPr>
         </p:nvSpPr>
-        <p:spPr/>
+        <p:spPr>
+          <a:xfrm>
+            <a:off x="6553200" y="6384972"/>
+            <a:ext cx="2133600" cy="476250"/>
+          </a:xfrm>
+        </p:spPr>
         <p:txBody>
           <a:bodyPr/>
           <a:lstStyle/>
           <a:p>
             <a:fld id="{D355F375-7DFD-484A-B427-E78E26E1C2CE}" type="slidenum">
-              <a:rPr lang="fr-FR" smtClean="0"/>
+              <a:rPr lang="fr-FR" smtClean="0">
+                <a:solidFill>
+                  <a:schemeClr val="tx1">
+                    <a:lumMod val="65000"/>
+                    <a:lumOff val="35000"/>
+                  </a:schemeClr>
+                </a:solidFill>
+              </a:rPr>
               <a:pPr/>
               <a:t>2</a:t>
             </a:fld>
             <a:r>
-              <a:rPr lang="fr-FR" dirty="0" smtClean="0"/>
+              <a:rPr lang="fr-FR" dirty="0" smtClean="0">
+                <a:solidFill>
+                  <a:schemeClr val="tx1">
+                    <a:lumMod val="65000"/>
+                    <a:lumOff val="35000"/>
+                  </a:schemeClr>
+                </a:solidFill>
+              </a:rPr>
               <a:t>/11</a:t>
             </a:r>
-            <a:endParaRPr lang="fr-FR" dirty="0"/>
+            <a:endParaRPr lang="fr-FR" dirty="0">
+              <a:solidFill>
+                <a:schemeClr val="tx1">
+                  <a:lumMod val="65000"/>
+                  <a:lumOff val="35000"/>
+                </a:schemeClr>
+              </a:solidFill>
+            </a:endParaRPr>
           </a:p>
         </p:txBody>
       </p:sp>
@@ -6795,16 +7536,36 @@
             <p:ph type="dt" sz="half" idx="10"/>
           </p:nvPr>
         </p:nvSpPr>
-        <p:spPr/>
+        <p:spPr>
+          <a:xfrm>
+            <a:off x="457200" y="6384972"/>
+            <a:ext cx="2133600" cy="476250"/>
+          </a:xfrm>
+        </p:spPr>
         <p:txBody>
           <a:bodyPr/>
           <a:lstStyle/>
           <a:p>
             <a:fld id="{CA9D27E8-796E-461E-A617-2F4F4AC24117}" type="datetime1">
-              <a:rPr lang="fr-CH" smtClean="0"/>
-              <a:t>13.01.2010</a:t>
+              <a:rPr lang="fr-CH" smtClean="0">
+                <a:solidFill>
+                  <a:schemeClr val="tx1">
+                    <a:lumMod val="65000"/>
+                    <a:lumOff val="35000"/>
+                  </a:schemeClr>
+                </a:solidFill>
+              </a:rPr>
+              <a:pPr/>
+              <a:t>14.01.2010</a:t>
             </a:fld>
-            <a:endParaRPr lang="fr-FR"/>
+            <a:endParaRPr lang="fr-FR" dirty="0">
+              <a:solidFill>
+                <a:schemeClr val="tx1">
+                  <a:lumMod val="65000"/>
+                  <a:lumOff val="35000"/>
+                </a:schemeClr>
+              </a:solidFill>
+            </a:endParaRPr>
           </a:p>
         </p:txBody>
       </p:sp>
@@ -6818,16 +7579,35 @@
             <p:ph type="ftr" sz="quarter" idx="11"/>
           </p:nvPr>
         </p:nvSpPr>
-        <p:spPr/>
+        <p:spPr>
+          <a:xfrm>
+            <a:off x="3124200" y="6384972"/>
+            <a:ext cx="2895600" cy="476250"/>
+          </a:xfrm>
+        </p:spPr>
         <p:txBody>
           <a:bodyPr/>
           <a:lstStyle/>
           <a:p>
             <a:r>
-              <a:rPr lang="fr-FR" smtClean="0"/>
+              <a:rPr lang="fr-FR" smtClean="0">
+                <a:solidFill>
+                  <a:schemeClr val="tx1">
+                    <a:lumMod val="65000"/>
+                    <a:lumOff val="35000"/>
+                  </a:schemeClr>
+                </a:solidFill>
+              </a:rPr>
               <a:t>ADO - PPZ - LFH</a:t>
             </a:r>
-            <a:endParaRPr lang="fr-FR"/>
+            <a:endParaRPr lang="fr-FR">
+              <a:solidFill>
+                <a:schemeClr val="tx1">
+                  <a:lumMod val="65000"/>
+                  <a:lumOff val="35000"/>
+                </a:schemeClr>
+              </a:solidFill>
+            </a:endParaRPr>
           </a:p>
         </p:txBody>
       </p:sp>
@@ -6841,8 +7621,8 @@
         </p:nvSpPr>
         <p:spPr bwMode="auto">
           <a:xfrm>
-            <a:off x="2133600" y="1806982"/>
-            <a:ext cx="4953000" cy="3831818"/>
+            <a:off x="2271681" y="1493811"/>
+            <a:ext cx="4953000" cy="4662815"/>
           </a:xfrm>
           <a:prstGeom prst="rect">
             <a:avLst/>
@@ -7023,6 +7803,40 @@
               </a:rPr>
               <a:t>Conclusion</a:t>
             </a:r>
+          </a:p>
+          <a:p>
+            <a:pPr marL="342900" indent="-342900">
+              <a:lnSpc>
+                <a:spcPct val="150000"/>
+              </a:lnSpc>
+              <a:buAutoNum type="arabicPeriod"/>
+            </a:pPr>
+            <a:r>
+              <a:rPr lang="fr-FR" u="none" dirty="0" smtClean="0">
+                <a:latin typeface="Trebuchet MS" pitchFamily="34" charset="0"/>
+              </a:rPr>
+              <a:t>Présentation du jeu</a:t>
+            </a:r>
+            <a:endParaRPr lang="fr-FR" u="none" dirty="0" smtClean="0">
+              <a:latin typeface="Trebuchet MS" pitchFamily="34" charset="0"/>
+            </a:endParaRPr>
+          </a:p>
+          <a:p>
+            <a:pPr marL="342900" indent="-342900">
+              <a:lnSpc>
+                <a:spcPct val="150000"/>
+              </a:lnSpc>
+              <a:buAutoNum type="arabicPeriod"/>
+            </a:pPr>
+            <a:r>
+              <a:rPr lang="fr-FR" u="none" dirty="0" smtClean="0">
+                <a:latin typeface="Trebuchet MS" pitchFamily="34" charset="0"/>
+              </a:rPr>
+              <a:t>Questions</a:t>
+            </a:r>
+            <a:endParaRPr lang="fr-FR" u="none" dirty="0" smtClean="0">
+              <a:latin typeface="Trebuchet MS" pitchFamily="34" charset="0"/>
+            </a:endParaRPr>
           </a:p>
         </p:txBody>
       </p:sp>
@@ -7346,21 +8160,47 @@
             <p:ph type="sldNum" sz="quarter" idx="12"/>
           </p:nvPr>
         </p:nvSpPr>
-        <p:spPr/>
+        <p:spPr>
+          <a:xfrm>
+            <a:off x="6553200" y="6384972"/>
+            <a:ext cx="2133600" cy="476250"/>
+          </a:xfrm>
+        </p:spPr>
         <p:txBody>
           <a:bodyPr/>
           <a:lstStyle/>
           <a:p>
             <a:fld id="{D355F375-7DFD-484A-B427-E78E26E1C2CE}" type="slidenum">
-              <a:rPr lang="fr-FR" smtClean="0"/>
+              <a:rPr lang="fr-FR" smtClean="0">
+                <a:solidFill>
+                  <a:schemeClr val="tx1">
+                    <a:lumMod val="65000"/>
+                    <a:lumOff val="35000"/>
+                  </a:schemeClr>
+                </a:solidFill>
+              </a:rPr>
               <a:pPr/>
               <a:t>3</a:t>
             </a:fld>
             <a:r>
-              <a:rPr lang="fr-FR" dirty="0" smtClean="0"/>
+              <a:rPr lang="fr-FR" dirty="0" smtClean="0">
+                <a:solidFill>
+                  <a:schemeClr val="tx1">
+                    <a:lumMod val="65000"/>
+                    <a:lumOff val="35000"/>
+                  </a:schemeClr>
+                </a:solidFill>
+              </a:rPr>
               <a:t>/11</a:t>
             </a:r>
-            <a:endParaRPr lang="fr-FR" dirty="0"/>
+            <a:endParaRPr lang="fr-FR" dirty="0">
+              <a:solidFill>
+                <a:schemeClr val="tx1">
+                  <a:lumMod val="65000"/>
+                  <a:lumOff val="35000"/>
+                </a:schemeClr>
+              </a:solidFill>
+            </a:endParaRPr>
           </a:p>
         </p:txBody>
       </p:sp>
@@ -7374,16 +8214,36 @@
             <p:ph type="dt" sz="half" idx="10"/>
           </p:nvPr>
         </p:nvSpPr>
-        <p:spPr/>
+        <p:spPr>
+          <a:xfrm>
+            <a:off x="457200" y="6384972"/>
+            <a:ext cx="2133600" cy="476250"/>
+          </a:xfrm>
+        </p:spPr>
         <p:txBody>
           <a:bodyPr/>
           <a:lstStyle/>
           <a:p>
             <a:fld id="{CA9D27E8-796E-461E-A617-2F4F4AC24117}" type="datetime1">
-              <a:rPr lang="fr-CH" smtClean="0"/>
-              <a:t>13.01.2010</a:t>
+              <a:rPr lang="fr-CH" smtClean="0">
+                <a:solidFill>
+                  <a:schemeClr val="tx1">
+                    <a:lumMod val="65000"/>
+                    <a:lumOff val="35000"/>
+                  </a:schemeClr>
+                </a:solidFill>
+              </a:rPr>
+              <a:pPr/>
+              <a:t>14.01.2010</a:t>
             </a:fld>
-            <a:endParaRPr lang="fr-FR"/>
+            <a:endParaRPr lang="fr-FR" dirty="0">
+              <a:solidFill>
+                <a:schemeClr val="tx1">
+                  <a:lumMod val="65000"/>
+                  <a:lumOff val="35000"/>
+                </a:schemeClr>
+              </a:solidFill>
+            </a:endParaRPr>
           </a:p>
         </p:txBody>
       </p:sp>
@@ -7397,16 +8257,35 @@
             <p:ph type="ftr" sz="quarter" idx="11"/>
           </p:nvPr>
         </p:nvSpPr>
-        <p:spPr/>
+        <p:spPr>
+          <a:xfrm>
+            <a:off x="3124200" y="6384972"/>
+            <a:ext cx="2895600" cy="476250"/>
+          </a:xfrm>
+        </p:spPr>
         <p:txBody>
           <a:bodyPr/>
           <a:lstStyle/>
           <a:p>
             <a:r>
-              <a:rPr lang="fr-FR" smtClean="0"/>
+              <a:rPr lang="fr-FR" smtClean="0">
+                <a:solidFill>
+                  <a:schemeClr val="tx1">
+                    <a:lumMod val="65000"/>
+                    <a:lumOff val="35000"/>
+                  </a:schemeClr>
+                </a:solidFill>
+              </a:rPr>
               <a:t>ADO - PPZ - LFH</a:t>
             </a:r>
-            <a:endParaRPr lang="fr-FR"/>
+            <a:endParaRPr lang="fr-FR">
+              <a:solidFill>
+                <a:schemeClr val="tx1">
+                  <a:lumMod val="65000"/>
+                  <a:lumOff val="35000"/>
+                </a:schemeClr>
+              </a:solidFill>
+            </a:endParaRPr>
           </a:p>
         </p:txBody>
       </p:sp>
@@ -7686,21 +8565,47 @@
             <p:ph type="sldNum" sz="quarter" idx="12"/>
           </p:nvPr>
         </p:nvSpPr>
-        <p:spPr/>
+        <p:spPr>
+          <a:xfrm>
+            <a:off x="6553200" y="6384972"/>
+            <a:ext cx="2133600" cy="476250"/>
+          </a:xfrm>
+        </p:spPr>
         <p:txBody>
           <a:bodyPr/>
           <a:lstStyle/>
           <a:p>
             <a:fld id="{420F5742-7484-4AFF-BE5C-C36DF30CE89D}" type="slidenum">
-              <a:rPr lang="fr-FR" smtClean="0"/>
+              <a:rPr lang="fr-FR" smtClean="0">
+                <a:solidFill>
+                  <a:schemeClr val="tx1">
+                    <a:lumMod val="65000"/>
+                    <a:lumOff val="35000"/>
+                  </a:schemeClr>
+                </a:solidFill>
+              </a:rPr>
               <a:pPr/>
               <a:t>4</a:t>
             </a:fld>
             <a:r>
-              <a:rPr lang="fr-FR" dirty="0" smtClean="0"/>
+              <a:rPr lang="fr-FR" dirty="0" smtClean="0">
+                <a:solidFill>
+                  <a:schemeClr val="tx1">
+                    <a:lumMod val="65000"/>
+                    <a:lumOff val="35000"/>
+                  </a:schemeClr>
+                </a:solidFill>
+              </a:rPr>
               <a:t>/11</a:t>
             </a:r>
-            <a:endParaRPr lang="fr-FR" dirty="0"/>
+            <a:endParaRPr lang="fr-FR" dirty="0">
+              <a:solidFill>
+                <a:schemeClr val="tx1">
+                  <a:lumMod val="65000"/>
+                  <a:lumOff val="35000"/>
+                </a:schemeClr>
+              </a:solidFill>
+            </a:endParaRPr>
           </a:p>
         </p:txBody>
       </p:sp>
@@ -7714,16 +8619,36 @@
             <p:ph type="dt" sz="half" idx="10"/>
           </p:nvPr>
         </p:nvSpPr>
-        <p:spPr/>
+        <p:spPr>
+          <a:xfrm>
+            <a:off x="457200" y="6384972"/>
+            <a:ext cx="2133600" cy="476250"/>
+          </a:xfrm>
+        </p:spPr>
         <p:txBody>
           <a:bodyPr/>
           <a:lstStyle/>
           <a:p>
             <a:fld id="{C4F21400-70EF-4FB9-BD50-1366C864B184}" type="datetime1">
-              <a:rPr lang="fr-CH" smtClean="0"/>
-              <a:t>13.01.2010</a:t>
+              <a:rPr lang="fr-CH" smtClean="0">
+                <a:solidFill>
+                  <a:schemeClr val="tx1">
+                    <a:lumMod val="65000"/>
+                    <a:lumOff val="35000"/>
+                  </a:schemeClr>
+                </a:solidFill>
+              </a:rPr>
+              <a:pPr/>
+              <a:t>14.01.2010</a:t>
             </a:fld>
-            <a:endParaRPr lang="fr-FR"/>
+            <a:endParaRPr lang="fr-FR">
+              <a:solidFill>
+                <a:schemeClr val="tx1">
+                  <a:lumMod val="65000"/>
+                  <a:lumOff val="35000"/>
+                </a:schemeClr>
+              </a:solidFill>
+            </a:endParaRPr>
           </a:p>
         </p:txBody>
       </p:sp>
@@ -7737,16 +8662,35 @@
             <p:ph type="ftr" sz="quarter" idx="11"/>
           </p:nvPr>
         </p:nvSpPr>
-        <p:spPr/>
+        <p:spPr>
+          <a:xfrm>
+            <a:off x="3124200" y="6384972"/>
+            <a:ext cx="2895600" cy="476250"/>
+          </a:xfrm>
+        </p:spPr>
         <p:txBody>
           <a:bodyPr/>
           <a:lstStyle/>
           <a:p>
             <a:r>
-              <a:rPr lang="fr-FR" smtClean="0"/>
+              <a:rPr lang="fr-FR" smtClean="0">
+                <a:solidFill>
+                  <a:schemeClr val="tx1">
+                    <a:lumMod val="65000"/>
+                    <a:lumOff val="35000"/>
+                  </a:schemeClr>
+                </a:solidFill>
+              </a:rPr>
               <a:t>ADO - PPZ - LFH</a:t>
             </a:r>
-            <a:endParaRPr lang="fr-FR"/>
+            <a:endParaRPr lang="fr-FR">
+              <a:solidFill>
+                <a:schemeClr val="tx1">
+                  <a:lumMod val="65000"/>
+                  <a:lumOff val="35000"/>
+                </a:schemeClr>
+              </a:solidFill>
+            </a:endParaRPr>
           </a:p>
         </p:txBody>
       </p:sp>
@@ -7872,7 +8816,21 @@
                 </a:effectLst>
                 <a:latin typeface="Trebuchet MS" pitchFamily="34" charset="0"/>
               </a:rPr>
-              <a:t>CONCEPTS ALGORITHMIQUES</a:t>
+              <a:t>CONCEPTS </a:t>
+            </a:r>
+            <a:r>
+              <a:rPr lang="fr-FR" sz="2000" b="1" u="none" dirty="0" smtClean="0">
+                <a:solidFill>
+                  <a:schemeClr val="bg1"/>
+                </a:solidFill>
+                <a:effectLst>
+                  <a:outerShdw blurRad="38100" dist="38100" dir="2700000" algn="tl">
+                    <a:srgbClr val="C0C0C0"/>
+                  </a:outerShdw>
+                </a:effectLst>
+                <a:latin typeface="Trebuchet MS" pitchFamily="34" charset="0"/>
+              </a:rPr>
+              <a:t>ALGORITHMIQUES [PIERRE-DO]</a:t>
             </a:r>
             <a:endParaRPr lang="fr-FR" sz="2000" b="1" u="none" dirty="0">
               <a:solidFill>
@@ -7988,21 +8946,47 @@
             <p:ph type="sldNum" sz="quarter" idx="12"/>
           </p:nvPr>
         </p:nvSpPr>
-        <p:spPr/>
+        <p:spPr>
+          <a:xfrm>
+            <a:off x="6553200" y="6384972"/>
+            <a:ext cx="2133600" cy="476250"/>
+          </a:xfrm>
+        </p:spPr>
         <p:txBody>
           <a:bodyPr/>
           <a:lstStyle/>
           <a:p>
             <a:fld id="{420F5742-7484-4AFF-BE5C-C36DF30CE89D}" type="slidenum">
-              <a:rPr lang="fr-FR" smtClean="0"/>
+              <a:rPr lang="fr-FR" smtClean="0">
+                <a:solidFill>
+                  <a:schemeClr val="tx1">
+                    <a:lumMod val="65000"/>
+                    <a:lumOff val="35000"/>
+                  </a:schemeClr>
+                </a:solidFill>
+              </a:rPr>
               <a:pPr/>
               <a:t>5</a:t>
             </a:fld>
             <a:r>
-              <a:rPr lang="fr-FR" dirty="0" smtClean="0"/>
+              <a:rPr lang="fr-FR" dirty="0" smtClean="0">
+                <a:solidFill>
+                  <a:schemeClr val="tx1">
+                    <a:lumMod val="65000"/>
+                    <a:lumOff val="35000"/>
+                  </a:schemeClr>
+                </a:solidFill>
+              </a:rPr>
               <a:t>/11</a:t>
             </a:r>
-            <a:endParaRPr lang="fr-FR" dirty="0"/>
+            <a:endParaRPr lang="fr-FR" dirty="0">
+              <a:solidFill>
+                <a:schemeClr val="tx1">
+                  <a:lumMod val="65000"/>
+                  <a:lumOff val="35000"/>
+                </a:schemeClr>
+              </a:solidFill>
+            </a:endParaRPr>
           </a:p>
         </p:txBody>
       </p:sp>
@@ -8016,16 +9000,36 @@
             <p:ph type="dt" sz="half" idx="10"/>
           </p:nvPr>
         </p:nvSpPr>
-        <p:spPr/>
+        <p:spPr>
+          <a:xfrm>
+            <a:off x="457200" y="6384972"/>
+            <a:ext cx="2133600" cy="476250"/>
+          </a:xfrm>
+        </p:spPr>
         <p:txBody>
           <a:bodyPr/>
           <a:lstStyle/>
           <a:p>
             <a:fld id="{B5EB10F7-E815-401D-95A5-6717D625711B}" type="datetime1">
-              <a:rPr lang="fr-CH" smtClean="0"/>
-              <a:t>13.01.2010</a:t>
+              <a:rPr lang="fr-CH" smtClean="0">
+                <a:solidFill>
+                  <a:schemeClr val="tx1">
+                    <a:lumMod val="65000"/>
+                    <a:lumOff val="35000"/>
+                  </a:schemeClr>
+                </a:solidFill>
+              </a:rPr>
+              <a:pPr/>
+              <a:t>14.01.2010</a:t>
             </a:fld>
-            <a:endParaRPr lang="fr-FR"/>
+            <a:endParaRPr lang="fr-FR">
+              <a:solidFill>
+                <a:schemeClr val="tx1">
+                  <a:lumMod val="65000"/>
+                  <a:lumOff val="35000"/>
+                </a:schemeClr>
+              </a:solidFill>
+            </a:endParaRPr>
           </a:p>
         </p:txBody>
       </p:sp>
@@ -8039,16 +9043,35 @@
             <p:ph type="ftr" sz="quarter" idx="11"/>
           </p:nvPr>
         </p:nvSpPr>
-        <p:spPr/>
+        <p:spPr>
+          <a:xfrm>
+            <a:off x="3124200" y="6384972"/>
+            <a:ext cx="2895600" cy="476250"/>
+          </a:xfrm>
+        </p:spPr>
         <p:txBody>
           <a:bodyPr/>
           <a:lstStyle/>
           <a:p>
             <a:r>
-              <a:rPr lang="fr-FR" smtClean="0"/>
+              <a:rPr lang="fr-FR" smtClean="0">
+                <a:solidFill>
+                  <a:schemeClr val="tx1">
+                    <a:lumMod val="65000"/>
+                    <a:lumOff val="35000"/>
+                  </a:schemeClr>
+                </a:solidFill>
+              </a:rPr>
               <a:t>ADO - PPZ - LFH</a:t>
             </a:r>
-            <a:endParaRPr lang="fr-FR"/>
+            <a:endParaRPr lang="fr-FR">
+              <a:solidFill>
+                <a:schemeClr val="tx1">
+                  <a:lumMod val="65000"/>
+                  <a:lumOff val="35000"/>
+                </a:schemeClr>
+              </a:solidFill>
+            </a:endParaRPr>
           </a:p>
         </p:txBody>
       </p:sp>
@@ -8084,15 +9107,7 @@
             </a:r>
             <a:r>
               <a:rPr lang="fr-CH" u="none" dirty="0" smtClean="0"/>
-              <a:t>Graphe et algorithme </a:t>
-            </a:r>
-            <a:r>
-              <a:rPr lang="fr-CH" u="none" dirty="0" smtClean="0"/>
-              <a:t>ACPC</a:t>
-            </a:r>
-            <a:r>
-              <a:rPr lang="fr-CH" u="none" dirty="0" smtClean="0"/>
-              <a:t> (</a:t>
+              <a:t>Graphe et algorithme ACPC (</a:t>
             </a:r>
             <a:r>
               <a:rPr lang="fr-CH" u="none" dirty="0" err="1" smtClean="0"/>
@@ -8312,21 +9327,47 @@
             <p:ph type="sldNum" sz="quarter" idx="12"/>
           </p:nvPr>
         </p:nvSpPr>
-        <p:spPr/>
+        <p:spPr>
+          <a:xfrm>
+            <a:off x="6553200" y="6384972"/>
+            <a:ext cx="2133600" cy="476250"/>
+          </a:xfrm>
+        </p:spPr>
         <p:txBody>
           <a:bodyPr/>
           <a:lstStyle/>
           <a:p>
             <a:fld id="{420F5742-7484-4AFF-BE5C-C36DF30CE89D}" type="slidenum">
-              <a:rPr lang="fr-FR" smtClean="0"/>
+              <a:rPr lang="fr-FR" smtClean="0">
+                <a:solidFill>
+                  <a:schemeClr val="tx1">
+                    <a:lumMod val="65000"/>
+                    <a:lumOff val="35000"/>
+                  </a:schemeClr>
+                </a:solidFill>
+              </a:rPr>
               <a:pPr/>
               <a:t>6</a:t>
             </a:fld>
             <a:r>
-              <a:rPr lang="fr-FR" dirty="0" smtClean="0"/>
+              <a:rPr lang="fr-FR" dirty="0" smtClean="0">
+                <a:solidFill>
+                  <a:schemeClr val="tx1">
+                    <a:lumMod val="65000"/>
+                    <a:lumOff val="35000"/>
+                  </a:schemeClr>
+                </a:solidFill>
+              </a:rPr>
               <a:t>/11</a:t>
             </a:r>
-            <a:endParaRPr lang="fr-FR" dirty="0"/>
+            <a:endParaRPr lang="fr-FR" dirty="0">
+              <a:solidFill>
+                <a:schemeClr val="tx1">
+                  <a:lumMod val="65000"/>
+                  <a:lumOff val="35000"/>
+                </a:schemeClr>
+              </a:solidFill>
+            </a:endParaRPr>
           </a:p>
         </p:txBody>
       </p:sp>
@@ -8340,16 +9381,36 @@
             <p:ph type="dt" sz="half" idx="10"/>
           </p:nvPr>
         </p:nvSpPr>
-        <p:spPr/>
+        <p:spPr>
+          <a:xfrm>
+            <a:off x="457200" y="6384972"/>
+            <a:ext cx="2133600" cy="476250"/>
+          </a:xfrm>
+        </p:spPr>
         <p:txBody>
           <a:bodyPr/>
           <a:lstStyle/>
           <a:p>
             <a:fld id="{D3D5CAE2-8D26-4FEA-92BD-591A5553A1EE}" type="datetime1">
-              <a:rPr lang="fr-CH" smtClean="0"/>
-              <a:t>13.01.2010</a:t>
+              <a:rPr lang="fr-CH" smtClean="0">
+                <a:solidFill>
+                  <a:schemeClr val="tx1">
+                    <a:lumMod val="65000"/>
+                    <a:lumOff val="35000"/>
+                  </a:schemeClr>
+                </a:solidFill>
+              </a:rPr>
+              <a:pPr/>
+              <a:t>14.01.2010</a:t>
             </a:fld>
-            <a:endParaRPr lang="fr-FR"/>
+            <a:endParaRPr lang="fr-FR">
+              <a:solidFill>
+                <a:schemeClr val="tx1">
+                  <a:lumMod val="65000"/>
+                  <a:lumOff val="35000"/>
+                </a:schemeClr>
+              </a:solidFill>
+            </a:endParaRPr>
           </a:p>
         </p:txBody>
       </p:sp>
@@ -8363,16 +9424,35 @@
             <p:ph type="ftr" sz="quarter" idx="11"/>
           </p:nvPr>
         </p:nvSpPr>
-        <p:spPr/>
+        <p:spPr>
+          <a:xfrm>
+            <a:off x="3124200" y="6384972"/>
+            <a:ext cx="2895600" cy="476250"/>
+          </a:xfrm>
+        </p:spPr>
         <p:txBody>
           <a:bodyPr/>
           <a:lstStyle/>
           <a:p>
             <a:r>
-              <a:rPr lang="fr-FR" smtClean="0"/>
+              <a:rPr lang="fr-FR" smtClean="0">
+                <a:solidFill>
+                  <a:schemeClr val="tx1">
+                    <a:lumMod val="65000"/>
+                    <a:lumOff val="35000"/>
+                  </a:schemeClr>
+                </a:solidFill>
+              </a:rPr>
               <a:t>ADO - PPZ - LFH</a:t>
             </a:r>
-            <a:endParaRPr lang="fr-FR"/>
+            <a:endParaRPr lang="fr-FR">
+              <a:solidFill>
+                <a:schemeClr val="tx1">
+                  <a:lumMod val="65000"/>
+                  <a:lumOff val="35000"/>
+                </a:schemeClr>
+              </a:solidFill>
+            </a:endParaRPr>
           </a:p>
         </p:txBody>
       </p:sp>
@@ -8420,7 +9500,21 @@
                 </a:effectLst>
                 <a:latin typeface="Trebuchet MS" pitchFamily="34" charset="0"/>
               </a:rPr>
-              <a:t>GRAPHE ET ALGORITHME ACPC</a:t>
+              <a:t>GRAPHE ET ALGORITHME </a:t>
+            </a:r>
+            <a:r>
+              <a:rPr lang="fr-FR" sz="2000" b="1" u="none" dirty="0" smtClean="0">
+                <a:solidFill>
+                  <a:schemeClr val="bg1"/>
+                </a:solidFill>
+                <a:effectLst>
+                  <a:outerShdw blurRad="38100" dist="38100" dir="2700000" algn="tl">
+                    <a:srgbClr val="C0C0C0"/>
+                  </a:outerShdw>
+                </a:effectLst>
+                <a:latin typeface="Trebuchet MS" pitchFamily="34" charset="0"/>
+              </a:rPr>
+              <a:t>ACPC (DIJKSTRA) [PIERRE-DO]</a:t>
             </a:r>
             <a:endParaRPr lang="fr-FR" sz="2000" b="1" u="none" dirty="0">
               <a:solidFill>
@@ -8614,21 +9708,47 @@
             <p:ph type="sldNum" sz="quarter" idx="12"/>
           </p:nvPr>
         </p:nvSpPr>
-        <p:spPr/>
+        <p:spPr>
+          <a:xfrm>
+            <a:off x="6553200" y="6384972"/>
+            <a:ext cx="2133600" cy="476250"/>
+          </a:xfrm>
+        </p:spPr>
         <p:txBody>
           <a:bodyPr/>
           <a:lstStyle/>
           <a:p>
             <a:fld id="{420F5742-7484-4AFF-BE5C-C36DF30CE89D}" type="slidenum">
-              <a:rPr lang="fr-FR" smtClean="0"/>
+              <a:rPr lang="fr-FR" smtClean="0">
+                <a:solidFill>
+                  <a:schemeClr val="tx1">
+                    <a:lumMod val="65000"/>
+                    <a:lumOff val="35000"/>
+                  </a:schemeClr>
+                </a:solidFill>
+              </a:rPr>
               <a:pPr/>
               <a:t>7</a:t>
             </a:fld>
             <a:r>
-              <a:rPr lang="fr-FR" dirty="0" smtClean="0"/>
+              <a:rPr lang="fr-FR" dirty="0" smtClean="0">
+                <a:solidFill>
+                  <a:schemeClr val="tx1">
+                    <a:lumMod val="65000"/>
+                    <a:lumOff val="35000"/>
+                  </a:schemeClr>
+                </a:solidFill>
+              </a:rPr>
               <a:t>/11</a:t>
             </a:r>
-            <a:endParaRPr lang="fr-FR" dirty="0"/>
+            <a:endParaRPr lang="fr-FR" dirty="0">
+              <a:solidFill>
+                <a:schemeClr val="tx1">
+                  <a:lumMod val="65000"/>
+                  <a:lumOff val="35000"/>
+                </a:schemeClr>
+              </a:solidFill>
+            </a:endParaRPr>
           </a:p>
         </p:txBody>
       </p:sp>
@@ -8642,16 +9762,36 @@
             <p:ph type="dt" sz="half" idx="10"/>
           </p:nvPr>
         </p:nvSpPr>
-        <p:spPr/>
+        <p:spPr>
+          <a:xfrm>
+            <a:off x="457200" y="6384972"/>
+            <a:ext cx="2133600" cy="476250"/>
+          </a:xfrm>
+        </p:spPr>
         <p:txBody>
           <a:bodyPr/>
           <a:lstStyle/>
           <a:p>
             <a:fld id="{C30AF161-DDFB-4518-87CD-DB6F6072CA36}" type="datetime1">
-              <a:rPr lang="fr-CH" smtClean="0"/>
-              <a:t>13.01.2010</a:t>
+              <a:rPr lang="fr-CH" smtClean="0">
+                <a:solidFill>
+                  <a:schemeClr val="tx1">
+                    <a:lumMod val="65000"/>
+                    <a:lumOff val="35000"/>
+                  </a:schemeClr>
+                </a:solidFill>
+              </a:rPr>
+              <a:pPr/>
+              <a:t>14.01.2010</a:t>
             </a:fld>
-            <a:endParaRPr lang="fr-FR"/>
+            <a:endParaRPr lang="fr-FR">
+              <a:solidFill>
+                <a:schemeClr val="tx1">
+                  <a:lumMod val="65000"/>
+                  <a:lumOff val="35000"/>
+                </a:schemeClr>
+              </a:solidFill>
+            </a:endParaRPr>
           </a:p>
         </p:txBody>
       </p:sp>
@@ -8665,16 +9805,35 @@
             <p:ph type="ftr" sz="quarter" idx="11"/>
           </p:nvPr>
         </p:nvSpPr>
-        <p:spPr/>
+        <p:spPr>
+          <a:xfrm>
+            <a:off x="3124200" y="6384972"/>
+            <a:ext cx="2895600" cy="476250"/>
+          </a:xfrm>
+        </p:spPr>
         <p:txBody>
           <a:bodyPr/>
           <a:lstStyle/>
           <a:p>
             <a:r>
-              <a:rPr lang="fr-FR" smtClean="0"/>
+              <a:rPr lang="fr-FR" smtClean="0">
+                <a:solidFill>
+                  <a:schemeClr val="tx1">
+                    <a:lumMod val="65000"/>
+                    <a:lumOff val="35000"/>
+                  </a:schemeClr>
+                </a:solidFill>
+              </a:rPr>
               <a:t>ADO - PPZ - LFH</a:t>
             </a:r>
-            <a:endParaRPr lang="fr-FR"/>
+            <a:endParaRPr lang="fr-FR">
+              <a:solidFill>
+                <a:schemeClr val="tx1">
+                  <a:lumMod val="65000"/>
+                  <a:lumOff val="35000"/>
+                </a:schemeClr>
+              </a:solidFill>
+            </a:endParaRPr>
           </a:p>
         </p:txBody>
       </p:sp>
@@ -8722,7 +9881,21 @@
                 </a:effectLst>
                 <a:latin typeface="Trebuchet MS" pitchFamily="34" charset="0"/>
               </a:rPr>
-              <a:t>MAILLAGE DYNAMIQUE</a:t>
+              <a:t>MAILLAGE </a:t>
+            </a:r>
+            <a:r>
+              <a:rPr lang="fr-FR" sz="2000" b="1" u="none" dirty="0" smtClean="0">
+                <a:solidFill>
+                  <a:schemeClr val="bg1"/>
+                </a:solidFill>
+                <a:effectLst>
+                  <a:outerShdw blurRad="38100" dist="38100" dir="2700000" algn="tl">
+                    <a:srgbClr val="C0C0C0"/>
+                  </a:outerShdw>
+                </a:effectLst>
+                <a:latin typeface="Trebuchet MS" pitchFamily="34" charset="0"/>
+              </a:rPr>
+              <a:t>DYNAMIQUE [PIERRE-DO]</a:t>
             </a:r>
             <a:endParaRPr lang="fr-FR" sz="2000" b="1" u="none" dirty="0">
               <a:solidFill>
@@ -8916,21 +10089,47 @@
             <p:ph type="sldNum" sz="quarter" idx="12"/>
           </p:nvPr>
         </p:nvSpPr>
-        <p:spPr/>
+        <p:spPr>
+          <a:xfrm>
+            <a:off x="6553200" y="6384972"/>
+            <a:ext cx="2133600" cy="476250"/>
+          </a:xfrm>
+        </p:spPr>
         <p:txBody>
           <a:bodyPr/>
           <a:lstStyle/>
           <a:p>
             <a:fld id="{81C47DC9-EC34-4064-A444-5DA14B88EED2}" type="slidenum">
-              <a:rPr lang="fr-FR" smtClean="0"/>
+              <a:rPr lang="fr-FR" smtClean="0">
+                <a:solidFill>
+                  <a:schemeClr val="tx1">
+                    <a:lumMod val="65000"/>
+                    <a:lumOff val="35000"/>
+                  </a:schemeClr>
+                </a:solidFill>
+              </a:rPr>
               <a:pPr/>
               <a:t>8</a:t>
             </a:fld>
             <a:r>
-              <a:rPr lang="fr-FR" dirty="0" smtClean="0"/>
+              <a:rPr lang="fr-FR" dirty="0" smtClean="0">
+                <a:solidFill>
+                  <a:schemeClr val="tx1">
+                    <a:lumMod val="65000"/>
+                    <a:lumOff val="35000"/>
+                  </a:schemeClr>
+                </a:solidFill>
+              </a:rPr>
               <a:t>/11</a:t>
             </a:r>
-            <a:endParaRPr lang="fr-FR" dirty="0"/>
+            <a:endParaRPr lang="fr-FR" dirty="0">
+              <a:solidFill>
+                <a:schemeClr val="tx1">
+                  <a:lumMod val="65000"/>
+                  <a:lumOff val="35000"/>
+                </a:schemeClr>
+              </a:solidFill>
+            </a:endParaRPr>
           </a:p>
         </p:txBody>
       </p:sp>
@@ -8944,16 +10143,36 @@
             <p:ph type="dt" sz="half" idx="10"/>
           </p:nvPr>
         </p:nvSpPr>
-        <p:spPr/>
+        <p:spPr>
+          <a:xfrm>
+            <a:off x="457200" y="6384972"/>
+            <a:ext cx="2133600" cy="476250"/>
+          </a:xfrm>
+        </p:spPr>
         <p:txBody>
           <a:bodyPr/>
           <a:lstStyle/>
           <a:p>
             <a:fld id="{F29294AF-8558-4D43-8C8C-7FA1E6073AB3}" type="datetime1">
-              <a:rPr lang="fr-CH" smtClean="0"/>
-              <a:t>13.01.2010</a:t>
+              <a:rPr lang="fr-CH" smtClean="0">
+                <a:solidFill>
+                  <a:schemeClr val="tx1">
+                    <a:lumMod val="65000"/>
+                    <a:lumOff val="35000"/>
+                  </a:schemeClr>
+                </a:solidFill>
+              </a:rPr>
+              <a:pPr/>
+              <a:t>14.01.2010</a:t>
             </a:fld>
-            <a:endParaRPr lang="fr-FR"/>
+            <a:endParaRPr lang="fr-FR">
+              <a:solidFill>
+                <a:schemeClr val="tx1">
+                  <a:lumMod val="65000"/>
+                  <a:lumOff val="35000"/>
+                </a:schemeClr>
+              </a:solidFill>
+            </a:endParaRPr>
           </a:p>
         </p:txBody>
       </p:sp>
@@ -8967,16 +10186,35 @@
             <p:ph type="ftr" sz="quarter" idx="11"/>
           </p:nvPr>
         </p:nvSpPr>
-        <p:spPr/>
+        <p:spPr>
+          <a:xfrm>
+            <a:off x="3124200" y="6384972"/>
+            <a:ext cx="2895600" cy="476250"/>
+          </a:xfrm>
+        </p:spPr>
         <p:txBody>
           <a:bodyPr/>
           <a:lstStyle/>
           <a:p>
             <a:r>
-              <a:rPr lang="fr-FR" smtClean="0"/>
+              <a:rPr lang="fr-FR" smtClean="0">
+                <a:solidFill>
+                  <a:schemeClr val="tx1">
+                    <a:lumMod val="65000"/>
+                    <a:lumOff val="35000"/>
+                  </a:schemeClr>
+                </a:solidFill>
+              </a:rPr>
               <a:t>ADO - PPZ - LFH</a:t>
             </a:r>
-            <a:endParaRPr lang="fr-FR"/>
+            <a:endParaRPr lang="fr-FR">
+              <a:solidFill>
+                <a:schemeClr val="tx1">
+                  <a:lumMod val="65000"/>
+                  <a:lumOff val="35000"/>
+                </a:schemeClr>
+              </a:solidFill>
+            </a:endParaRPr>
           </a:p>
         </p:txBody>
       </p:sp>
@@ -9024,7 +10262,21 @@
                 </a:effectLst>
                 <a:latin typeface="Trebuchet MS" pitchFamily="34" charset="0"/>
               </a:rPr>
-              <a:t>MODELE MVC</a:t>
+              <a:t>MODELE </a:t>
+            </a:r>
+            <a:r>
+              <a:rPr lang="fr-FR" sz="2000" b="1" u="none" dirty="0" smtClean="0">
+                <a:solidFill>
+                  <a:schemeClr val="bg1"/>
+                </a:solidFill>
+                <a:effectLst>
+                  <a:outerShdw blurRad="38100" dist="38100" dir="2700000" algn="tl">
+                    <a:srgbClr val="C0C0C0"/>
+                  </a:outerShdw>
+                </a:effectLst>
+                <a:latin typeface="Trebuchet MS" pitchFamily="34" charset="0"/>
+              </a:rPr>
+              <a:t>MVC [AURELIEN]</a:t>
             </a:r>
             <a:endParaRPr lang="fr-FR" sz="2000" b="1" u="none" dirty="0">
               <a:solidFill>
@@ -9301,7 +10553,21 @@
                 </a:effectLst>
                 <a:latin typeface="Trebuchet MS" pitchFamily="34" charset="0"/>
               </a:rPr>
-              <a:t>STRUCTURE DU CODE</a:t>
+              <a:t>STRUCTURE DU </a:t>
+            </a:r>
+            <a:r>
+              <a:rPr lang="fr-CH" sz="2000" b="1" u="none" dirty="0" smtClean="0">
+                <a:solidFill>
+                  <a:schemeClr val="bg1"/>
+                </a:solidFill>
+                <a:effectLst>
+                  <a:outerShdw blurRad="38100" dist="38100" dir="2700000" algn="tl">
+                    <a:srgbClr val="C0C0C0"/>
+                  </a:outerShdw>
+                </a:effectLst>
+                <a:latin typeface="Trebuchet MS" pitchFamily="34" charset="0"/>
+              </a:rPr>
+              <a:t>CODE [AURELIEN]</a:t>
             </a:r>
             <a:endParaRPr lang="fr-FR" sz="2000" b="1" u="none" dirty="0">
               <a:solidFill>
@@ -9327,21 +10593,47 @@
             <p:ph type="sldNum" sz="quarter" idx="12"/>
           </p:nvPr>
         </p:nvSpPr>
-        <p:spPr/>
+        <p:spPr>
+          <a:xfrm>
+            <a:off x="6553200" y="6384972"/>
+            <a:ext cx="2133600" cy="476250"/>
+          </a:xfrm>
+        </p:spPr>
         <p:txBody>
           <a:bodyPr/>
           <a:lstStyle/>
           <a:p>
             <a:fld id="{420F5742-7484-4AFF-BE5C-C36DF30CE89D}" type="slidenum">
-              <a:rPr lang="fr-FR" smtClean="0"/>
+              <a:rPr lang="fr-FR" smtClean="0">
+                <a:solidFill>
+                  <a:schemeClr val="tx1">
+                    <a:lumMod val="65000"/>
+                    <a:lumOff val="35000"/>
+                  </a:schemeClr>
+                </a:solidFill>
+              </a:rPr>
               <a:pPr/>
               <a:t>9</a:t>
             </a:fld>
             <a:r>
-              <a:rPr lang="fr-FR" dirty="0" smtClean="0"/>
+              <a:rPr lang="fr-FR" dirty="0" smtClean="0">
+                <a:solidFill>
+                  <a:schemeClr val="tx1">
+                    <a:lumMod val="65000"/>
+                    <a:lumOff val="35000"/>
+                  </a:schemeClr>
+                </a:solidFill>
+              </a:rPr>
               <a:t>/11</a:t>
             </a:r>
-            <a:endParaRPr lang="fr-FR" dirty="0"/>
+            <a:endParaRPr lang="fr-FR" dirty="0">
+              <a:solidFill>
+                <a:schemeClr val="tx1">
+                  <a:lumMod val="65000"/>
+                  <a:lumOff val="35000"/>
+                </a:schemeClr>
+              </a:solidFill>
+            </a:endParaRPr>
           </a:p>
         </p:txBody>
       </p:sp>
@@ -9355,16 +10647,36 @@
             <p:ph type="dt" sz="half" idx="10"/>
           </p:nvPr>
         </p:nvSpPr>
-        <p:spPr/>
+        <p:spPr>
+          <a:xfrm>
+            <a:off x="457200" y="6384972"/>
+            <a:ext cx="2133600" cy="476250"/>
+          </a:xfrm>
+        </p:spPr>
         <p:txBody>
           <a:bodyPr/>
           <a:lstStyle/>
           <a:p>
             <a:fld id="{357275CD-44DC-4CD4-BA57-161A992B0A41}" type="datetime1">
-              <a:rPr lang="fr-CH" smtClean="0"/>
-              <a:t>13.01.2010</a:t>
+              <a:rPr lang="fr-CH" smtClean="0">
+                <a:solidFill>
+                  <a:schemeClr val="tx1">
+                    <a:lumMod val="65000"/>
+                    <a:lumOff val="35000"/>
+                  </a:schemeClr>
+                </a:solidFill>
+              </a:rPr>
+              <a:pPr/>
+              <a:t>14.01.2010</a:t>
             </a:fld>
-            <a:endParaRPr lang="fr-FR"/>
+            <a:endParaRPr lang="fr-FR">
+              <a:solidFill>
+                <a:schemeClr val="tx1">
+                  <a:lumMod val="65000"/>
+                  <a:lumOff val="35000"/>
+                </a:schemeClr>
+              </a:solidFill>
+            </a:endParaRPr>
           </a:p>
         </p:txBody>
       </p:sp>
@@ -9378,16 +10690,35 @@
             <p:ph type="ftr" sz="quarter" idx="11"/>
           </p:nvPr>
         </p:nvSpPr>
-        <p:spPr/>
+        <p:spPr>
+          <a:xfrm>
+            <a:off x="3124200" y="6384972"/>
+            <a:ext cx="2895600" cy="476250"/>
+          </a:xfrm>
+        </p:spPr>
         <p:txBody>
           <a:bodyPr/>
           <a:lstStyle/>
           <a:p>
             <a:r>
-              <a:rPr lang="fr-FR" smtClean="0"/>
+              <a:rPr lang="fr-FR" smtClean="0">
+                <a:solidFill>
+                  <a:schemeClr val="tx1">
+                    <a:lumMod val="65000"/>
+                    <a:lumOff val="35000"/>
+                  </a:schemeClr>
+                </a:solidFill>
+              </a:rPr>
               <a:t>ADO - PPZ - LFH</a:t>
             </a:r>
-            <a:endParaRPr lang="fr-FR"/>
+            <a:endParaRPr lang="fr-FR">
+              <a:solidFill>
+                <a:schemeClr val="tx1">
+                  <a:lumMod val="65000"/>
+                  <a:lumOff val="35000"/>
+                </a:schemeClr>
+              </a:solidFill>
+            </a:endParaRPr>
           </a:p>
         </p:txBody>
       </p:sp>

</xml_diff>

<commit_message>
~ Modification du PowerPoint. Fin de mes slides.
</commit_message>
<xml_diff>
--- a/documents/presentation.pptx
+++ b/documents/presentation.pptx
@@ -234,7 +234,7 @@
             <a:fld id="{D761A794-15E8-4C19-9429-90557F78B1C8}" type="datetimeFigureOut">
               <a:rPr lang="fr-FR" smtClean="0"/>
               <a:pPr/>
-              <a:t>14/01/2010</a:t>
+              <a:t>17/01/2010</a:t>
             </a:fld>
             <a:endParaRPr lang="fr-CH"/>
           </a:p>
@@ -714,7 +714,7 @@
             <a:fld id="{1FD82F67-3604-455A-AA94-463E3F4A9835}" type="datetime1">
               <a:rPr lang="fr-CH" smtClean="0"/>
               <a:pPr/>
-              <a:t>14.01.2010</a:t>
+              <a:t>17.01.2010</a:t>
             </a:fld>
             <a:endParaRPr lang="fr-FR"/>
           </a:p>
@@ -900,7 +900,7 @@
             <a:fld id="{55B3CD59-5DD5-41C3-B883-761C206A7252}" type="datetime1">
               <a:rPr lang="fr-CH" smtClean="0"/>
               <a:pPr/>
-              <a:t>14.01.2010</a:t>
+              <a:t>17.01.2010</a:t>
             </a:fld>
             <a:endParaRPr lang="fr-FR"/>
           </a:p>
@@ -1096,7 +1096,7 @@
             <a:fld id="{3B04A12F-0005-45B2-8940-F8EFEAD0E451}" type="datetime1">
               <a:rPr lang="fr-CH" smtClean="0"/>
               <a:pPr/>
-              <a:t>14.01.2010</a:t>
+              <a:t>17.01.2010</a:t>
             </a:fld>
             <a:endParaRPr lang="fr-FR"/>
           </a:p>
@@ -1411,7 +1411,7 @@
             <a:fld id="{529FBE9A-CF7D-433F-8346-C0E52BDADA61}" type="datetime1">
               <a:rPr lang="fr-CH" smtClean="0"/>
               <a:pPr/>
-              <a:t>14.01.2010</a:t>
+              <a:t>17.01.2010</a:t>
             </a:fld>
             <a:endParaRPr lang="fr-FR"/>
           </a:p>
@@ -1594,7 +1594,7 @@
             <a:fld id="{FE683641-4180-4030-9871-18F1FE65C087}" type="datetime1">
               <a:rPr lang="fr-CH" smtClean="0"/>
               <a:pPr/>
-              <a:t>14.01.2010</a:t>
+              <a:t>17.01.2010</a:t>
             </a:fld>
             <a:endParaRPr lang="fr-FR"/>
           </a:p>
@@ -1790,7 +1790,7 @@
             <a:fld id="{DE3EECC3-BAC3-4A29-8636-7743FF9A3806}" type="datetime1">
               <a:rPr lang="fr-CH" smtClean="0"/>
               <a:pPr/>
-              <a:t>14.01.2010</a:t>
+              <a:t>17.01.2010</a:t>
             </a:fld>
             <a:endParaRPr lang="fr-FR"/>
           </a:p>
@@ -1998,7 +1998,7 @@
             <a:fld id="{F154968F-2762-4F3B-BC70-F7C39B89A9B8}" type="datetime1">
               <a:rPr lang="fr-CH" smtClean="0"/>
               <a:pPr/>
-              <a:t>14.01.2010</a:t>
+              <a:t>17.01.2010</a:t>
             </a:fld>
             <a:endParaRPr lang="fr-FR"/>
           </a:p>
@@ -2302,7 +2302,7 @@
             <a:fld id="{05BFEB41-E5CB-4CD1-9B55-92701C8EBC84}" type="datetime1">
               <a:rPr lang="fr-CH" smtClean="0"/>
               <a:pPr/>
-              <a:t>14.01.2010</a:t>
+              <a:t>17.01.2010</a:t>
             </a:fld>
             <a:endParaRPr lang="fr-FR"/>
           </a:p>
@@ -2740,7 +2740,7 @@
             <a:fld id="{2F6C9831-039A-4F5C-8AD2-A3AB876185B4}" type="datetime1">
               <a:rPr lang="fr-CH" smtClean="0"/>
               <a:pPr/>
-              <a:t>14.01.2010</a:t>
+              <a:t>17.01.2010</a:t>
             </a:fld>
             <a:endParaRPr lang="fr-FR"/>
           </a:p>
@@ -2874,7 +2874,7 @@
             <a:fld id="{DFFDC1B0-BD04-46D2-99EE-B853352D89B2}" type="datetime1">
               <a:rPr lang="fr-CH" smtClean="0"/>
               <a:pPr/>
-              <a:t>14.01.2010</a:t>
+              <a:t>17.01.2010</a:t>
             </a:fld>
             <a:endParaRPr lang="fr-FR"/>
           </a:p>
@@ -2985,7 +2985,7 @@
             <a:fld id="{0EE68050-7145-4A91-894E-A242682B636F}" type="datetime1">
               <a:rPr lang="fr-CH" smtClean="0"/>
               <a:pPr/>
-              <a:t>14.01.2010</a:t>
+              <a:t>17.01.2010</a:t>
             </a:fld>
             <a:endParaRPr lang="fr-FR"/>
           </a:p>
@@ -3278,7 +3278,7 @@
             <a:fld id="{3A01947D-F275-402E-B528-25DF2F067B3A}" type="datetime1">
               <a:rPr lang="fr-CH" smtClean="0"/>
               <a:pPr/>
-              <a:t>14.01.2010</a:t>
+              <a:t>17.01.2010</a:t>
             </a:fld>
             <a:endParaRPr lang="fr-FR"/>
           </a:p>
@@ -3547,7 +3547,7 @@
             <a:fld id="{99628070-4574-4C78-8FCC-ABF8CA883542}" type="datetime1">
               <a:rPr lang="fr-CH" smtClean="0"/>
               <a:pPr/>
-              <a:t>14.01.2010</a:t>
+              <a:t>17.01.2010</a:t>
             </a:fld>
             <a:endParaRPr lang="fr-FR"/>
           </a:p>
@@ -3800,7 +3800,7 @@
             <a:fld id="{0EBF62BA-94E3-4FC8-A8F1-27E713C8C858}" type="datetime1">
               <a:rPr lang="fr-CH" smtClean="0"/>
               <a:pPr/>
-              <a:t>14.01.2010</a:t>
+              <a:t>17.01.2010</a:t>
             </a:fld>
             <a:endParaRPr lang="fr-FR"/>
           </a:p>
@@ -5087,7 +5087,7 @@
                 </a:solidFill>
               </a:rPr>
               <a:pPr/>
-              <a:t>14.01.2010</a:t>
+              <a:t>17.01.2010</a:t>
             </a:fld>
             <a:endParaRPr lang="fr-FR" dirty="0">
               <a:solidFill>
@@ -5197,9 +5197,6 @@
               </a:rPr>
               <a:t>Objectifs atteints</a:t>
             </a:r>
-            <a:endParaRPr lang="fr-FR" u="none" dirty="0" smtClean="0">
-              <a:latin typeface="Trebuchet MS" pitchFamily="34" charset="0"/>
-            </a:endParaRPr>
           </a:p>
           <a:p>
             <a:pPr marL="342900" indent="-342900">
@@ -5932,7 +5929,7 @@
                 </a:solidFill>
               </a:rPr>
               <a:pPr/>
-              <a:t>14.01.2010</a:t>
+              <a:t>17.01.2010</a:t>
             </a:fld>
             <a:endParaRPr lang="fr-FR" dirty="0">
               <a:solidFill>
@@ -7110,7 +7107,7 @@
                 </a:solidFill>
               </a:rPr>
               <a:pPr/>
-              <a:t>14.01.2010</a:t>
+              <a:t>17.01.2010</a:t>
             </a:fld>
             <a:endParaRPr lang="fr-FR">
               <a:solidFill>
@@ -7556,7 +7553,7 @@
                 </a:solidFill>
               </a:rPr>
               <a:pPr/>
-              <a:t>14.01.2010</a:t>
+              <a:t>17.01.2010</a:t>
             </a:fld>
             <a:endParaRPr lang="fr-FR" dirty="0">
               <a:solidFill>
@@ -7621,7 +7618,7 @@
         </p:nvSpPr>
         <p:spPr bwMode="auto">
           <a:xfrm>
-            <a:off x="2271681" y="1493811"/>
+            <a:off x="1189059" y="1457298"/>
             <a:ext cx="4953000" cy="4662815"/>
           </a:xfrm>
           <a:prstGeom prst="rect">
@@ -7817,9 +7814,6 @@
               </a:rPr>
               <a:t>Présentation du jeu</a:t>
             </a:r>
-            <a:endParaRPr lang="fr-FR" u="none" dirty="0" smtClean="0">
-              <a:latin typeface="Trebuchet MS" pitchFamily="34" charset="0"/>
-            </a:endParaRPr>
           </a:p>
           <a:p>
             <a:pPr marL="342900" indent="-342900">
@@ -7834,12 +7828,35 @@
               </a:rPr>
               <a:t>Questions</a:t>
             </a:r>
-            <a:endParaRPr lang="fr-FR" u="none" dirty="0" smtClean="0">
-              <a:latin typeface="Trebuchet MS" pitchFamily="34" charset="0"/>
-            </a:endParaRPr>
-          </a:p>
-        </p:txBody>
-      </p:sp>
+          </a:p>
+        </p:txBody>
+      </p:sp>
+      <p:pic>
+        <p:nvPicPr>
+          <p:cNvPr id="11" name="Picture 2" descr="C:\Documents and Settings\Administrateur\Bureau\verifier-des-taches-todo-ecrivez-icone-4160-128.png"/>
+          <p:cNvPicPr>
+            <a:picLocks noChangeAspect="1" noChangeArrowheads="1"/>
+          </p:cNvPicPr>
+          <p:nvPr/>
+        </p:nvPicPr>
+        <p:blipFill>
+          <a:blip r:embed="rId2" cstate="print"/>
+          <a:srcRect/>
+          <a:stretch>
+            <a:fillRect/>
+          </a:stretch>
+        </p:blipFill>
+        <p:spPr bwMode="auto">
+          <a:xfrm>
+            <a:off x="5813442" y="3721104"/>
+            <a:ext cx="1898676" cy="1898676"/>
+          </a:xfrm>
+          <a:prstGeom prst="rect">
+            <a:avLst/>
+          </a:prstGeom>
+          <a:noFill/>
+        </p:spPr>
+      </p:pic>
     </p:spTree>
   </p:cSld>
   <p:clrMapOvr>
@@ -8234,7 +8251,7 @@
                 </a:solidFill>
               </a:rPr>
               <a:pPr/>
-              <a:t>14.01.2010</a:t>
+              <a:t>17.01.2010</a:t>
             </a:fld>
             <a:endParaRPr lang="fr-FR" dirty="0">
               <a:solidFill>
@@ -8291,14 +8308,14 @@
       </p:sp>
       <p:sp>
         <p:nvSpPr>
-          <p:cNvPr id="10" name="ZoneTexte 9"/>
+          <p:cNvPr id="11" name="ZoneTexte 10"/>
           <p:cNvSpPr txBox="1"/>
           <p:nvPr/>
         </p:nvSpPr>
         <p:spPr>
           <a:xfrm>
-            <a:off x="2209800" y="1676400"/>
-            <a:ext cx="5791200" cy="923330"/>
+            <a:off x="1322344" y="1676376"/>
+            <a:ext cx="2057448" cy="369332"/>
           </a:xfrm>
           <a:prstGeom prst="rect">
             <a:avLst/>
@@ -8311,22 +8328,455 @@
           </a:bodyPr>
           <a:lstStyle/>
           <a:p>
-            <a:pPr marL="342900" indent="-342900"/>
-            <a:r>
-              <a:rPr lang="fr-CH" u="none" dirty="0" smtClean="0"/>
-              <a:t>Répartition des tâches</a:t>
-            </a:r>
-          </a:p>
-          <a:p>
-            <a:pPr marL="342900" indent="-342900"/>
-            <a:endParaRPr lang="fr-CH" u="none" dirty="0"/>
-          </a:p>
-          <a:p>
-            <a:pPr marL="342900" indent="-342900"/>
-            <a:endParaRPr lang="fr-CH" u="none" dirty="0" smtClean="0"/>
-          </a:p>
-        </p:txBody>
-      </p:sp>
+            <a:pPr>
+              <a:buFont typeface="Arial" pitchFamily="34" charset="0"/>
+              <a:buChar char="•"/>
+            </a:pPr>
+            <a:r>
+              <a:rPr lang="fr-CH" b="1" u="none" dirty="0" smtClean="0"/>
+              <a:t>  Participants</a:t>
+            </a:r>
+            <a:endParaRPr lang="fr-CH" b="1" u="none" dirty="0"/>
+          </a:p>
+        </p:txBody>
+      </p:sp>
+      <p:sp>
+        <p:nvSpPr>
+          <p:cNvPr id="15" name="ZoneTexte 14"/>
+          <p:cNvSpPr txBox="1"/>
+          <p:nvPr/>
+        </p:nvSpPr>
+        <p:spPr>
+          <a:xfrm>
+            <a:off x="4368841" y="1578990"/>
+            <a:ext cx="3781434" cy="1338828"/>
+          </a:xfrm>
+          <a:prstGeom prst="rect">
+            <a:avLst/>
+          </a:prstGeom>
+          <a:noFill/>
+        </p:spPr>
+        <p:txBody>
+          <a:bodyPr wrap="square" rtlCol="0">
+            <a:spAutoFit/>
+          </a:bodyPr>
+          <a:lstStyle/>
+          <a:p>
+            <a:pPr>
+              <a:lnSpc>
+                <a:spcPct val="150000"/>
+              </a:lnSpc>
+            </a:pPr>
+            <a:r>
+              <a:rPr lang="es-ES" u="none" dirty="0" err="1" smtClean="0"/>
+              <a:t>Aurélien</a:t>
+            </a:r>
+            <a:r>
+              <a:rPr lang="es-ES" u="none" dirty="0" smtClean="0"/>
+              <a:t> </a:t>
+            </a:r>
+            <a:r>
+              <a:rPr lang="es-ES" u="none" dirty="0" smtClean="0"/>
+              <a:t>Da Campo</a:t>
+            </a:r>
+          </a:p>
+          <a:p>
+            <a:pPr>
+              <a:lnSpc>
+                <a:spcPct val="150000"/>
+              </a:lnSpc>
+            </a:pPr>
+            <a:r>
+              <a:rPr lang="es-ES" u="none" dirty="0" smtClean="0"/>
+              <a:t>Pierre -Dominique </a:t>
+            </a:r>
+            <a:r>
+              <a:rPr lang="es-ES" u="none" dirty="0" err="1" smtClean="0"/>
+              <a:t>Putallaz</a:t>
+            </a:r>
+            <a:endParaRPr lang="es-ES" u="none" dirty="0" smtClean="0"/>
+          </a:p>
+          <a:p>
+            <a:pPr>
+              <a:lnSpc>
+                <a:spcPct val="150000"/>
+              </a:lnSpc>
+            </a:pPr>
+            <a:r>
+              <a:rPr lang="es-ES" u="none" dirty="0" smtClean="0"/>
+              <a:t>Lazhar </a:t>
+            </a:r>
+            <a:r>
+              <a:rPr lang="es-ES" u="none" dirty="0" smtClean="0"/>
+              <a:t>Farjallah (Chef de </a:t>
+            </a:r>
+            <a:r>
+              <a:rPr lang="es-ES" u="none" dirty="0" err="1" smtClean="0"/>
+              <a:t>projet</a:t>
+            </a:r>
+            <a:r>
+              <a:rPr lang="es-ES" u="none" dirty="0" smtClean="0"/>
+              <a:t>)</a:t>
+            </a:r>
+            <a:endParaRPr lang="es-ES" u="none" dirty="0" smtClean="0"/>
+          </a:p>
+        </p:txBody>
+      </p:sp>
+      <p:sp>
+        <p:nvSpPr>
+          <p:cNvPr id="16" name="ZoneTexte 15"/>
+          <p:cNvSpPr txBox="1"/>
+          <p:nvPr/>
+        </p:nvSpPr>
+        <p:spPr>
+          <a:xfrm>
+            <a:off x="1322343" y="3258588"/>
+            <a:ext cx="3046498" cy="369332"/>
+          </a:xfrm>
+          <a:prstGeom prst="rect">
+            <a:avLst/>
+          </a:prstGeom>
+          <a:noFill/>
+        </p:spPr>
+        <p:txBody>
+          <a:bodyPr wrap="square" rtlCol="0">
+            <a:spAutoFit/>
+          </a:bodyPr>
+          <a:lstStyle/>
+          <a:p>
+            <a:pPr>
+              <a:buFont typeface="Arial" pitchFamily="34" charset="0"/>
+              <a:buChar char="•"/>
+            </a:pPr>
+            <a:r>
+              <a:rPr lang="fr-CH" b="1" u="none" dirty="0" smtClean="0"/>
+              <a:t>  Répartition des tâches</a:t>
+            </a:r>
+            <a:endParaRPr lang="fr-CH" b="1" u="none" dirty="0"/>
+          </a:p>
+        </p:txBody>
+      </p:sp>
+      <p:sp>
+        <p:nvSpPr>
+          <p:cNvPr id="17" name="ZoneTexte 16"/>
+          <p:cNvSpPr txBox="1"/>
+          <p:nvPr/>
+        </p:nvSpPr>
+        <p:spPr>
+          <a:xfrm>
+            <a:off x="4368841" y="3171707"/>
+            <a:ext cx="3781434" cy="1754326"/>
+          </a:xfrm>
+          <a:prstGeom prst="rect">
+            <a:avLst/>
+          </a:prstGeom>
+          <a:noFill/>
+        </p:spPr>
+        <p:txBody>
+          <a:bodyPr wrap="square" rtlCol="0">
+            <a:spAutoFit/>
+          </a:bodyPr>
+          <a:lstStyle/>
+          <a:p>
+            <a:pPr>
+              <a:lnSpc>
+                <a:spcPct val="150000"/>
+              </a:lnSpc>
+            </a:pPr>
+            <a:r>
+              <a:rPr lang="es-ES" u="none" dirty="0" smtClean="0"/>
+              <a:t>Interface </a:t>
+            </a:r>
+            <a:r>
+              <a:rPr lang="es-ES" u="none" dirty="0" err="1" smtClean="0"/>
+              <a:t>graphique</a:t>
+            </a:r>
+            <a:endParaRPr lang="es-ES" u="none" dirty="0" smtClean="0"/>
+          </a:p>
+          <a:p>
+            <a:pPr>
+              <a:lnSpc>
+                <a:spcPct val="150000"/>
+              </a:lnSpc>
+            </a:pPr>
+            <a:r>
+              <a:rPr lang="es-ES" u="none" dirty="0" err="1" smtClean="0"/>
+              <a:t>Algorithmique</a:t>
+            </a:r>
+            <a:endParaRPr lang="es-ES" u="none" dirty="0" smtClean="0"/>
+          </a:p>
+          <a:p>
+            <a:pPr>
+              <a:lnSpc>
+                <a:spcPct val="150000"/>
+              </a:lnSpc>
+            </a:pPr>
+            <a:r>
+              <a:rPr lang="es-ES" u="none" dirty="0" err="1" smtClean="0"/>
+              <a:t>Rédaction</a:t>
+            </a:r>
+            <a:r>
+              <a:rPr lang="es-ES" u="none" dirty="0" smtClean="0"/>
+              <a:t>, </a:t>
+            </a:r>
+            <a:r>
+              <a:rPr lang="es-ES" u="none" dirty="0" err="1" smtClean="0"/>
+              <a:t>suivi</a:t>
+            </a:r>
+            <a:r>
+              <a:rPr lang="es-ES" u="none" dirty="0" smtClean="0"/>
+              <a:t>, </a:t>
+            </a:r>
+            <a:r>
+              <a:rPr lang="es-ES" u="none" dirty="0" err="1" smtClean="0"/>
+              <a:t>développement</a:t>
+            </a:r>
+            <a:endParaRPr lang="es-ES" u="none" dirty="0" smtClean="0"/>
+          </a:p>
+          <a:p>
+            <a:pPr>
+              <a:lnSpc>
+                <a:spcPct val="150000"/>
+              </a:lnSpc>
+            </a:pPr>
+            <a:endParaRPr lang="es-ES" u="none" dirty="0" smtClean="0"/>
+          </a:p>
+        </p:txBody>
+      </p:sp>
+      <p:sp>
+        <p:nvSpPr>
+          <p:cNvPr id="18" name="ZoneTexte 17"/>
+          <p:cNvSpPr txBox="1"/>
+          <p:nvPr/>
+        </p:nvSpPr>
+        <p:spPr>
+          <a:xfrm>
+            <a:off x="1322343" y="4705253"/>
+            <a:ext cx="3046498" cy="369332"/>
+          </a:xfrm>
+          <a:prstGeom prst="rect">
+            <a:avLst/>
+          </a:prstGeom>
+          <a:noFill/>
+        </p:spPr>
+        <p:txBody>
+          <a:bodyPr wrap="square" rtlCol="0">
+            <a:spAutoFit/>
+          </a:bodyPr>
+          <a:lstStyle/>
+          <a:p>
+            <a:pPr>
+              <a:buFont typeface="Arial" pitchFamily="34" charset="0"/>
+              <a:buChar char="•"/>
+            </a:pPr>
+            <a:r>
+              <a:rPr lang="fr-CH" b="1" u="none" dirty="0" smtClean="0"/>
+              <a:t>  Objectifs</a:t>
+            </a:r>
+            <a:endParaRPr lang="fr-CH" b="1" u="none" dirty="0"/>
+          </a:p>
+        </p:txBody>
+      </p:sp>
+      <p:sp>
+        <p:nvSpPr>
+          <p:cNvPr id="19" name="ZoneTexte 18"/>
+          <p:cNvSpPr txBox="1"/>
+          <p:nvPr/>
+        </p:nvSpPr>
+        <p:spPr>
+          <a:xfrm>
+            <a:off x="4368840" y="4609569"/>
+            <a:ext cx="4365643" cy="1338828"/>
+          </a:xfrm>
+          <a:prstGeom prst="rect">
+            <a:avLst/>
+          </a:prstGeom>
+          <a:noFill/>
+        </p:spPr>
+        <p:txBody>
+          <a:bodyPr wrap="square" rtlCol="0">
+            <a:spAutoFit/>
+          </a:bodyPr>
+          <a:lstStyle/>
+          <a:p>
+            <a:pPr>
+              <a:lnSpc>
+                <a:spcPct val="150000"/>
+              </a:lnSpc>
+            </a:pPr>
+            <a:r>
+              <a:rPr lang="es-ES" u="none" dirty="0" err="1" smtClean="0"/>
+              <a:t>Illustrer</a:t>
+            </a:r>
+            <a:r>
+              <a:rPr lang="es-ES" u="none" dirty="0" smtClean="0"/>
+              <a:t> les </a:t>
+            </a:r>
+            <a:r>
+              <a:rPr lang="es-ES" u="none" dirty="0" err="1" smtClean="0"/>
+              <a:t>graphes</a:t>
+            </a:r>
+            <a:r>
+              <a:rPr lang="es-ES" u="none" dirty="0" smtClean="0"/>
+              <a:t>; </a:t>
+            </a:r>
+            <a:r>
+              <a:rPr lang="es-ES" u="none" dirty="0" err="1" smtClean="0"/>
+              <a:t>utiliser</a:t>
+            </a:r>
+            <a:r>
+              <a:rPr lang="es-ES" u="none" dirty="0" smtClean="0"/>
+              <a:t> les </a:t>
+            </a:r>
+            <a:r>
+              <a:rPr lang="es-ES" u="none" dirty="0" err="1" smtClean="0"/>
+              <a:t>algorithmes</a:t>
+            </a:r>
+            <a:r>
+              <a:rPr lang="es-ES" u="none" dirty="0" smtClean="0"/>
+              <a:t> du </a:t>
+            </a:r>
+            <a:r>
+              <a:rPr lang="es-ES" u="none" dirty="0" err="1" smtClean="0"/>
+              <a:t>cours</a:t>
+            </a:r>
+            <a:r>
+              <a:rPr lang="es-ES" u="none" dirty="0" smtClean="0"/>
+              <a:t>; </a:t>
+            </a:r>
+            <a:r>
+              <a:rPr lang="es-ES" u="none" dirty="0" err="1" smtClean="0"/>
+              <a:t>librairies</a:t>
+            </a:r>
+            <a:r>
+              <a:rPr lang="es-ES" u="none" dirty="0" smtClean="0"/>
+              <a:t> externes; </a:t>
+            </a:r>
+            <a:r>
+              <a:rPr lang="es-ES" u="none" dirty="0" err="1" smtClean="0"/>
+              <a:t>design</a:t>
+            </a:r>
+            <a:r>
+              <a:rPr lang="es-ES" u="none" dirty="0" smtClean="0"/>
+              <a:t> </a:t>
+            </a:r>
+            <a:r>
+              <a:rPr lang="es-ES" u="none" dirty="0" err="1" smtClean="0"/>
+              <a:t>pattern</a:t>
+            </a:r>
+            <a:r>
+              <a:rPr lang="es-ES" u="none" dirty="0" smtClean="0"/>
+              <a:t> MVC </a:t>
+            </a:r>
+            <a:endParaRPr lang="es-ES" u="none" dirty="0" smtClean="0"/>
+          </a:p>
+        </p:txBody>
+      </p:sp>
+      <p:pic>
+        <p:nvPicPr>
+          <p:cNvPr id="20" name="Picture 11" descr="C:\Documents and Settings\Administrateur\Bureau\images\communautaires-aide-icone-8333-128.png"/>
+          <p:cNvPicPr>
+            <a:picLocks noChangeAspect="1" noChangeArrowheads="1"/>
+          </p:cNvPicPr>
+          <p:nvPr/>
+        </p:nvPicPr>
+        <p:blipFill>
+          <a:blip r:embed="rId2" cstate="print"/>
+          <a:srcRect/>
+          <a:stretch>
+            <a:fillRect/>
+          </a:stretch>
+        </p:blipFill>
+        <p:spPr bwMode="auto">
+          <a:xfrm>
+            <a:off x="744804" y="1603350"/>
+            <a:ext cx="468000" cy="468000"/>
+          </a:xfrm>
+          <a:prstGeom prst="rect">
+            <a:avLst/>
+          </a:prstGeom>
+          <a:ln>
+            <a:noFill/>
+          </a:ln>
+          <a:effectLst>
+            <a:outerShdw blurRad="292100" dist="139700" dir="2700000" algn="tl" rotWithShape="0">
+              <a:srgbClr val="333333">
+                <a:alpha val="65000"/>
+              </a:srgbClr>
+            </a:outerShdw>
+          </a:effectLst>
+        </p:spPr>
+      </p:pic>
+      <p:pic>
+        <p:nvPicPr>
+          <p:cNvPr id="1027" name="Picture 3" descr="C:\Documents and Settings\Administrateur\Bureau\accessoires-redacteur-en-chef-texte-icone-3655-128.png"/>
+          <p:cNvPicPr>
+            <a:picLocks noChangeAspect="1" noChangeArrowheads="1"/>
+          </p:cNvPicPr>
+          <p:nvPr/>
+        </p:nvPicPr>
+        <p:blipFill>
+          <a:blip r:embed="rId3" cstate="print"/>
+          <a:srcRect/>
+          <a:stretch>
+            <a:fillRect/>
+          </a:stretch>
+        </p:blipFill>
+        <p:spPr bwMode="auto">
+          <a:xfrm>
+            <a:off x="738135" y="3209922"/>
+            <a:ext cx="459807" cy="459807"/>
+          </a:xfrm>
+          <a:prstGeom prst="rect">
+            <a:avLst/>
+          </a:prstGeom>
+          <a:ln>
+            <a:noFill/>
+          </a:ln>
+          <a:effectLst>
+            <a:outerShdw blurRad="292100" dist="139700" dir="2700000" algn="tl" rotWithShape="0">
+              <a:srgbClr val="333333">
+                <a:alpha val="65000"/>
+              </a:srgbClr>
+            </a:outerShdw>
+          </a:effectLst>
+        </p:spPr>
+      </p:pic>
+      <p:pic>
+        <p:nvPicPr>
+          <p:cNvPr id="21" name="Picture 2" descr="C:\Documents and Settings\Administrateur\Bureau\but-icone-4271-48.png"/>
+          <p:cNvPicPr>
+            <a:picLocks noChangeAspect="1" noChangeArrowheads="1"/>
+          </p:cNvPicPr>
+          <p:nvPr/>
+        </p:nvPicPr>
+        <p:blipFill>
+          <a:blip r:embed="rId4" cstate="print"/>
+          <a:srcRect/>
+          <a:stretch>
+            <a:fillRect/>
+          </a:stretch>
+        </p:blipFill>
+        <p:spPr bwMode="auto">
+          <a:xfrm>
+            <a:off x="708291" y="4633929"/>
+            <a:ext cx="541026" cy="541026"/>
+          </a:xfrm>
+          <a:prstGeom prst="rect">
+            <a:avLst/>
+          </a:prstGeom>
+          <a:ln>
+            <a:noFill/>
+          </a:ln>
+          <a:effectLst>
+            <a:outerShdw blurRad="292100" dist="139700" dir="2700000" algn="tl" rotWithShape="0">
+              <a:srgbClr val="333333">
+                <a:alpha val="65000"/>
+              </a:srgbClr>
+            </a:outerShdw>
+          </a:effectLst>
+        </p:spPr>
+      </p:pic>
     </p:spTree>
   </p:cSld>
   <p:clrMapOvr>
@@ -8639,7 +9089,7 @@
                 </a:solidFill>
               </a:rPr>
               <a:pPr/>
-              <a:t>14.01.2010</a:t>
+              <a:t>17.01.2010</a:t>
             </a:fld>
             <a:endParaRPr lang="fr-FR">
               <a:solidFill>
@@ -8691,6 +9141,302 @@
                 </a:schemeClr>
               </a:solidFill>
             </a:endParaRPr>
+          </a:p>
+        </p:txBody>
+      </p:sp>
+      <p:pic>
+        <p:nvPicPr>
+          <p:cNvPr id="3074" name="Picture 2" descr="C:\Documents and Settings\Administrateur\Bureau\de-dialogue-question-icone-7210-128.png"/>
+          <p:cNvPicPr>
+            <a:picLocks noChangeAspect="1" noChangeArrowheads="1"/>
+          </p:cNvPicPr>
+          <p:nvPr/>
+        </p:nvPicPr>
+        <p:blipFill>
+          <a:blip r:embed="rId2" cstate="print"/>
+          <a:srcRect/>
+          <a:stretch>
+            <a:fillRect/>
+          </a:stretch>
+        </p:blipFill>
+        <p:spPr bwMode="auto">
+          <a:xfrm>
+            <a:off x="1214391" y="3359919"/>
+            <a:ext cx="1425594" cy="1425594"/>
+          </a:xfrm>
+          <a:prstGeom prst="rect">
+            <a:avLst/>
+          </a:prstGeom>
+          <a:noFill/>
+        </p:spPr>
+      </p:pic>
+      <p:sp>
+        <p:nvSpPr>
+          <p:cNvPr id="10" name="Pensées 9"/>
+          <p:cNvSpPr/>
+          <p:nvPr/>
+        </p:nvSpPr>
+        <p:spPr bwMode="auto">
+          <a:xfrm>
+            <a:off x="2318951" y="2666173"/>
+            <a:ext cx="1058054" cy="820748"/>
+          </a:xfrm>
+          <a:prstGeom prst="cloudCallout">
+            <a:avLst>
+              <a:gd name="adj1" fmla="val -44932"/>
+              <a:gd name="adj2" fmla="val 109635"/>
+            </a:avLst>
+          </a:prstGeom>
+          <a:solidFill>
+            <a:schemeClr val="bg1">
+              <a:lumMod val="85000"/>
+            </a:schemeClr>
+          </a:solidFill>
+          <a:ln w="9525" cap="flat" cmpd="sng" algn="ctr">
+            <a:solidFill>
+              <a:schemeClr val="tx1"/>
+            </a:solidFill>
+            <a:prstDash val="solid"/>
+            <a:round/>
+            <a:headEnd type="none" w="med" len="med"/>
+            <a:tailEnd type="none" w="med" len="med"/>
+          </a:ln>
+          <a:effectLst/>
+        </p:spPr>
+        <p:txBody>
+          <a:bodyPr vert="horz" wrap="square" lIns="91440" tIns="45720" rIns="91440" bIns="45720" numCol="1" rtlCol="0" anchor="t" anchorCtr="0" compatLnSpc="1">
+            <a:prstTxWarp prst="textNoShape">
+              <a:avLst/>
+            </a:prstTxWarp>
+          </a:bodyPr>
+          <a:lstStyle/>
+          <a:p>
+            <a:pPr marL="0" marR="0" indent="0" algn="l" defTabSz="914400" rtl="0" eaLnBrk="1" fontAlgn="base" latinLnBrk="0" hangingPunct="1">
+              <a:lnSpc>
+                <a:spcPct val="100000"/>
+              </a:lnSpc>
+              <a:spcBef>
+                <a:spcPct val="0"/>
+              </a:spcBef>
+              <a:spcAft>
+                <a:spcPct val="0"/>
+              </a:spcAft>
+              <a:buClrTx/>
+              <a:buSzTx/>
+              <a:buFontTx/>
+              <a:buNone/>
+              <a:tabLst/>
+            </a:pPr>
+            <a:endParaRPr kumimoji="0" lang="fr-CH" sz="1400" b="0" i="0" u="none" strike="noStrike" cap="none" normalizeH="0" baseline="0" dirty="0" smtClean="0">
+              <a:ln>
+                <a:noFill/>
+              </a:ln>
+              <a:solidFill>
+                <a:schemeClr val="tx1"/>
+              </a:solidFill>
+              <a:effectLst/>
+              <a:latin typeface="Arial" charset="0"/>
+            </a:endParaRPr>
+          </a:p>
+        </p:txBody>
+      </p:sp>
+      <p:sp>
+        <p:nvSpPr>
+          <p:cNvPr id="11" name="ZoneTexte 10"/>
+          <p:cNvSpPr txBox="1"/>
+          <p:nvPr/>
+        </p:nvSpPr>
+        <p:spPr>
+          <a:xfrm>
+            <a:off x="2382807" y="2948312"/>
+            <a:ext cx="1168416" cy="261610"/>
+          </a:xfrm>
+          <a:prstGeom prst="rect">
+            <a:avLst/>
+          </a:prstGeom>
+          <a:noFill/>
+        </p:spPr>
+        <p:txBody>
+          <a:bodyPr wrap="square" rtlCol="0">
+            <a:spAutoFit/>
+          </a:bodyPr>
+          <a:lstStyle/>
+          <a:p>
+            <a:r>
+              <a:rPr lang="fr-CH" sz="1100" u="none" dirty="0" err="1" smtClean="0"/>
+              <a:t>Tower</a:t>
+            </a:r>
+            <a:r>
+              <a:rPr lang="fr-CH" sz="1100" u="none" dirty="0" smtClean="0"/>
+              <a:t> </a:t>
+            </a:r>
+            <a:r>
+              <a:rPr lang="fr-CH" sz="1100" u="none" dirty="0" smtClean="0"/>
+              <a:t>q</a:t>
+            </a:r>
+            <a:r>
+              <a:rPr lang="fr-CH" sz="1100" u="none" dirty="0" smtClean="0"/>
+              <a:t>uoi?</a:t>
+            </a:r>
+            <a:endParaRPr lang="fr-CH" sz="1100" u="none" dirty="0"/>
+          </a:p>
+        </p:txBody>
+      </p:sp>
+      <p:sp>
+        <p:nvSpPr>
+          <p:cNvPr id="12" name="ZoneTexte 11"/>
+          <p:cNvSpPr txBox="1"/>
+          <p:nvPr/>
+        </p:nvSpPr>
+        <p:spPr>
+          <a:xfrm>
+            <a:off x="4660108" y="1492785"/>
+            <a:ext cx="3786183" cy="4247317"/>
+          </a:xfrm>
+          <a:prstGeom prst="rect">
+            <a:avLst/>
+          </a:prstGeom>
+          <a:noFill/>
+        </p:spPr>
+        <p:txBody>
+          <a:bodyPr wrap="square" rtlCol="0">
+            <a:spAutoFit/>
+          </a:bodyPr>
+          <a:lstStyle/>
+          <a:p>
+            <a:pPr>
+              <a:lnSpc>
+                <a:spcPct val="250000"/>
+              </a:lnSpc>
+              <a:buFont typeface="Arial" pitchFamily="34" charset="0"/>
+              <a:buChar char="•"/>
+            </a:pPr>
+            <a:r>
+              <a:rPr lang="fr-CH" u="none" dirty="0" smtClean="0"/>
+              <a:t> </a:t>
+            </a:r>
+            <a:r>
+              <a:rPr lang="fr-CH" u="none" dirty="0" smtClean="0"/>
+              <a:t> Bref historique</a:t>
+            </a:r>
+          </a:p>
+          <a:p>
+            <a:pPr>
+              <a:lnSpc>
+                <a:spcPct val="250000"/>
+              </a:lnSpc>
+              <a:buFont typeface="Arial" pitchFamily="34" charset="0"/>
+              <a:buChar char="•"/>
+            </a:pPr>
+            <a:r>
+              <a:rPr lang="fr-CH" u="none" dirty="0" smtClean="0"/>
+              <a:t>  But du jeu</a:t>
+            </a:r>
+          </a:p>
+          <a:p>
+            <a:pPr>
+              <a:lnSpc>
+                <a:spcPct val="250000"/>
+              </a:lnSpc>
+              <a:buFont typeface="Arial" pitchFamily="34" charset="0"/>
+              <a:buChar char="•"/>
+            </a:pPr>
+            <a:r>
+              <a:rPr lang="fr-CH" u="none" dirty="0" smtClean="0"/>
+              <a:t> </a:t>
+            </a:r>
+            <a:r>
+              <a:rPr lang="fr-CH" u="none" dirty="0" smtClean="0"/>
+              <a:t> Les tours (ou </a:t>
+            </a:r>
+            <a:r>
+              <a:rPr lang="fr-CH" i="1" u="none" dirty="0" smtClean="0"/>
+              <a:t>« </a:t>
+            </a:r>
+            <a:r>
+              <a:rPr lang="fr-CH" i="1" u="none" dirty="0" err="1" smtClean="0"/>
+              <a:t>towers</a:t>
+            </a:r>
+            <a:r>
+              <a:rPr lang="fr-CH" i="1" u="none" dirty="0" smtClean="0"/>
+              <a:t> »</a:t>
+            </a:r>
+            <a:r>
+              <a:rPr lang="fr-CH" u="none" dirty="0" smtClean="0"/>
+              <a:t>)</a:t>
+            </a:r>
+          </a:p>
+          <a:p>
+            <a:pPr>
+              <a:lnSpc>
+                <a:spcPct val="250000"/>
+              </a:lnSpc>
+              <a:buFont typeface="Arial" pitchFamily="34" charset="0"/>
+              <a:buChar char="•"/>
+            </a:pPr>
+            <a:r>
+              <a:rPr lang="fr-CH" u="none" dirty="0" smtClean="0"/>
+              <a:t> </a:t>
+            </a:r>
+            <a:r>
+              <a:rPr lang="fr-CH" u="none" dirty="0" smtClean="0"/>
+              <a:t> Les créatures (</a:t>
+            </a:r>
+            <a:r>
+              <a:rPr lang="fr-CH" i="1" u="none" dirty="0" smtClean="0"/>
+              <a:t>ou « mobs »</a:t>
+            </a:r>
+            <a:r>
+              <a:rPr lang="fr-CH" u="none" dirty="0" smtClean="0"/>
+              <a:t>)</a:t>
+            </a:r>
+          </a:p>
+          <a:p>
+            <a:pPr>
+              <a:lnSpc>
+                <a:spcPct val="250000"/>
+              </a:lnSpc>
+              <a:buFont typeface="Arial" pitchFamily="34" charset="0"/>
+              <a:buChar char="•"/>
+            </a:pPr>
+            <a:r>
+              <a:rPr lang="fr-CH" u="none" dirty="0" smtClean="0"/>
+              <a:t> </a:t>
+            </a:r>
+            <a:r>
+              <a:rPr lang="fr-CH" u="none" dirty="0" smtClean="0"/>
+              <a:t> Les techniques</a:t>
+            </a:r>
+          </a:p>
+          <a:p>
+            <a:pPr>
+              <a:lnSpc>
+                <a:spcPct val="250000"/>
+              </a:lnSpc>
+              <a:buFont typeface="Arial" pitchFamily="34" charset="0"/>
+              <a:buChar char="•"/>
+            </a:pPr>
+            <a:r>
+              <a:rPr lang="fr-CH" u="none" dirty="0" smtClean="0"/>
+              <a:t> </a:t>
+            </a:r>
+            <a:r>
+              <a:rPr lang="fr-CH" u="none" dirty="0" smtClean="0"/>
+              <a:t> Autres </a:t>
+            </a:r>
+            <a:r>
+              <a:rPr lang="fr-CH" i="1" u="none" dirty="0" err="1" smtClean="0"/>
+              <a:t>Tower</a:t>
+            </a:r>
+            <a:r>
+              <a:rPr lang="fr-CH" i="1" u="none" dirty="0" smtClean="0"/>
+              <a:t> </a:t>
+            </a:r>
+            <a:r>
+              <a:rPr lang="fr-CH" i="1" u="none" dirty="0" err="1" smtClean="0"/>
+              <a:t>Defenses</a:t>
+            </a:r>
+            <a:endParaRPr lang="fr-CH" i="1" u="none" dirty="0"/>
           </a:p>
         </p:txBody>
       </p:sp>
@@ -8816,21 +9562,7 @@
                 </a:effectLst>
                 <a:latin typeface="Trebuchet MS" pitchFamily="34" charset="0"/>
               </a:rPr>
-              <a:t>CONCEPTS </a:t>
-            </a:r>
-            <a:r>
-              <a:rPr lang="fr-FR" sz="2000" b="1" u="none" dirty="0" smtClean="0">
-                <a:solidFill>
-                  <a:schemeClr val="bg1"/>
-                </a:solidFill>
-                <a:effectLst>
-                  <a:outerShdw blurRad="38100" dist="38100" dir="2700000" algn="tl">
-                    <a:srgbClr val="C0C0C0"/>
-                  </a:outerShdw>
-                </a:effectLst>
-                <a:latin typeface="Trebuchet MS" pitchFamily="34" charset="0"/>
-              </a:rPr>
-              <a:t>ALGORITHMIQUES [PIERRE-DO]</a:t>
+              <a:t>CONCEPTS ALGORITHMIQUES [PIERRE-DO]</a:t>
             </a:r>
             <a:endParaRPr lang="fr-FR" sz="2000" b="1" u="none" dirty="0">
               <a:solidFill>
@@ -9020,7 +9752,7 @@
                 </a:solidFill>
               </a:rPr>
               <a:pPr/>
-              <a:t>14.01.2010</a:t>
+              <a:t>17.01.2010</a:t>
             </a:fld>
             <a:endParaRPr lang="fr-FR">
               <a:solidFill>
@@ -9401,7 +10133,7 @@
                 </a:solidFill>
               </a:rPr>
               <a:pPr/>
-              <a:t>14.01.2010</a:t>
+              <a:t>17.01.2010</a:t>
             </a:fld>
             <a:endParaRPr lang="fr-FR">
               <a:solidFill>
@@ -9500,21 +10232,7 @@
                 </a:effectLst>
                 <a:latin typeface="Trebuchet MS" pitchFamily="34" charset="0"/>
               </a:rPr>
-              <a:t>GRAPHE ET ALGORITHME </a:t>
-            </a:r>
-            <a:r>
-              <a:rPr lang="fr-FR" sz="2000" b="1" u="none" dirty="0" smtClean="0">
-                <a:solidFill>
-                  <a:schemeClr val="bg1"/>
-                </a:solidFill>
-                <a:effectLst>
-                  <a:outerShdw blurRad="38100" dist="38100" dir="2700000" algn="tl">
-                    <a:srgbClr val="C0C0C0"/>
-                  </a:outerShdw>
-                </a:effectLst>
-                <a:latin typeface="Trebuchet MS" pitchFamily="34" charset="0"/>
-              </a:rPr>
-              <a:t>ACPC (DIJKSTRA) [PIERRE-DO]</a:t>
+              <a:t>GRAPHE ET ALGORITHME ACPC (DIJKSTRA) [PIERRE-DO]</a:t>
             </a:r>
             <a:endParaRPr lang="fr-FR" sz="2000" b="1" u="none" dirty="0">
               <a:solidFill>
@@ -9782,7 +10500,7 @@
                 </a:solidFill>
               </a:rPr>
               <a:pPr/>
-              <a:t>14.01.2010</a:t>
+              <a:t>17.01.2010</a:t>
             </a:fld>
             <a:endParaRPr lang="fr-FR">
               <a:solidFill>
@@ -9881,21 +10599,7 @@
                 </a:effectLst>
                 <a:latin typeface="Trebuchet MS" pitchFamily="34" charset="0"/>
               </a:rPr>
-              <a:t>MAILLAGE </a:t>
-            </a:r>
-            <a:r>
-              <a:rPr lang="fr-FR" sz="2000" b="1" u="none" dirty="0" smtClean="0">
-                <a:solidFill>
-                  <a:schemeClr val="bg1"/>
-                </a:solidFill>
-                <a:effectLst>
-                  <a:outerShdw blurRad="38100" dist="38100" dir="2700000" algn="tl">
-                    <a:srgbClr val="C0C0C0"/>
-                  </a:outerShdw>
-                </a:effectLst>
-                <a:latin typeface="Trebuchet MS" pitchFamily="34" charset="0"/>
-              </a:rPr>
-              <a:t>DYNAMIQUE [PIERRE-DO]</a:t>
+              <a:t>MAILLAGE DYNAMIQUE [PIERRE-DO]</a:t>
             </a:r>
             <a:endParaRPr lang="fr-FR" sz="2000" b="1" u="none" dirty="0">
               <a:solidFill>
@@ -10163,7 +10867,7 @@
                 </a:solidFill>
               </a:rPr>
               <a:pPr/>
-              <a:t>14.01.2010</a:t>
+              <a:t>17.01.2010</a:t>
             </a:fld>
             <a:endParaRPr lang="fr-FR">
               <a:solidFill>
@@ -10262,21 +10966,7 @@
                 </a:effectLst>
                 <a:latin typeface="Trebuchet MS" pitchFamily="34" charset="0"/>
               </a:rPr>
-              <a:t>MODELE </a:t>
-            </a:r>
-            <a:r>
-              <a:rPr lang="fr-FR" sz="2000" b="1" u="none" dirty="0" smtClean="0">
-                <a:solidFill>
-                  <a:schemeClr val="bg1"/>
-                </a:solidFill>
-                <a:effectLst>
-                  <a:outerShdw blurRad="38100" dist="38100" dir="2700000" algn="tl">
-                    <a:srgbClr val="C0C0C0"/>
-                  </a:outerShdw>
-                </a:effectLst>
-                <a:latin typeface="Trebuchet MS" pitchFamily="34" charset="0"/>
-              </a:rPr>
-              <a:t>MVC [AURELIEN]</a:t>
+              <a:t>MODELE MVC [AURELIEN]</a:t>
             </a:r>
             <a:endParaRPr lang="fr-FR" sz="2000" b="1" u="none" dirty="0">
               <a:solidFill>
@@ -10553,21 +11243,7 @@
                 </a:effectLst>
                 <a:latin typeface="Trebuchet MS" pitchFamily="34" charset="0"/>
               </a:rPr>
-              <a:t>STRUCTURE DU </a:t>
-            </a:r>
-            <a:r>
-              <a:rPr lang="fr-CH" sz="2000" b="1" u="none" dirty="0" smtClean="0">
-                <a:solidFill>
-                  <a:schemeClr val="bg1"/>
-                </a:solidFill>
-                <a:effectLst>
-                  <a:outerShdw blurRad="38100" dist="38100" dir="2700000" algn="tl">
-                    <a:srgbClr val="C0C0C0"/>
-                  </a:outerShdw>
-                </a:effectLst>
-                <a:latin typeface="Trebuchet MS" pitchFamily="34" charset="0"/>
-              </a:rPr>
-              <a:t>CODE [AURELIEN]</a:t>
+              <a:t>STRUCTURE DU CODE [AURELIEN]</a:t>
             </a:r>
             <a:endParaRPr lang="fr-FR" sz="2000" b="1" u="none" dirty="0">
               <a:solidFill>
@@ -10667,7 +11343,7 @@
                 </a:solidFill>
               </a:rPr>
               <a:pPr/>
-              <a:t>14.01.2010</a:t>
+              <a:t>17.01.2010</a:t>
             </a:fld>
             <a:endParaRPr lang="fr-FR">
               <a:solidFill>

</xml_diff>

<commit_message>
Fin de mes slides
</commit_message>
<xml_diff>
--- a/documents/presentation.pptx
+++ b/documents/presentation.pptx
@@ -967,7 +967,7 @@
         <a:p>
           <a:r>
             <a:rPr lang="fr-CH" dirty="0" smtClean="0"/>
-            <a:t>Maillage</a:t>
+            <a:t>Graphe</a:t>
           </a:r>
           <a:endParaRPr lang="fr-CH" dirty="0"/>
         </a:p>
@@ -1080,6 +1080,13 @@
         </dgm:presLayoutVars>
       </dgm:prSet>
       <dgm:spPr/>
+      <dgm:t>
+        <a:bodyPr/>
+        <a:lstStyle/>
+        <a:p>
+          <a:endParaRPr lang="fr-CH"/>
+        </a:p>
+      </dgm:t>
     </dgm:pt>
     <dgm:pt modelId="{2A8147CC-483C-42DD-8065-9F64F5AA4446}" type="pres">
       <dgm:prSet presAssocID="{EC67C51C-2E21-4800-A04E-39504433E3CE}" presName="vertOne" presStyleCnt="0"/>
@@ -1146,6 +1153,13 @@
         </dgm:presLayoutVars>
       </dgm:prSet>
       <dgm:spPr/>
+      <dgm:t>
+        <a:bodyPr/>
+        <a:lstStyle/>
+        <a:p>
+          <a:endParaRPr lang="fr-CH"/>
+        </a:p>
+      </dgm:t>
     </dgm:pt>
     <dgm:pt modelId="{D1813550-2E07-4FF2-B4DE-9D9763C7C425}" type="pres">
       <dgm:prSet presAssocID="{90CADE53-B192-4AAE-BED5-36EB581619C5}" presName="horzThree" presStyleCnt="0"/>
@@ -1166,6 +1180,13 @@
         </dgm:presLayoutVars>
       </dgm:prSet>
       <dgm:spPr/>
+      <dgm:t>
+        <a:bodyPr/>
+        <a:lstStyle/>
+        <a:p>
+          <a:endParaRPr lang="fr-CH"/>
+        </a:p>
+      </dgm:t>
     </dgm:pt>
     <dgm:pt modelId="{D101CE0E-0D31-43B7-AAF9-48C4A1D1B5C7}" type="pres">
       <dgm:prSet presAssocID="{124BD719-1FAB-4AF2-99EF-85E2B6A01D1F}" presName="horzThree" presStyleCnt="0"/>
@@ -1173,15 +1194,15 @@
     </dgm:pt>
   </dgm:ptLst>
   <dgm:cxnLst>
+    <dgm:cxn modelId="{D3BCC33A-2D7B-4E24-BABF-7F60C591E7D9}" srcId="{1472A273-CA92-469C-9505-C150B6F56774}" destId="{90CADE53-B192-4AAE-BED5-36EB581619C5}" srcOrd="0" destOrd="0" parTransId="{E92C8218-DE58-439F-8772-715BE18AE8AC}" sibTransId="{D2019058-02BE-48FF-AB07-272A3BA5C7DB}"/>
     <dgm:cxn modelId="{657F085E-9942-4A64-A86A-B1246726F41C}" type="presOf" srcId="{124BD719-1FAB-4AF2-99EF-85E2B6A01D1F}" destId="{23788942-B951-42C9-A181-D2D34262AF3B}" srcOrd="0" destOrd="0" presId="urn:microsoft.com/office/officeart/2005/8/layout/hierarchy4"/>
+    <dgm:cxn modelId="{89BC57FA-AE10-482F-927F-71A8D556A19E}" srcId="{039ECC2C-7749-4EFF-9017-2771A9E53934}" destId="{EC67C51C-2E21-4800-A04E-39504433E3CE}" srcOrd="0" destOrd="0" parTransId="{C1FB9566-B4E8-4DCE-AA97-C86B1060BCA8}" sibTransId="{0FEF8533-E849-4364-84C8-3F62C15EBE3F}"/>
+    <dgm:cxn modelId="{EB811B70-8E2D-44FE-92B9-8C27C1CDB080}" type="presOf" srcId="{1472A273-CA92-469C-9505-C150B6F56774}" destId="{80215751-409B-4988-A436-B358FBA1052E}" srcOrd="0" destOrd="0" presId="urn:microsoft.com/office/officeart/2005/8/layout/hierarchy4"/>
+    <dgm:cxn modelId="{7703D9C7-FD49-4123-85A9-5B14F944AD2A}" srcId="{1472A273-CA92-469C-9505-C150B6F56774}" destId="{124BD719-1FAB-4AF2-99EF-85E2B6A01D1F}" srcOrd="1" destOrd="0" parTransId="{80709401-ACB8-48D0-8A81-60AA27C59D14}" sibTransId="{DAB5BDF0-7940-4913-A7DC-025BC823385F}"/>
+    <dgm:cxn modelId="{A90410F8-B3A1-4B16-B600-E6C6395327BE}" type="presOf" srcId="{EC67C51C-2E21-4800-A04E-39504433E3CE}" destId="{470D3EA4-1484-4E8B-8647-42FEE815609D}" srcOrd="0" destOrd="0" presId="urn:microsoft.com/office/officeart/2005/8/layout/hierarchy4"/>
     <dgm:cxn modelId="{1C06BC75-856D-4D44-97D8-A8932F914CC7}" type="presOf" srcId="{90CADE53-B192-4AAE-BED5-36EB581619C5}" destId="{5AFE3CD8-342E-49ED-A2B7-C727E61913F6}" srcOrd="0" destOrd="0" presId="urn:microsoft.com/office/officeart/2005/8/layout/hierarchy4"/>
-    <dgm:cxn modelId="{7703D9C7-FD49-4123-85A9-5B14F944AD2A}" srcId="{1472A273-CA92-469C-9505-C150B6F56774}" destId="{124BD719-1FAB-4AF2-99EF-85E2B6A01D1F}" srcOrd="1" destOrd="0" parTransId="{80709401-ACB8-48D0-8A81-60AA27C59D14}" sibTransId="{DAB5BDF0-7940-4913-A7DC-025BC823385F}"/>
-    <dgm:cxn modelId="{89BC57FA-AE10-482F-927F-71A8D556A19E}" srcId="{039ECC2C-7749-4EFF-9017-2771A9E53934}" destId="{EC67C51C-2E21-4800-A04E-39504433E3CE}" srcOrd="0" destOrd="0" parTransId="{C1FB9566-B4E8-4DCE-AA97-C86B1060BCA8}" sibTransId="{0FEF8533-E849-4364-84C8-3F62C15EBE3F}"/>
+    <dgm:cxn modelId="{3F9F2067-1FE7-4E78-8B69-DB5540F4B3FE}" srcId="{EC67C51C-2E21-4800-A04E-39504433E3CE}" destId="{1472A273-CA92-469C-9505-C150B6F56774}" srcOrd="0" destOrd="0" parTransId="{17F06AE8-5589-4E05-8B1A-55E0A3EF5811}" sibTransId="{60AC5C1C-844A-4377-9E87-98CBB6779E2C}"/>
     <dgm:cxn modelId="{3B962616-047D-4C68-8DFA-1B0C1FC1AB1A}" type="presOf" srcId="{039ECC2C-7749-4EFF-9017-2771A9E53934}" destId="{4FB47F87-36CB-4205-AA60-DBA75FA52CEA}" srcOrd="0" destOrd="0" presId="urn:microsoft.com/office/officeart/2005/8/layout/hierarchy4"/>
-    <dgm:cxn modelId="{EB811B70-8E2D-44FE-92B9-8C27C1CDB080}" type="presOf" srcId="{1472A273-CA92-469C-9505-C150B6F56774}" destId="{80215751-409B-4988-A436-B358FBA1052E}" srcOrd="0" destOrd="0" presId="urn:microsoft.com/office/officeart/2005/8/layout/hierarchy4"/>
-    <dgm:cxn modelId="{3F9F2067-1FE7-4E78-8B69-DB5540F4B3FE}" srcId="{EC67C51C-2E21-4800-A04E-39504433E3CE}" destId="{1472A273-CA92-469C-9505-C150B6F56774}" srcOrd="0" destOrd="0" parTransId="{17F06AE8-5589-4E05-8B1A-55E0A3EF5811}" sibTransId="{60AC5C1C-844A-4377-9E87-98CBB6779E2C}"/>
-    <dgm:cxn modelId="{A90410F8-B3A1-4B16-B600-E6C6395327BE}" type="presOf" srcId="{EC67C51C-2E21-4800-A04E-39504433E3CE}" destId="{470D3EA4-1484-4E8B-8647-42FEE815609D}" srcOrd="0" destOrd="0" presId="urn:microsoft.com/office/officeart/2005/8/layout/hierarchy4"/>
-    <dgm:cxn modelId="{D3BCC33A-2D7B-4E24-BABF-7F60C591E7D9}" srcId="{1472A273-CA92-469C-9505-C150B6F56774}" destId="{90CADE53-B192-4AAE-BED5-36EB581619C5}" srcOrd="0" destOrd="0" parTransId="{E92C8218-DE58-439F-8772-715BE18AE8AC}" sibTransId="{D2019058-02BE-48FF-AB07-272A3BA5C7DB}"/>
     <dgm:cxn modelId="{7B9DA742-F807-4C9A-8B8D-25B0B94CA8A1}" type="presParOf" srcId="{4FB47F87-36CB-4205-AA60-DBA75FA52CEA}" destId="{2A8147CC-483C-42DD-8065-9F64F5AA4446}" srcOrd="0" destOrd="0" presId="urn:microsoft.com/office/officeart/2005/8/layout/hierarchy4"/>
     <dgm:cxn modelId="{252A1B45-733F-41E1-9D3B-6B1D93CDEF06}" type="presParOf" srcId="{2A8147CC-483C-42DD-8065-9F64F5AA4446}" destId="{470D3EA4-1484-4E8B-8647-42FEE815609D}" srcOrd="0" destOrd="0" presId="urn:microsoft.com/office/officeart/2005/8/layout/hierarchy4"/>
     <dgm:cxn modelId="{BC766A5C-D6F6-4554-BB5C-4DFD814893E3}" type="presParOf" srcId="{2A8147CC-483C-42DD-8065-9F64F5AA4446}" destId="{7FA670C5-8011-46C5-83DA-AF76AE5A6102}" srcOrd="1" destOrd="0" presId="urn:microsoft.com/office/officeart/2005/8/layout/hierarchy4"/>
@@ -1428,7 +1449,7 @@
           </a:pPr>
           <a:r>
             <a:rPr lang="fr-CH" sz="5900" kern="1200" dirty="0" smtClean="0"/>
-            <a:t>Maillage</a:t>
+            <a:t>Graphe</a:t>
           </a:r>
           <a:endParaRPr lang="fr-CH" sz="5900" kern="1200" dirty="0"/>
         </a:p>
@@ -3329,7 +3350,7 @@
             <a:fld id="{D761A794-15E8-4C19-9429-90557F78B1C8}" type="datetimeFigureOut">
               <a:rPr lang="fr-FR" smtClean="0"/>
               <a:pPr/>
-              <a:t>17/01/2010</a:t>
+              <a:t>19/01/2010</a:t>
             </a:fld>
             <a:endParaRPr lang="fr-CH"/>
           </a:p>
@@ -3891,7 +3912,7 @@
             <a:fld id="{1FD82F67-3604-455A-AA94-463E3F4A9835}" type="datetime1">
               <a:rPr lang="fr-CH" smtClean="0"/>
               <a:pPr/>
-              <a:t>17.01.2010</a:t>
+              <a:t>19.01.2010</a:t>
             </a:fld>
             <a:endParaRPr lang="fr-FR"/>
           </a:p>
@@ -4077,7 +4098,7 @@
             <a:fld id="{55B3CD59-5DD5-41C3-B883-761C206A7252}" type="datetime1">
               <a:rPr lang="fr-CH" smtClean="0"/>
               <a:pPr/>
-              <a:t>17.01.2010</a:t>
+              <a:t>19.01.2010</a:t>
             </a:fld>
             <a:endParaRPr lang="fr-FR"/>
           </a:p>
@@ -4273,7 +4294,7 @@
             <a:fld id="{3B04A12F-0005-45B2-8940-F8EFEAD0E451}" type="datetime1">
               <a:rPr lang="fr-CH" smtClean="0"/>
               <a:pPr/>
-              <a:t>17.01.2010</a:t>
+              <a:t>19.01.2010</a:t>
             </a:fld>
             <a:endParaRPr lang="fr-FR"/>
           </a:p>
@@ -4588,7 +4609,7 @@
             <a:fld id="{529FBE9A-CF7D-433F-8346-C0E52BDADA61}" type="datetime1">
               <a:rPr lang="fr-CH" smtClean="0"/>
               <a:pPr/>
-              <a:t>17.01.2010</a:t>
+              <a:t>19.01.2010</a:t>
             </a:fld>
             <a:endParaRPr lang="fr-FR"/>
           </a:p>
@@ -4771,7 +4792,7 @@
             <a:fld id="{FE683641-4180-4030-9871-18F1FE65C087}" type="datetime1">
               <a:rPr lang="fr-CH" smtClean="0"/>
               <a:pPr/>
-              <a:t>17.01.2010</a:t>
+              <a:t>19.01.2010</a:t>
             </a:fld>
             <a:endParaRPr lang="fr-FR"/>
           </a:p>
@@ -4967,7 +4988,7 @@
             <a:fld id="{DE3EECC3-BAC3-4A29-8636-7743FF9A3806}" type="datetime1">
               <a:rPr lang="fr-CH" smtClean="0"/>
               <a:pPr/>
-              <a:t>17.01.2010</a:t>
+              <a:t>19.01.2010</a:t>
             </a:fld>
             <a:endParaRPr lang="fr-FR"/>
           </a:p>
@@ -5175,7 +5196,7 @@
             <a:fld id="{F154968F-2762-4F3B-BC70-F7C39B89A9B8}" type="datetime1">
               <a:rPr lang="fr-CH" smtClean="0"/>
               <a:pPr/>
-              <a:t>17.01.2010</a:t>
+              <a:t>19.01.2010</a:t>
             </a:fld>
             <a:endParaRPr lang="fr-FR"/>
           </a:p>
@@ -5479,7 +5500,7 @@
             <a:fld id="{05BFEB41-E5CB-4CD1-9B55-92701C8EBC84}" type="datetime1">
               <a:rPr lang="fr-CH" smtClean="0"/>
               <a:pPr/>
-              <a:t>17.01.2010</a:t>
+              <a:t>19.01.2010</a:t>
             </a:fld>
             <a:endParaRPr lang="fr-FR"/>
           </a:p>
@@ -5917,7 +5938,7 @@
             <a:fld id="{2F6C9831-039A-4F5C-8AD2-A3AB876185B4}" type="datetime1">
               <a:rPr lang="fr-CH" smtClean="0"/>
               <a:pPr/>
-              <a:t>17.01.2010</a:t>
+              <a:t>19.01.2010</a:t>
             </a:fld>
             <a:endParaRPr lang="fr-FR"/>
           </a:p>
@@ -6051,7 +6072,7 @@
             <a:fld id="{DFFDC1B0-BD04-46D2-99EE-B853352D89B2}" type="datetime1">
               <a:rPr lang="fr-CH" smtClean="0"/>
               <a:pPr/>
-              <a:t>17.01.2010</a:t>
+              <a:t>19.01.2010</a:t>
             </a:fld>
             <a:endParaRPr lang="fr-FR"/>
           </a:p>
@@ -6162,7 +6183,7 @@
             <a:fld id="{0EE68050-7145-4A91-894E-A242682B636F}" type="datetime1">
               <a:rPr lang="fr-CH" smtClean="0"/>
               <a:pPr/>
-              <a:t>17.01.2010</a:t>
+              <a:t>19.01.2010</a:t>
             </a:fld>
             <a:endParaRPr lang="fr-FR"/>
           </a:p>
@@ -6455,7 +6476,7 @@
             <a:fld id="{3A01947D-F275-402E-B528-25DF2F067B3A}" type="datetime1">
               <a:rPr lang="fr-CH" smtClean="0"/>
               <a:pPr/>
-              <a:t>17.01.2010</a:t>
+              <a:t>19.01.2010</a:t>
             </a:fld>
             <a:endParaRPr lang="fr-FR"/>
           </a:p>
@@ -6724,7 +6745,7 @@
             <a:fld id="{99628070-4574-4C78-8FCC-ABF8CA883542}" type="datetime1">
               <a:rPr lang="fr-CH" smtClean="0"/>
               <a:pPr/>
-              <a:t>17.01.2010</a:t>
+              <a:t>19.01.2010</a:t>
             </a:fld>
             <a:endParaRPr lang="fr-FR"/>
           </a:p>
@@ -6977,7 +6998,7 @@
             <a:fld id="{0EBF62BA-94E3-4FC8-A8F1-27E713C8C858}" type="datetime1">
               <a:rPr lang="fr-CH" smtClean="0"/>
               <a:pPr/>
-              <a:t>17.01.2010</a:t>
+              <a:t>19.01.2010</a:t>
             </a:fld>
             <a:endParaRPr lang="fr-FR"/>
           </a:p>
@@ -8232,7 +8253,7 @@
                   </a:schemeClr>
                 </a:solidFill>
               </a:rPr>
-              <a:t>/11</a:t>
+              <a:t>/13</a:t>
             </a:r>
             <a:endParaRPr lang="fr-FR" dirty="0">
               <a:solidFill>
@@ -8275,7 +8296,7 @@
                 </a:solidFill>
               </a:rPr>
               <a:pPr/>
-              <a:t>17.01.2010</a:t>
+              <a:t>19.01.2010</a:t>
             </a:fld>
             <a:endParaRPr lang="fr-FR">
               <a:solidFill>
@@ -8629,7 +8650,7 @@
               <a:t>11</a:t>
             </a:fld>
             <a:r>
-              <a:rPr lang="fr-FR" dirty="0" smtClean="0">
+              <a:rPr lang="fr-FR" smtClean="0">
                 <a:solidFill>
                   <a:schemeClr val="tx1">
                     <a:lumMod val="65000"/>
@@ -8637,7 +8658,7 @@
                   </a:schemeClr>
                 </a:solidFill>
               </a:rPr>
-              <a:t>/11</a:t>
+              <a:t>/13</a:t>
             </a:r>
             <a:endParaRPr lang="fr-FR" dirty="0">
               <a:solidFill>
@@ -8680,7 +8701,7 @@
                 </a:solidFill>
               </a:rPr>
               <a:pPr/>
-              <a:t>17.01.2010</a:t>
+              <a:t>19.01.2010</a:t>
             </a:fld>
             <a:endParaRPr lang="fr-FR" dirty="0">
               <a:solidFill>
@@ -9522,7 +9543,7 @@
                 </a:solidFill>
               </a:rPr>
               <a:pPr/>
-              <a:t>17.01.2010</a:t>
+              <a:t>19.01.2010</a:t>
             </a:fld>
             <a:endParaRPr lang="fr-FR" dirty="0">
               <a:solidFill>
@@ -10657,7 +10678,7 @@
                   </a:schemeClr>
                 </a:solidFill>
               </a:rPr>
-              <a:t>/11</a:t>
+              <a:t>/13</a:t>
             </a:r>
             <a:endParaRPr lang="fr-FR" dirty="0">
               <a:solidFill>
@@ -10700,7 +10721,7 @@
                 </a:solidFill>
               </a:rPr>
               <a:pPr/>
-              <a:t>17.01.2010</a:t>
+              <a:t>19.01.2010</a:t>
             </a:fld>
             <a:endParaRPr lang="fr-FR">
               <a:solidFill>
@@ -11103,7 +11124,7 @@
                   </a:schemeClr>
                 </a:solidFill>
               </a:rPr>
-              <a:t>/11</a:t>
+              <a:t>/13</a:t>
             </a:r>
             <a:endParaRPr lang="fr-FR" dirty="0">
               <a:solidFill>
@@ -11146,7 +11167,7 @@
                 </a:solidFill>
               </a:rPr>
               <a:pPr/>
-              <a:t>17.01.2010</a:t>
+              <a:t>19.01.2010</a:t>
             </a:fld>
             <a:endParaRPr lang="fr-FR" dirty="0">
               <a:solidFill>
@@ -11801,7 +11822,7 @@
                   </a:schemeClr>
                 </a:solidFill>
               </a:rPr>
-              <a:t>/11</a:t>
+              <a:t>/13</a:t>
             </a:r>
             <a:endParaRPr lang="fr-FR" dirty="0">
               <a:solidFill>
@@ -11844,7 +11865,7 @@
                 </a:solidFill>
               </a:rPr>
               <a:pPr/>
-              <a:t>17.01.2010</a:t>
+              <a:t>19.01.2010</a:t>
             </a:fld>
             <a:endParaRPr lang="fr-FR" dirty="0">
               <a:solidFill>
@@ -12629,7 +12650,7 @@
                   </a:schemeClr>
                 </a:solidFill>
               </a:rPr>
-              <a:t>/11</a:t>
+              <a:t>/13</a:t>
             </a:r>
             <a:endParaRPr lang="fr-FR" dirty="0">
               <a:solidFill>
@@ -12672,7 +12693,7 @@
                 </a:solidFill>
               </a:rPr>
               <a:pPr/>
-              <a:t>17.01.2010</a:t>
+              <a:t>19.01.2010</a:t>
             </a:fld>
             <a:endParaRPr lang="fr-FR">
               <a:solidFill>
@@ -13117,7 +13138,21 @@
                 </a:effectLst>
                 <a:latin typeface="Trebuchet MS" pitchFamily="34" charset="0"/>
               </a:rPr>
-              <a:t>CONCEPTS ALGORITHMIQUES [PIERRE-DO]</a:t>
+              <a:t>CONCEPTS </a:t>
+            </a:r>
+            <a:r>
+              <a:rPr lang="fr-FR" sz="2000" b="1" u="none" dirty="0" smtClean="0">
+                <a:solidFill>
+                  <a:schemeClr val="bg1"/>
+                </a:solidFill>
+                <a:effectLst>
+                  <a:outerShdw blurRad="38100" dist="38100" dir="2700000" algn="tl">
+                    <a:srgbClr val="C0C0C0"/>
+                  </a:outerShdw>
+                </a:effectLst>
+                <a:latin typeface="Trebuchet MS" pitchFamily="34" charset="0"/>
+              </a:rPr>
+              <a:t>ALGORITHMIQUES</a:t>
             </a:r>
             <a:endParaRPr lang="fr-FR" sz="2000" b="1" u="none" dirty="0">
               <a:solidFill>
@@ -13264,7 +13299,7 @@
                   </a:schemeClr>
                 </a:solidFill>
               </a:rPr>
-              <a:t>/11</a:t>
+              <a:t>/13</a:t>
             </a:r>
             <a:endParaRPr lang="fr-FR" dirty="0">
               <a:solidFill>
@@ -13307,7 +13342,7 @@
                 </a:solidFill>
               </a:rPr>
               <a:pPr/>
-              <a:t>17.01.2010</a:t>
+              <a:t>19.01.2010</a:t>
             </a:fld>
             <a:endParaRPr lang="fr-FR">
               <a:solidFill>
@@ -13370,8 +13405,8 @@
         </p:nvSpPr>
         <p:spPr>
           <a:xfrm>
-            <a:off x="2057400" y="2286000"/>
-            <a:ext cx="5410200" cy="923330"/>
+            <a:off x="226953" y="1580070"/>
+            <a:ext cx="4783203" cy="3877985"/>
           </a:xfrm>
           <a:prstGeom prst="rect">
             <a:avLst/>
@@ -13385,6 +13420,9 @@
           <a:lstStyle/>
           <a:p>
             <a:pPr>
+              <a:spcAft>
+                <a:spcPts val="1200"/>
+              </a:spcAft>
               <a:buFont typeface="Arial" pitchFamily="34" charset="0"/>
               <a:buChar char="•"/>
             </a:pPr>
@@ -13394,37 +13432,69 @@
             </a:r>
             <a:r>
               <a:rPr lang="fr-CH" u="none" dirty="0" smtClean="0"/>
-              <a:t>Graphe et algorithme ACPC (</a:t>
-            </a:r>
-            <a:r>
-              <a:rPr lang="fr-CH" u="none" dirty="0" err="1" smtClean="0"/>
-              <a:t>Dijkstra</a:t>
+              <a:t>Concepts algorithmiques utilisés pour mettre en œuvre </a:t>
+            </a:r>
+            <a:r>
+              <a:rPr lang="fr-CH" b="1" u="none" dirty="0" smtClean="0"/>
+              <a:t>les aspects techniques </a:t>
             </a:r>
             <a:r>
               <a:rPr lang="fr-CH" u="none" dirty="0" smtClean="0"/>
-              <a:t>)</a:t>
-            </a:r>
+              <a:t>du projet.</a:t>
+            </a:r>
+            <a:endParaRPr lang="fr-CH" u="none" dirty="0" smtClean="0"/>
           </a:p>
           <a:p>
             <a:pPr>
+              <a:spcAft>
+                <a:spcPts val="1200"/>
+              </a:spcAft>
               <a:buFont typeface="Arial" pitchFamily="34" charset="0"/>
               <a:buChar char="•"/>
             </a:pPr>
             <a:r>
               <a:rPr lang="fr-CH" u="none" dirty="0" smtClean="0"/>
-              <a:t> Génération </a:t>
+              <a:t> </a:t>
             </a:r>
             <a:r>
               <a:rPr lang="fr-CH" u="none" dirty="0" smtClean="0"/>
-              <a:t>de </a:t>
+              <a:t>Algorithmes </a:t>
+            </a:r>
+            <a:r>
+              <a:rPr lang="fr-CH" b="1" u="none" dirty="0" smtClean="0"/>
+              <a:t>connus</a:t>
             </a:r>
             <a:r>
               <a:rPr lang="fr-CH" u="none" dirty="0" smtClean="0"/>
-              <a:t>valeurs</a:t>
-            </a:r>
+              <a:t> (</a:t>
+            </a:r>
+            <a:r>
+              <a:rPr lang="fr-CH" u="none" dirty="0" err="1" smtClean="0"/>
+              <a:t>Dijkstra</a:t>
+            </a:r>
+            <a:r>
+              <a:rPr lang="fr-CH" u="none" dirty="0" smtClean="0"/>
+              <a:t>, tri fusion, </a:t>
+            </a:r>
+            <a:r>
+              <a:rPr lang="fr-CH" u="none" dirty="0" err="1" smtClean="0"/>
+              <a:t>etc</a:t>
+            </a:r>
+            <a:r>
+              <a:rPr lang="fr-CH" u="none" dirty="0" smtClean="0"/>
+              <a:t>…</a:t>
+            </a:r>
+            <a:r>
+              <a:rPr lang="fr-CH" u="none" dirty="0" smtClean="0"/>
+              <a:t>)</a:t>
+            </a:r>
+            <a:endParaRPr lang="fr-CH" u="none" dirty="0" smtClean="0"/>
           </a:p>
           <a:p>
             <a:pPr>
+              <a:spcAft>
+                <a:spcPts val="1200"/>
+              </a:spcAft>
               <a:buFont typeface="Arial" pitchFamily="34" charset="0"/>
               <a:buChar char="•"/>
             </a:pPr>
@@ -13434,9 +13504,125 @@
             </a:r>
             <a:r>
               <a:rPr lang="fr-CH" u="none" dirty="0" smtClean="0"/>
-              <a:t>Généralités</a:t>
+              <a:t>Algorithmes </a:t>
+            </a:r>
+            <a:r>
+              <a:rPr lang="fr-CH" b="1" u="none" dirty="0" smtClean="0"/>
+              <a:t>inventés</a:t>
+            </a:r>
+            <a:r>
+              <a:rPr lang="fr-CH" u="none" dirty="0" smtClean="0"/>
+              <a:t> </a:t>
+            </a:r>
+            <a:r>
+              <a:rPr lang="fr-CH" u="none" dirty="0" smtClean="0"/>
+              <a:t>(Génération des valeurs relatives au jeu, comme la vie des créature, le prix des tours, les </a:t>
+            </a:r>
+            <a:r>
+              <a:rPr lang="fr-CH" u="none" dirty="0" err="1" smtClean="0"/>
+              <a:t>dégats</a:t>
+            </a:r>
+            <a:r>
+              <a:rPr lang="fr-CH" u="none" dirty="0" smtClean="0"/>
+              <a:t>, </a:t>
+            </a:r>
+            <a:r>
+              <a:rPr lang="fr-CH" u="none" dirty="0" err="1" smtClean="0"/>
+              <a:t>etc</a:t>
+            </a:r>
+            <a:r>
+              <a:rPr lang="fr-CH" u="none" dirty="0" smtClean="0"/>
+              <a:t>…)</a:t>
+            </a:r>
+          </a:p>
+          <a:p>
+            <a:pPr>
+              <a:spcAft>
+                <a:spcPts val="1200"/>
+              </a:spcAft>
+              <a:buFont typeface="Arial" pitchFamily="34" charset="0"/>
+              <a:buChar char="•"/>
+            </a:pPr>
+            <a:r>
+              <a:rPr lang="fr-CH" u="none" dirty="0" smtClean="0"/>
+              <a:t> </a:t>
+            </a:r>
+            <a:r>
+              <a:rPr lang="fr-CH" u="none" dirty="0" smtClean="0"/>
+              <a:t>Structure mise en place dans l’optique d’utiliser un algorithme défini au </a:t>
+            </a:r>
+            <a:r>
+              <a:rPr lang="fr-CH" b="1" u="none" dirty="0" smtClean="0"/>
+              <a:t>préalable</a:t>
+            </a:r>
+            <a:r>
+              <a:rPr lang="fr-CH" u="none" dirty="0" smtClean="0"/>
+              <a:t>, couplé avec une structure de donnée </a:t>
+            </a:r>
+            <a:r>
+              <a:rPr lang="fr-CH" b="1" u="none" dirty="0" smtClean="0"/>
+              <a:t>adaptée</a:t>
+            </a:r>
+            <a:r>
+              <a:rPr lang="fr-CH" u="none" dirty="0" smtClean="0"/>
+              <a:t>.</a:t>
             </a:r>
             <a:endParaRPr lang="fr-CH" u="none" dirty="0" smtClean="0"/>
+          </a:p>
+        </p:txBody>
+      </p:sp>
+      <p:pic>
+        <p:nvPicPr>
+          <p:cNvPr id="10" name="Image 9" descr="Fonction_generation_sante.jpg"/>
+          <p:cNvPicPr>
+            <a:picLocks noChangeAspect="1"/>
+          </p:cNvPicPr>
+          <p:nvPr/>
+        </p:nvPicPr>
+        <p:blipFill>
+          <a:blip r:embed="rId2" cstate="print"/>
+          <a:stretch>
+            <a:fillRect/>
+          </a:stretch>
+        </p:blipFill>
+        <p:spPr>
+          <a:xfrm>
+            <a:off x="5010156" y="1566837"/>
+            <a:ext cx="3810000" cy="3810000"/>
+          </a:xfrm>
+          <a:prstGeom prst="rect">
+            <a:avLst/>
+          </a:prstGeom>
+        </p:spPr>
+      </p:pic>
+      <p:sp>
+        <p:nvSpPr>
+          <p:cNvPr id="11" name="ZoneTexte 10"/>
+          <p:cNvSpPr txBox="1"/>
+          <p:nvPr/>
+        </p:nvSpPr>
+        <p:spPr>
+          <a:xfrm>
+            <a:off x="5229234" y="5211834"/>
+            <a:ext cx="3590922" cy="246221"/>
+          </a:xfrm>
+          <a:prstGeom prst="rect">
+            <a:avLst/>
+          </a:prstGeom>
+          <a:noFill/>
+        </p:spPr>
+        <p:txBody>
+          <a:bodyPr wrap="square" rtlCol="0">
+            <a:spAutoFit/>
+          </a:bodyPr>
+          <a:lstStyle/>
+          <a:p>
+            <a:pPr algn="ctr"/>
+            <a:r>
+              <a:rPr lang="fr-CH" sz="1000" b="1" u="none" dirty="0" smtClean="0"/>
+              <a:t>Courbe de la vie des créature en fonction du niveau</a:t>
+            </a:r>
+            <a:endParaRPr lang="fr-CH" sz="1000" b="1" u="none" dirty="0"/>
           </a:p>
         </p:txBody>
       </p:sp>
@@ -13649,7 +13835,7 @@
                   </a:schemeClr>
                 </a:solidFill>
               </a:rPr>
-              <a:t>/11</a:t>
+              <a:t>/13</a:t>
             </a:r>
             <a:endParaRPr lang="fr-FR" dirty="0">
               <a:solidFill>
@@ -13692,7 +13878,7 @@
                 </a:solidFill>
               </a:rPr>
               <a:pPr/>
-              <a:t>17.01.2010</a:t>
+              <a:t>19.01.2010</a:t>
             </a:fld>
             <a:endParaRPr lang="fr-FR">
               <a:solidFill>
@@ -13791,7 +13977,35 @@
                 </a:effectLst>
                 <a:latin typeface="Trebuchet MS" pitchFamily="34" charset="0"/>
               </a:rPr>
-              <a:t>GRAPHE ET ALGORITHME ACPC (DIJKSTRA) [PIERRE-DO]</a:t>
+              <a:t>GRAPHE ET ALGORITHME ACPC (</a:t>
+            </a:r>
+            <a:r>
+              <a:rPr lang="fr-FR" sz="2000" b="1" u="none" dirty="0" err="1" smtClean="0">
+                <a:solidFill>
+                  <a:schemeClr val="bg1"/>
+                </a:solidFill>
+                <a:effectLst>
+                  <a:outerShdw blurRad="38100" dist="38100" dir="2700000" algn="tl">
+                    <a:srgbClr val="C0C0C0"/>
+                  </a:outerShdw>
+                </a:effectLst>
+                <a:latin typeface="Trebuchet MS" pitchFamily="34" charset="0"/>
+              </a:rPr>
+              <a:t>DIJKSTRA</a:t>
+            </a:r>
+            <a:r>
+              <a:rPr lang="fr-FR" sz="2000" b="1" u="none" dirty="0" smtClean="0">
+                <a:solidFill>
+                  <a:schemeClr val="bg1"/>
+                </a:solidFill>
+                <a:effectLst>
+                  <a:outerShdw blurRad="38100" dist="38100" dir="2700000" algn="tl">
+                    <a:srgbClr val="C0C0C0"/>
+                  </a:outerShdw>
+                </a:effectLst>
+                <a:latin typeface="Trebuchet MS" pitchFamily="34" charset="0"/>
+              </a:rPr>
+              <a:t>)</a:t>
             </a:r>
             <a:endParaRPr lang="fr-FR" sz="2000" b="1" u="none" dirty="0">
               <a:solidFill>
@@ -13809,14 +14023,190 @@
       </p:sp>
       <p:sp>
         <p:nvSpPr>
-          <p:cNvPr id="9" name="ZoneTexte 8"/>
+          <p:cNvPr id="10" name="ZoneTexte 9"/>
           <p:cNvSpPr txBox="1"/>
           <p:nvPr/>
         </p:nvSpPr>
         <p:spPr>
           <a:xfrm>
-            <a:off x="1285830" y="1775410"/>
-            <a:ext cx="2996333" cy="923330"/>
+            <a:off x="299979" y="1457298"/>
+            <a:ext cx="6253221" cy="3046988"/>
+          </a:xfrm>
+          <a:prstGeom prst="rect">
+            <a:avLst/>
+          </a:prstGeom>
+          <a:noFill/>
+        </p:spPr>
+        <p:txBody>
+          <a:bodyPr wrap="square" rtlCol="0">
+            <a:spAutoFit/>
+          </a:bodyPr>
+          <a:lstStyle/>
+          <a:p>
+            <a:pPr>
+              <a:spcAft>
+                <a:spcPts val="1200"/>
+              </a:spcAft>
+              <a:buFont typeface="Arial" pitchFamily="34" charset="0"/>
+              <a:buChar char="•"/>
+            </a:pPr>
+            <a:r>
+              <a:rPr lang="fr-CH" u="none" dirty="0" smtClean="0"/>
+              <a:t> Algorithme </a:t>
+            </a:r>
+            <a:r>
+              <a:rPr lang="fr-CH" u="none" dirty="0" err="1" smtClean="0"/>
+              <a:t>ACPC</a:t>
+            </a:r>
+            <a:r>
+              <a:rPr lang="fr-CH" u="none" dirty="0" smtClean="0"/>
+              <a:t>, également connu sous le nom </a:t>
+            </a:r>
+            <a:r>
+              <a:rPr lang="fr-CH" b="1" u="none" dirty="0" smtClean="0"/>
+              <a:t>d’Algorithme de </a:t>
+            </a:r>
+            <a:r>
+              <a:rPr lang="fr-CH" b="1" u="none" dirty="0" err="1" smtClean="0"/>
+              <a:t>Dijkstra</a:t>
+            </a:r>
+            <a:r>
+              <a:rPr lang="fr-CH" u="none" dirty="0" smtClean="0"/>
+              <a:t>.</a:t>
+            </a:r>
+          </a:p>
+          <a:p>
+            <a:pPr>
+              <a:spcAft>
+                <a:spcPts val="1200"/>
+              </a:spcAft>
+              <a:buFont typeface="Arial" pitchFamily="34" charset="0"/>
+              <a:buChar char="•"/>
+            </a:pPr>
+            <a:r>
+              <a:rPr lang="fr-CH" u="none" dirty="0" smtClean="0"/>
+              <a:t> Mis en forme par </a:t>
+            </a:r>
+            <a:r>
+              <a:rPr lang="fr-CH" u="none" dirty="0" err="1" smtClean="0"/>
+              <a:t>Edsger</a:t>
+            </a:r>
+            <a:r>
+              <a:rPr lang="fr-CH" u="none" dirty="0" smtClean="0"/>
+              <a:t> </a:t>
+            </a:r>
+            <a:r>
+              <a:rPr lang="fr-CH" u="none" dirty="0" err="1" smtClean="0"/>
+              <a:t>Dijkstra</a:t>
+            </a:r>
+            <a:r>
+              <a:rPr lang="fr-CH" u="none" dirty="0" smtClean="0"/>
+              <a:t>, mathématicien et informaticien Hollandais en </a:t>
+            </a:r>
+            <a:r>
+              <a:rPr lang="fr-CH" b="1" u="none" dirty="0" smtClean="0"/>
+              <a:t>1959</a:t>
+            </a:r>
+            <a:r>
+              <a:rPr lang="fr-CH" u="none" dirty="0" smtClean="0"/>
+              <a:t>.</a:t>
+            </a:r>
+          </a:p>
+          <a:p>
+            <a:pPr>
+              <a:spcAft>
+                <a:spcPts val="1200"/>
+              </a:spcAft>
+              <a:buFont typeface="Arial" pitchFamily="34" charset="0"/>
+              <a:buChar char="•"/>
+            </a:pPr>
+            <a:r>
+              <a:rPr lang="fr-CH" u="none" dirty="0" smtClean="0"/>
+              <a:t> Très largement rependu dans l’industrie et toutes les applications incluant des </a:t>
+            </a:r>
+            <a:r>
+              <a:rPr lang="fr-CH" b="1" u="none" dirty="0" smtClean="0"/>
+              <a:t>graphes</a:t>
+            </a:r>
+            <a:r>
+              <a:rPr lang="fr-CH" u="none" dirty="0" smtClean="0"/>
+              <a:t> (chemin le plus court d’une ville à l’autre, réseaux informatiques, </a:t>
+            </a:r>
+            <a:r>
+              <a:rPr lang="fr-CH" u="none" dirty="0" err="1" smtClean="0"/>
+              <a:t>etc</a:t>
+            </a:r>
+            <a:r>
+              <a:rPr lang="fr-CH" u="none" dirty="0" smtClean="0"/>
+              <a:t>…)</a:t>
+            </a:r>
+          </a:p>
+          <a:p>
+            <a:pPr>
+              <a:spcAft>
+                <a:spcPts val="1200"/>
+              </a:spcAft>
+              <a:buFont typeface="Arial" pitchFamily="34" charset="0"/>
+              <a:buChar char="•"/>
+            </a:pPr>
+            <a:r>
+              <a:rPr lang="fr-CH" u="none" dirty="0" smtClean="0"/>
+              <a:t> Complexité : </a:t>
+            </a:r>
+            <a:r>
+              <a:rPr lang="fr-CH" b="1" u="none" dirty="0" smtClean="0"/>
+              <a:t>O(x</a:t>
+            </a:r>
+            <a:r>
+              <a:rPr lang="fr-CH" b="1" u="none" baseline="30000" dirty="0" smtClean="0"/>
+              <a:t>2</a:t>
+            </a:r>
+            <a:r>
+              <a:rPr lang="fr-CH" b="1" u="none" dirty="0" smtClean="0"/>
+              <a:t>)</a:t>
+            </a:r>
+            <a:r>
+              <a:rPr lang="fr-CH" u="none" dirty="0" smtClean="0"/>
+              <a:t>, où x est le nombre de vertex dans le graphe.</a:t>
+            </a:r>
+            <a:endParaRPr lang="fr-CH" b="1" u="none" dirty="0" smtClean="0"/>
+          </a:p>
+        </p:txBody>
+      </p:sp>
+      <p:pic>
+        <p:nvPicPr>
+          <p:cNvPr id="11" name="Image 10" descr="150px-Edsger_Wybe_Dijkstra.jpg"/>
+          <p:cNvPicPr>
+            <a:picLocks noChangeAspect="1"/>
+          </p:cNvPicPr>
+          <p:nvPr/>
+        </p:nvPicPr>
+        <p:blipFill>
+          <a:blip r:embed="rId2" cstate="print"/>
+          <a:stretch>
+            <a:fillRect/>
+          </a:stretch>
+        </p:blipFill>
+        <p:spPr>
+          <a:xfrm>
+            <a:off x="6781800" y="1457298"/>
+            <a:ext cx="1905000" cy="2540000"/>
+          </a:xfrm>
+          <a:prstGeom prst="rect">
+            <a:avLst/>
+          </a:prstGeom>
+        </p:spPr>
+      </p:pic>
+      <p:sp>
+        <p:nvSpPr>
+          <p:cNvPr id="13" name="ZoneTexte 12"/>
+          <p:cNvSpPr txBox="1"/>
+          <p:nvPr/>
+        </p:nvSpPr>
+        <p:spPr>
+          <a:xfrm>
+            <a:off x="7054884" y="3997298"/>
+            <a:ext cx="1327608" cy="400110"/>
           </a:xfrm>
           <a:prstGeom prst="rect">
             <a:avLst/>
@@ -13829,45 +14219,100 @@
           </a:bodyPr>
           <a:lstStyle/>
           <a:p>
+            <a:pPr algn="ctr"/>
+            <a:r>
+              <a:rPr lang="fr-CH" sz="1000" b="1" u="none" dirty="0" err="1" smtClean="0"/>
+              <a:t>Edgster</a:t>
+            </a:r>
+            <a:r>
+              <a:rPr lang="fr-CH" sz="1000" b="1" u="none" dirty="0" smtClean="0"/>
+              <a:t> </a:t>
+            </a:r>
+            <a:r>
+              <a:rPr lang="fr-CH" sz="1000" b="1" u="none" dirty="0" err="1" smtClean="0"/>
+              <a:t>Dijkstra</a:t>
+            </a:r>
+            <a:endParaRPr lang="fr-CH" sz="1000" b="1" u="none" dirty="0" smtClean="0"/>
+          </a:p>
+          <a:p>
+            <a:pPr algn="ctr"/>
+            <a:r>
+              <a:rPr lang="fr-CH" sz="1000" b="1" u="none" dirty="0" smtClean="0"/>
+              <a:t>S</a:t>
+            </a:r>
+            <a:r>
+              <a:rPr lang="fr-CH" sz="1000" b="1" u="none" dirty="0" smtClean="0"/>
+              <a:t>ource : </a:t>
+            </a:r>
+            <a:r>
+              <a:rPr lang="fr-CH" sz="1000" b="1" u="none" dirty="0" err="1" smtClean="0"/>
+              <a:t>Wikipedia</a:t>
+            </a:r>
+            <a:endParaRPr lang="fr-CH" sz="1000" b="1" u="none" dirty="0"/>
+          </a:p>
+        </p:txBody>
+      </p:sp>
+      <p:sp>
+        <p:nvSpPr>
+          <p:cNvPr id="14" name="ZoneTexte 13"/>
+          <p:cNvSpPr txBox="1"/>
+          <p:nvPr/>
+        </p:nvSpPr>
+        <p:spPr>
+          <a:xfrm>
+            <a:off x="299979" y="4706955"/>
+            <a:ext cx="8544042" cy="1077218"/>
+          </a:xfrm>
+          <a:prstGeom prst="rect">
+            <a:avLst/>
+          </a:prstGeom>
+          <a:noFill/>
+        </p:spPr>
+        <p:txBody>
+          <a:bodyPr wrap="square" rtlCol="0">
+            <a:spAutoFit/>
+          </a:bodyPr>
+          <a:lstStyle/>
+          <a:p>
             <a:pPr>
+              <a:spcAft>
+                <a:spcPts val="1200"/>
+              </a:spcAft>
               <a:buFont typeface="Arial" pitchFamily="34" charset="0"/>
               <a:buChar char="•"/>
             </a:pPr>
             <a:r>
               <a:rPr lang="fr-CH" u="none" dirty="0" smtClean="0"/>
-              <a:t> Performant</a:t>
+              <a:t> Dans notre projet : utilisé dans le cadre d’un graphe pour calculer le chemin le plus court pour les créatures (</a:t>
+            </a:r>
+            <a:r>
+              <a:rPr lang="fr-CH" b="1" u="none" dirty="0" err="1" smtClean="0"/>
+              <a:t>pathfinding</a:t>
+            </a:r>
+            <a:r>
+              <a:rPr lang="fr-CH" u="none" dirty="0" smtClean="0"/>
+              <a:t>).</a:t>
             </a:r>
           </a:p>
           <a:p>
             <a:pPr>
+              <a:spcAft>
+                <a:spcPts val="1200"/>
+              </a:spcAft>
               <a:buFont typeface="Arial" pitchFamily="34" charset="0"/>
               <a:buChar char="•"/>
             </a:pPr>
             <a:r>
               <a:rPr lang="fr-CH" u="none" dirty="0" smtClean="0"/>
-              <a:t> </a:t>
+              <a:t> Implémentation : Par un package, </a:t>
+            </a:r>
+            <a:r>
+              <a:rPr lang="fr-CH" b="1" u="none" dirty="0" err="1" smtClean="0"/>
+              <a:t>JGraphT</a:t>
             </a:r>
             <a:r>
               <a:rPr lang="fr-CH" u="none" dirty="0" smtClean="0"/>
-              <a:t>Adapté</a:t>
-            </a:r>
-          </a:p>
-          <a:p>
-            <a:pPr>
-              <a:buFont typeface="Arial" pitchFamily="34" charset="0"/>
-              <a:buChar char="•"/>
-            </a:pPr>
-            <a:r>
-              <a:rPr lang="fr-CH" u="none" dirty="0" smtClean="0"/>
-              <a:t> </a:t>
-            </a:r>
-            <a:r>
-              <a:rPr lang="fr-CH" u="none" dirty="0" smtClean="0"/>
-              <a:t>Implémentation : </a:t>
-            </a:r>
-            <a:r>
-              <a:rPr lang="fr-CH" u="none" dirty="0" err="1" smtClean="0"/>
-              <a:t>JGraphT</a:t>
+              <a:t>.</a:t>
             </a:r>
             <a:endParaRPr lang="fr-CH" u="none" dirty="0"/>
           </a:p>
@@ -14082,7 +14527,7 @@
                   </a:schemeClr>
                 </a:solidFill>
               </a:rPr>
-              <a:t>/11</a:t>
+              <a:t>/13</a:t>
             </a:r>
             <a:endParaRPr lang="fr-FR" dirty="0">
               <a:solidFill>
@@ -14125,9 +14570,9 @@
                 </a:solidFill>
               </a:rPr>
               <a:pPr/>
-              <a:t>17.01.2010</a:t>
+              <a:t>19.01.2010</a:t>
             </a:fld>
-            <a:endParaRPr lang="fr-FR">
+            <a:endParaRPr lang="fr-FR" dirty="0">
               <a:solidFill>
                 <a:schemeClr val="tx1">
                   <a:lumMod val="65000"/>
@@ -14224,21 +14669,7 @@
                 </a:effectLst>
                 <a:latin typeface="Trebuchet MS" pitchFamily="34" charset="0"/>
               </a:rPr>
-              <a:t>MAILLAGE </a:t>
-            </a:r>
-            <a:r>
-              <a:rPr lang="fr-FR" sz="2000" b="1" u="none" dirty="0" smtClean="0">
-                <a:solidFill>
-                  <a:schemeClr val="bg1"/>
-                </a:solidFill>
-                <a:effectLst>
-                  <a:outerShdw blurRad="38100" dist="38100" dir="2700000" algn="tl">
-                    <a:srgbClr val="C0C0C0"/>
-                  </a:outerShdw>
-                </a:effectLst>
-                <a:latin typeface="Trebuchet MS" pitchFamily="34" charset="0"/>
-              </a:rPr>
-              <a:t>DYNAMIQUE : Organisation</a:t>
+              <a:t>MAILLAGE DYNAMIQUE : Organisation</a:t>
             </a:r>
             <a:endParaRPr lang="fr-FR" sz="2000" b="1" u="none" dirty="0">
               <a:solidFill>
@@ -14505,17 +14936,36 @@
             <p:ph type="dt" sz="half" idx="10"/>
           </p:nvPr>
         </p:nvSpPr>
-        <p:spPr/>
+        <p:spPr>
+          <a:xfrm>
+            <a:off x="457200" y="6384972"/>
+            <a:ext cx="2133600" cy="476250"/>
+          </a:xfrm>
+        </p:spPr>
         <p:txBody>
           <a:bodyPr/>
           <a:lstStyle/>
           <a:p>
             <a:fld id="{DE3EECC3-BAC3-4A29-8636-7743FF9A3806}" type="datetime1">
-              <a:rPr lang="fr-CH" smtClean="0"/>
+              <a:rPr lang="fr-CH" smtClean="0">
+                <a:solidFill>
+                  <a:schemeClr val="tx1">
+                    <a:lumMod val="65000"/>
+                    <a:lumOff val="35000"/>
+                  </a:schemeClr>
+                </a:solidFill>
+              </a:rPr>
               <a:pPr/>
-              <a:t>17.01.2010</a:t>
+              <a:t>19.01.2010</a:t>
             </a:fld>
-            <a:endParaRPr lang="fr-FR"/>
+            <a:endParaRPr lang="fr-FR" dirty="0">
+              <a:solidFill>
+                <a:schemeClr val="tx1">
+                  <a:lumMod val="65000"/>
+                  <a:lumOff val="35000"/>
+                </a:schemeClr>
+              </a:solidFill>
+            </a:endParaRPr>
           </a:p>
         </p:txBody>
       </p:sp>
@@ -14529,16 +14979,68 @@
             <p:ph type="ftr" sz="quarter" idx="11"/>
           </p:nvPr>
         </p:nvSpPr>
-        <p:spPr/>
+        <p:spPr>
+          <a:xfrm>
+            <a:off x="3124200" y="6384972"/>
+            <a:ext cx="2895600" cy="476250"/>
+          </a:xfrm>
+        </p:spPr>
         <p:txBody>
           <a:bodyPr/>
           <a:lstStyle/>
           <a:p>
             <a:r>
-              <a:rPr lang="fr-FR" smtClean="0"/>
-              <a:t>ADO - PPZ - LFH</a:t>
-            </a:r>
-            <a:endParaRPr lang="fr-FR"/>
+              <a:rPr lang="fr-FR" dirty="0" smtClean="0">
+                <a:solidFill>
+                  <a:schemeClr val="tx1">
+                    <a:lumMod val="65000"/>
+                    <a:lumOff val="35000"/>
+                  </a:schemeClr>
+                </a:solidFill>
+              </a:rPr>
+              <a:t>ADO - </a:t>
+            </a:r>
+            <a:r>
+              <a:rPr lang="fr-FR" dirty="0" err="1" smtClean="0">
+                <a:solidFill>
+                  <a:schemeClr val="tx1">
+                    <a:lumMod val="65000"/>
+                    <a:lumOff val="35000"/>
+                  </a:schemeClr>
+                </a:solidFill>
+              </a:rPr>
+              <a:t>PPZ</a:t>
+            </a:r>
+            <a:r>
+              <a:rPr lang="fr-FR" dirty="0" smtClean="0">
+                <a:solidFill>
+                  <a:schemeClr val="tx1">
+                    <a:lumMod val="65000"/>
+                    <a:lumOff val="35000"/>
+                  </a:schemeClr>
+                </a:solidFill>
+              </a:rPr>
+              <a:t> - </a:t>
+            </a:r>
+            <a:r>
+              <a:rPr lang="fr-FR" dirty="0" err="1" smtClean="0">
+                <a:solidFill>
+                  <a:schemeClr val="tx1">
+                    <a:lumMod val="65000"/>
+                    <a:lumOff val="35000"/>
+                  </a:schemeClr>
+                </a:solidFill>
+              </a:rPr>
+              <a:t>LFH</a:t>
+            </a:r>
+            <a:endParaRPr lang="fr-FR" dirty="0">
+              <a:solidFill>
+                <a:schemeClr val="tx1">
+                  <a:lumMod val="65000"/>
+                  <a:lumOff val="35000"/>
+                </a:schemeClr>
+              </a:solidFill>
+            </a:endParaRPr>
           </a:p>
         </p:txBody>
       </p:sp>
@@ -14552,17 +15054,47 @@
             <p:ph type="sldNum" sz="quarter" idx="12"/>
           </p:nvPr>
         </p:nvSpPr>
-        <p:spPr/>
+        <p:spPr>
+          <a:xfrm>
+            <a:off x="6553200" y="6384972"/>
+            <a:ext cx="2133600" cy="476250"/>
+          </a:xfrm>
+        </p:spPr>
         <p:txBody>
           <a:bodyPr/>
           <a:lstStyle/>
           <a:p>
             <a:fld id="{420F5742-7484-4AFF-BE5C-C36DF30CE89D}" type="slidenum">
-              <a:rPr lang="fr-FR" smtClean="0"/>
+              <a:rPr lang="fr-FR" smtClean="0">
+                <a:solidFill>
+                  <a:schemeClr val="tx1">
+                    <a:lumMod val="65000"/>
+                    <a:lumOff val="35000"/>
+                  </a:schemeClr>
+                </a:solidFill>
+              </a:rPr>
               <a:pPr/>
               <a:t>8</a:t>
             </a:fld>
-            <a:endParaRPr lang="fr-FR"/>
+            <a:r>
+              <a:rPr lang="fr-FR" dirty="0" smtClean="0">
+                <a:solidFill>
+                  <a:schemeClr val="tx1">
+                    <a:lumMod val="65000"/>
+                    <a:lumOff val="35000"/>
+                  </a:schemeClr>
+                </a:solidFill>
+              </a:rPr>
+              <a:t>/13</a:t>
+            </a:r>
+            <a:endParaRPr lang="fr-FR" dirty="0">
+              <a:solidFill>
+                <a:schemeClr val="tx1">
+                  <a:lumMod val="65000"/>
+                  <a:lumOff val="35000"/>
+                </a:schemeClr>
+              </a:solidFill>
+            </a:endParaRPr>
           </a:p>
         </p:txBody>
       </p:sp>
@@ -14698,21 +15230,7 @@
                 </a:effectLst>
                 <a:latin typeface="Trebuchet MS" pitchFamily="34" charset="0"/>
               </a:rPr>
-              <a:t>MAILLAGE </a:t>
-            </a:r>
-            <a:r>
-              <a:rPr lang="fr-FR" sz="2000" b="1" u="none" dirty="0" smtClean="0">
-                <a:solidFill>
-                  <a:schemeClr val="bg1"/>
-                </a:solidFill>
-                <a:effectLst>
-                  <a:outerShdw blurRad="38100" dist="38100" dir="2700000" algn="tl">
-                    <a:srgbClr val="C0C0C0"/>
-                  </a:outerShdw>
-                </a:effectLst>
-                <a:latin typeface="Trebuchet MS" pitchFamily="34" charset="0"/>
-              </a:rPr>
-              <a:t>DYNAMIQUE : Opérations</a:t>
+              <a:t>MAILLAGE DYNAMIQUE : Opérations</a:t>
             </a:r>
             <a:endParaRPr lang="fr-FR" sz="2000" b="1" u="none" dirty="0">
               <a:solidFill>
@@ -14776,11 +15294,7 @@
             </a:pPr>
             <a:r>
               <a:rPr lang="fr-CH" u="none" dirty="0" smtClean="0"/>
-              <a:t> </a:t>
-            </a:r>
-            <a:r>
-              <a:rPr lang="fr-CH" u="none" dirty="0" smtClean="0"/>
-              <a:t>Désactivation d’une zone</a:t>
+              <a:t> Désactivation d’une zone</a:t>
             </a:r>
           </a:p>
           <a:p>
@@ -14875,11 +15389,7 @@
             </a:pPr>
             <a:r>
               <a:rPr lang="fr-CH" u="none" dirty="0" smtClean="0"/>
-              <a:t> </a:t>
-            </a:r>
-            <a:r>
-              <a:rPr lang="fr-CH" u="none" dirty="0" smtClean="0"/>
-              <a:t>Recherche du chemin le plus court</a:t>
+              <a:t> Recherche du chemin le plus court</a:t>
             </a:r>
           </a:p>
           <a:p>
@@ -14910,11 +15420,7 @@
             </a:pPr>
             <a:r>
               <a:rPr lang="fr-CH" u="none" dirty="0" smtClean="0"/>
-              <a:t> </a:t>
-            </a:r>
-            <a:r>
-              <a:rPr lang="fr-CH" u="none" dirty="0" smtClean="0"/>
-              <a:t>Liste des nœuds et des arcs</a:t>
+              <a:t> Liste des nœuds et des arcs</a:t>
             </a:r>
           </a:p>
           <a:p>
@@ -17711,6 +18217,51 @@
           </p:txBody>
         </p:sp>
       </p:grpSp>
+      <p:sp>
+        <p:nvSpPr>
+          <p:cNvPr id="104" name="Rectangle 34"/>
+          <p:cNvSpPr>
+            <a:spLocks noChangeArrowheads="1"/>
+          </p:cNvSpPr>
+          <p:nvPr/>
+        </p:nvSpPr>
+        <p:spPr bwMode="auto">
+          <a:xfrm>
+            <a:off x="0" y="6632622"/>
+            <a:ext cx="9144000" cy="228600"/>
+          </a:xfrm>
+          <a:prstGeom prst="rect">
+            <a:avLst/>
+          </a:prstGeom>
+          <a:gradFill rotWithShape="1">
+            <a:gsLst>
+              <a:gs pos="0">
+                <a:srgbClr val="DDDDDD">
+                  <a:alpha val="0"/>
+                </a:srgbClr>
+              </a:gs>
+              <a:gs pos="100000">
+                <a:srgbClr val="767676"/>
+              </a:gs>
+            </a:gsLst>
+            <a:lin ang="5400000" scaled="1"/>
+          </a:gradFill>
+          <a:ln w="9525">
+            <a:noFill/>
+            <a:miter lim="800000"/>
+            <a:headEnd/>
+            <a:tailEnd/>
+          </a:ln>
+          <a:effectLst/>
+        </p:spPr>
+        <p:txBody>
+          <a:bodyPr wrap="none" anchor="ctr"/>
+          <a:lstStyle/>
+          <a:p>
+            <a:endParaRPr lang="fr-CH"/>
+          </a:p>
+        </p:txBody>
+      </p:sp>
     </p:spTree>
   </p:cSld>
   <p:clrMapOvr>
@@ -17913,7 +18464,7 @@
                   </a:schemeClr>
                 </a:solidFill>
               </a:rPr>
-              <a:t>/11</a:t>
+              <a:t>/13</a:t>
             </a:r>
             <a:endParaRPr lang="fr-FR" dirty="0">
               <a:solidFill>
@@ -17956,7 +18507,7 @@
                 </a:solidFill>
               </a:rPr>
               <a:pPr/>
-              <a:t>17.01.2010</a:t>
+              <a:t>19.01.2010</a:t>
             </a:fld>
             <a:endParaRPr lang="fr-FR">
               <a:solidFill>

</xml_diff>

<commit_message>
Présentation, partie de aurélien...
</commit_message>
<xml_diff>
--- a/documents/presentation.pptx
+++ b/documents/presentation.pptx
@@ -1199,9 +1199,9 @@
     <dgm:cxn modelId="{89BC57FA-AE10-482F-927F-71A8D556A19E}" srcId="{039ECC2C-7749-4EFF-9017-2771A9E53934}" destId="{EC67C51C-2E21-4800-A04E-39504433E3CE}" srcOrd="0" destOrd="0" parTransId="{C1FB9566-B4E8-4DCE-AA97-C86B1060BCA8}" sibTransId="{0FEF8533-E849-4364-84C8-3F62C15EBE3F}"/>
     <dgm:cxn modelId="{EB811B70-8E2D-44FE-92B9-8C27C1CDB080}" type="presOf" srcId="{1472A273-CA92-469C-9505-C150B6F56774}" destId="{80215751-409B-4988-A436-B358FBA1052E}" srcOrd="0" destOrd="0" presId="urn:microsoft.com/office/officeart/2005/8/layout/hierarchy4"/>
     <dgm:cxn modelId="{7703D9C7-FD49-4123-85A9-5B14F944AD2A}" srcId="{1472A273-CA92-469C-9505-C150B6F56774}" destId="{124BD719-1FAB-4AF2-99EF-85E2B6A01D1F}" srcOrd="1" destOrd="0" parTransId="{80709401-ACB8-48D0-8A81-60AA27C59D14}" sibTransId="{DAB5BDF0-7940-4913-A7DC-025BC823385F}"/>
-    <dgm:cxn modelId="{3F9F2067-1FE7-4E78-8B69-DB5540F4B3FE}" srcId="{EC67C51C-2E21-4800-A04E-39504433E3CE}" destId="{1472A273-CA92-469C-9505-C150B6F56774}" srcOrd="0" destOrd="0" parTransId="{17F06AE8-5589-4E05-8B1A-55E0A3EF5811}" sibTransId="{60AC5C1C-844A-4377-9E87-98CBB6779E2C}"/>
     <dgm:cxn modelId="{A90410F8-B3A1-4B16-B600-E6C6395327BE}" type="presOf" srcId="{EC67C51C-2E21-4800-A04E-39504433E3CE}" destId="{470D3EA4-1484-4E8B-8647-42FEE815609D}" srcOrd="0" destOrd="0" presId="urn:microsoft.com/office/officeart/2005/8/layout/hierarchy4"/>
     <dgm:cxn modelId="{1C06BC75-856D-4D44-97D8-A8932F914CC7}" type="presOf" srcId="{90CADE53-B192-4AAE-BED5-36EB581619C5}" destId="{5AFE3CD8-342E-49ED-A2B7-C727E61913F6}" srcOrd="0" destOrd="0" presId="urn:microsoft.com/office/officeart/2005/8/layout/hierarchy4"/>
+    <dgm:cxn modelId="{3F9F2067-1FE7-4E78-8B69-DB5540F4B3FE}" srcId="{EC67C51C-2E21-4800-A04E-39504433E3CE}" destId="{1472A273-CA92-469C-9505-C150B6F56774}" srcOrd="0" destOrd="0" parTransId="{17F06AE8-5589-4E05-8B1A-55E0A3EF5811}" sibTransId="{60AC5C1C-844A-4377-9E87-98CBB6779E2C}"/>
     <dgm:cxn modelId="{3B962616-047D-4C68-8DFA-1B0C1FC1AB1A}" type="presOf" srcId="{039ECC2C-7749-4EFF-9017-2771A9E53934}" destId="{4FB47F87-36CB-4205-AA60-DBA75FA52CEA}" srcOrd="0" destOrd="0" presId="urn:microsoft.com/office/officeart/2005/8/layout/hierarchy4"/>
     <dgm:cxn modelId="{7B9DA742-F807-4C9A-8B8D-25B0B94CA8A1}" type="presParOf" srcId="{4FB47F87-36CB-4205-AA60-DBA75FA52CEA}" destId="{2A8147CC-483C-42DD-8065-9F64F5AA4446}" srcOrd="0" destOrd="0" presId="urn:microsoft.com/office/officeart/2005/8/layout/hierarchy4"/>
     <dgm:cxn modelId="{252A1B45-733F-41E1-9D3B-6B1D93CDEF06}" type="presParOf" srcId="{2A8147CC-483C-42DD-8065-9F64F5AA4446}" destId="{470D3EA4-1484-4E8B-8647-42FEE815609D}" srcOrd="0" destOrd="0" presId="urn:microsoft.com/office/officeart/2005/8/layout/hierarchy4"/>
@@ -3316,7 +3316,7 @@
             </a:lvl1pPr>
           </a:lstStyle>
           <a:p>
-            <a:endParaRPr lang="fr-CH"/>
+            <a:endParaRPr lang="fr-CH" dirty="0"/>
           </a:p>
         </p:txBody>
       </p:sp>
@@ -3352,7 +3352,7 @@
               <a:pPr/>
               <a:t>19/01/2010</a:t>
             </a:fld>
-            <a:endParaRPr lang="fr-CH"/>
+            <a:endParaRPr lang="fr-CH" dirty="0"/>
           </a:p>
         </p:txBody>
       </p:sp>
@@ -3385,7 +3385,7 @@
           <a:bodyPr vert="horz" lIns="91440" tIns="45720" rIns="91440" bIns="45720" rtlCol="0" anchor="ctr"/>
           <a:lstStyle/>
           <a:p>
-            <a:endParaRPr lang="fr-CH"/>
+            <a:endParaRPr lang="fr-CH" dirty="0"/>
           </a:p>
         </p:txBody>
       </p:sp>
@@ -3478,7 +3478,7 @@
             </a:lvl1pPr>
           </a:lstStyle>
           <a:p>
-            <a:endParaRPr lang="fr-CH"/>
+            <a:endParaRPr lang="fr-CH" dirty="0"/>
           </a:p>
         </p:txBody>
       </p:sp>
@@ -3514,7 +3514,7 @@
               <a:pPr/>
               <a:t>‹N°›</a:t>
             </a:fld>
-            <a:endParaRPr lang="fr-CH"/>
+            <a:endParaRPr lang="fr-CH" dirty="0"/>
           </a:p>
         </p:txBody>
       </p:sp>
@@ -3914,7 +3914,7 @@
               <a:pPr/>
               <a:t>19.01.2010</a:t>
             </a:fld>
-            <a:endParaRPr lang="fr-FR"/>
+            <a:endParaRPr lang="fr-FR" dirty="0"/>
           </a:p>
         </p:txBody>
       </p:sp>
@@ -3938,10 +3938,10 @@
           </a:lstStyle>
           <a:p>
             <a:r>
-              <a:rPr lang="fr-FR" smtClean="0"/>
+              <a:rPr lang="fr-FR" dirty="0" smtClean="0"/>
               <a:t>ADO - PPZ - LFH</a:t>
             </a:r>
-            <a:endParaRPr lang="fr-FR"/>
+            <a:endParaRPr lang="fr-FR" dirty="0"/>
           </a:p>
         </p:txBody>
       </p:sp>
@@ -3969,7 +3969,7 @@
               <a:pPr/>
               <a:t>‹N°›</a:t>
             </a:fld>
-            <a:endParaRPr lang="fr-FR"/>
+            <a:endParaRPr lang="fr-FR" dirty="0"/>
           </a:p>
         </p:txBody>
       </p:sp>
@@ -4100,7 +4100,7 @@
               <a:pPr/>
               <a:t>19.01.2010</a:t>
             </a:fld>
-            <a:endParaRPr lang="fr-FR"/>
+            <a:endParaRPr lang="fr-FR" dirty="0"/>
           </a:p>
         </p:txBody>
       </p:sp>
@@ -4124,10 +4124,10 @@
           </a:lstStyle>
           <a:p>
             <a:r>
-              <a:rPr lang="fr-FR" smtClean="0"/>
+              <a:rPr lang="fr-FR" dirty="0" smtClean="0"/>
               <a:t>ADO - PPZ - LFH</a:t>
             </a:r>
-            <a:endParaRPr lang="fr-FR"/>
+            <a:endParaRPr lang="fr-FR" dirty="0"/>
           </a:p>
         </p:txBody>
       </p:sp>
@@ -4155,7 +4155,7 @@
               <a:pPr/>
               <a:t>‹N°›</a:t>
             </a:fld>
-            <a:endParaRPr lang="fr-FR"/>
+            <a:endParaRPr lang="fr-FR" dirty="0"/>
           </a:p>
         </p:txBody>
       </p:sp>
@@ -4296,7 +4296,7 @@
               <a:pPr/>
               <a:t>19.01.2010</a:t>
             </a:fld>
-            <a:endParaRPr lang="fr-FR"/>
+            <a:endParaRPr lang="fr-FR" dirty="0"/>
           </a:p>
         </p:txBody>
       </p:sp>
@@ -4320,10 +4320,10 @@
           </a:lstStyle>
           <a:p>
             <a:r>
-              <a:rPr lang="fr-FR" smtClean="0"/>
+              <a:rPr lang="fr-FR" dirty="0" smtClean="0"/>
               <a:t>ADO - PPZ - LFH</a:t>
             </a:r>
-            <a:endParaRPr lang="fr-FR"/>
+            <a:endParaRPr lang="fr-FR" dirty="0"/>
           </a:p>
         </p:txBody>
       </p:sp>
@@ -4351,7 +4351,7 @@
               <a:pPr/>
               <a:t>‹N°›</a:t>
             </a:fld>
-            <a:endParaRPr lang="fr-FR"/>
+            <a:endParaRPr lang="fr-FR" dirty="0"/>
           </a:p>
         </p:txBody>
       </p:sp>
@@ -4611,7 +4611,7 @@
               <a:pPr/>
               <a:t>19.01.2010</a:t>
             </a:fld>
-            <a:endParaRPr lang="fr-FR"/>
+            <a:endParaRPr lang="fr-FR" dirty="0"/>
           </a:p>
         </p:txBody>
       </p:sp>
@@ -4640,10 +4640,10 @@
           </a:lstStyle>
           <a:p>
             <a:r>
-              <a:rPr lang="fr-FR" smtClean="0"/>
+              <a:rPr lang="fr-FR" dirty="0" smtClean="0"/>
               <a:t>ADO - PPZ - LFH</a:t>
             </a:r>
-            <a:endParaRPr lang="fr-FR"/>
+            <a:endParaRPr lang="fr-FR" dirty="0"/>
           </a:p>
         </p:txBody>
       </p:sp>
@@ -4676,7 +4676,7 @@
               <a:pPr/>
               <a:t>‹N°›</a:t>
             </a:fld>
-            <a:endParaRPr lang="fr-FR"/>
+            <a:endParaRPr lang="fr-FR" dirty="0"/>
           </a:p>
         </p:txBody>
       </p:sp>
@@ -4794,7 +4794,7 @@
               <a:pPr/>
               <a:t>19.01.2010</a:t>
             </a:fld>
-            <a:endParaRPr lang="fr-FR"/>
+            <a:endParaRPr lang="fr-FR" dirty="0"/>
           </a:p>
         </p:txBody>
       </p:sp>
@@ -4823,10 +4823,10 @@
           </a:lstStyle>
           <a:p>
             <a:r>
-              <a:rPr lang="fr-FR" smtClean="0"/>
+              <a:rPr lang="fr-FR" dirty="0" smtClean="0"/>
               <a:t>ADO - PPZ - LFH</a:t>
             </a:r>
-            <a:endParaRPr lang="fr-FR"/>
+            <a:endParaRPr lang="fr-FR" dirty="0"/>
           </a:p>
         </p:txBody>
       </p:sp>
@@ -4859,7 +4859,7 @@
               <a:pPr/>
               <a:t>‹N°›</a:t>
             </a:fld>
-            <a:endParaRPr lang="fr-FR"/>
+            <a:endParaRPr lang="fr-FR" dirty="0"/>
           </a:p>
         </p:txBody>
       </p:sp>
@@ -4990,7 +4990,7 @@
               <a:pPr/>
               <a:t>19.01.2010</a:t>
             </a:fld>
-            <a:endParaRPr lang="fr-FR"/>
+            <a:endParaRPr lang="fr-FR" dirty="0"/>
           </a:p>
         </p:txBody>
       </p:sp>
@@ -5014,10 +5014,10 @@
           </a:lstStyle>
           <a:p>
             <a:r>
-              <a:rPr lang="fr-FR" smtClean="0"/>
+              <a:rPr lang="fr-FR" dirty="0" smtClean="0"/>
               <a:t>ADO - PPZ - LFH</a:t>
             </a:r>
-            <a:endParaRPr lang="fr-FR"/>
+            <a:endParaRPr lang="fr-FR" dirty="0"/>
           </a:p>
         </p:txBody>
       </p:sp>
@@ -5045,7 +5045,7 @@
               <a:pPr/>
               <a:t>‹N°›</a:t>
             </a:fld>
-            <a:endParaRPr lang="fr-FR"/>
+            <a:endParaRPr lang="fr-FR" dirty="0"/>
           </a:p>
         </p:txBody>
       </p:sp>
@@ -5198,7 +5198,7 @@
               <a:pPr/>
               <a:t>19.01.2010</a:t>
             </a:fld>
-            <a:endParaRPr lang="fr-FR"/>
+            <a:endParaRPr lang="fr-FR" dirty="0"/>
           </a:p>
         </p:txBody>
       </p:sp>
@@ -5222,10 +5222,10 @@
           </a:lstStyle>
           <a:p>
             <a:r>
-              <a:rPr lang="fr-FR" smtClean="0"/>
+              <a:rPr lang="fr-FR" dirty="0" smtClean="0"/>
               <a:t>ADO - PPZ - LFH</a:t>
             </a:r>
-            <a:endParaRPr lang="fr-FR"/>
+            <a:endParaRPr lang="fr-FR" dirty="0"/>
           </a:p>
         </p:txBody>
       </p:sp>
@@ -5253,7 +5253,7 @@
               <a:pPr/>
               <a:t>‹N°›</a:t>
             </a:fld>
-            <a:endParaRPr lang="fr-FR"/>
+            <a:endParaRPr lang="fr-FR" dirty="0"/>
           </a:p>
         </p:txBody>
       </p:sp>
@@ -5502,7 +5502,7 @@
               <a:pPr/>
               <a:t>19.01.2010</a:t>
             </a:fld>
-            <a:endParaRPr lang="fr-FR"/>
+            <a:endParaRPr lang="fr-FR" dirty="0"/>
           </a:p>
         </p:txBody>
       </p:sp>
@@ -5526,10 +5526,10 @@
           </a:lstStyle>
           <a:p>
             <a:r>
-              <a:rPr lang="fr-FR" smtClean="0"/>
+              <a:rPr lang="fr-FR" dirty="0" smtClean="0"/>
               <a:t>ADO - PPZ - LFH</a:t>
             </a:r>
-            <a:endParaRPr lang="fr-FR"/>
+            <a:endParaRPr lang="fr-FR" dirty="0"/>
           </a:p>
         </p:txBody>
       </p:sp>
@@ -5557,7 +5557,7 @@
               <a:pPr/>
               <a:t>‹N°›</a:t>
             </a:fld>
-            <a:endParaRPr lang="fr-FR"/>
+            <a:endParaRPr lang="fr-FR" dirty="0"/>
           </a:p>
         </p:txBody>
       </p:sp>
@@ -5940,7 +5940,7 @@
               <a:pPr/>
               <a:t>19.01.2010</a:t>
             </a:fld>
-            <a:endParaRPr lang="fr-FR"/>
+            <a:endParaRPr lang="fr-FR" dirty="0"/>
           </a:p>
         </p:txBody>
       </p:sp>
@@ -5964,10 +5964,10 @@
           </a:lstStyle>
           <a:p>
             <a:r>
-              <a:rPr lang="fr-FR" smtClean="0"/>
+              <a:rPr lang="fr-FR" dirty="0" smtClean="0"/>
               <a:t>ADO - PPZ - LFH</a:t>
             </a:r>
-            <a:endParaRPr lang="fr-FR"/>
+            <a:endParaRPr lang="fr-FR" dirty="0"/>
           </a:p>
         </p:txBody>
       </p:sp>
@@ -5995,7 +5995,7 @@
               <a:pPr/>
               <a:t>‹N°›</a:t>
             </a:fld>
-            <a:endParaRPr lang="fr-FR"/>
+            <a:endParaRPr lang="fr-FR" dirty="0"/>
           </a:p>
         </p:txBody>
       </p:sp>
@@ -6074,7 +6074,7 @@
               <a:pPr/>
               <a:t>19.01.2010</a:t>
             </a:fld>
-            <a:endParaRPr lang="fr-FR"/>
+            <a:endParaRPr lang="fr-FR" dirty="0"/>
           </a:p>
         </p:txBody>
       </p:sp>
@@ -6098,10 +6098,10 @@
           </a:lstStyle>
           <a:p>
             <a:r>
-              <a:rPr lang="fr-FR" smtClean="0"/>
+              <a:rPr lang="fr-FR" dirty="0" smtClean="0"/>
               <a:t>ADO - PPZ - LFH</a:t>
             </a:r>
-            <a:endParaRPr lang="fr-FR"/>
+            <a:endParaRPr lang="fr-FR" dirty="0"/>
           </a:p>
         </p:txBody>
       </p:sp>
@@ -6129,7 +6129,7 @@
               <a:pPr/>
               <a:t>‹N°›</a:t>
             </a:fld>
-            <a:endParaRPr lang="fr-FR"/>
+            <a:endParaRPr lang="fr-FR" dirty="0"/>
           </a:p>
         </p:txBody>
       </p:sp>
@@ -6185,7 +6185,7 @@
               <a:pPr/>
               <a:t>19.01.2010</a:t>
             </a:fld>
-            <a:endParaRPr lang="fr-FR"/>
+            <a:endParaRPr lang="fr-FR" dirty="0"/>
           </a:p>
         </p:txBody>
       </p:sp>
@@ -6209,10 +6209,10 @@
           </a:lstStyle>
           <a:p>
             <a:r>
-              <a:rPr lang="fr-FR" smtClean="0"/>
+              <a:rPr lang="fr-FR" dirty="0" smtClean="0"/>
               <a:t>ADO - PPZ - LFH</a:t>
             </a:r>
-            <a:endParaRPr lang="fr-FR"/>
+            <a:endParaRPr lang="fr-FR" dirty="0"/>
           </a:p>
         </p:txBody>
       </p:sp>
@@ -6240,7 +6240,7 @@
               <a:pPr/>
               <a:t>‹N°›</a:t>
             </a:fld>
-            <a:endParaRPr lang="fr-FR"/>
+            <a:endParaRPr lang="fr-FR" dirty="0"/>
           </a:p>
         </p:txBody>
       </p:sp>
@@ -6478,7 +6478,7 @@
               <a:pPr/>
               <a:t>19.01.2010</a:t>
             </a:fld>
-            <a:endParaRPr lang="fr-FR"/>
+            <a:endParaRPr lang="fr-FR" dirty="0"/>
           </a:p>
         </p:txBody>
       </p:sp>
@@ -6502,10 +6502,10 @@
           </a:lstStyle>
           <a:p>
             <a:r>
-              <a:rPr lang="fr-FR" smtClean="0"/>
+              <a:rPr lang="fr-FR" dirty="0" smtClean="0"/>
               <a:t>ADO - PPZ - LFH</a:t>
             </a:r>
-            <a:endParaRPr lang="fr-FR"/>
+            <a:endParaRPr lang="fr-FR" dirty="0"/>
           </a:p>
         </p:txBody>
       </p:sp>
@@ -6533,7 +6533,7 @@
               <a:pPr/>
               <a:t>‹N°›</a:t>
             </a:fld>
-            <a:endParaRPr lang="fr-FR"/>
+            <a:endParaRPr lang="fr-FR" dirty="0"/>
           </a:p>
         </p:txBody>
       </p:sp>
@@ -6654,7 +6654,7 @@
             </a:lvl9pPr>
           </a:lstStyle>
           <a:p>
-            <a:endParaRPr lang="fr-CH"/>
+            <a:endParaRPr lang="fr-CH" dirty="0"/>
           </a:p>
         </p:txBody>
       </p:sp>
@@ -6747,7 +6747,7 @@
               <a:pPr/>
               <a:t>19.01.2010</a:t>
             </a:fld>
-            <a:endParaRPr lang="fr-FR"/>
+            <a:endParaRPr lang="fr-FR" dirty="0"/>
           </a:p>
         </p:txBody>
       </p:sp>
@@ -6771,10 +6771,10 @@
           </a:lstStyle>
           <a:p>
             <a:r>
-              <a:rPr lang="fr-FR" smtClean="0"/>
+              <a:rPr lang="fr-FR" dirty="0" smtClean="0"/>
               <a:t>ADO - PPZ - LFH</a:t>
             </a:r>
-            <a:endParaRPr lang="fr-FR"/>
+            <a:endParaRPr lang="fr-FR" dirty="0"/>
           </a:p>
         </p:txBody>
       </p:sp>
@@ -6802,7 +6802,7 @@
               <a:pPr/>
               <a:t>‹N°›</a:t>
             </a:fld>
-            <a:endParaRPr lang="fr-FR"/>
+            <a:endParaRPr lang="fr-FR" dirty="0"/>
           </a:p>
         </p:txBody>
       </p:sp>
@@ -7000,7 +7000,7 @@
               <a:pPr/>
               <a:t>19.01.2010</a:t>
             </a:fld>
-            <a:endParaRPr lang="fr-FR"/>
+            <a:endParaRPr lang="fr-FR" dirty="0"/>
           </a:p>
         </p:txBody>
       </p:sp>
@@ -7044,10 +7044,10 @@
           </a:lstStyle>
           <a:p>
             <a:r>
-              <a:rPr lang="fr-FR" smtClean="0"/>
+              <a:rPr lang="fr-FR" dirty="0" smtClean="0"/>
               <a:t>ADO - PPZ - LFH</a:t>
             </a:r>
-            <a:endParaRPr lang="fr-FR"/>
+            <a:endParaRPr lang="fr-FR" dirty="0"/>
           </a:p>
         </p:txBody>
       </p:sp>
@@ -7095,7 +7095,7 @@
               <a:pPr/>
               <a:t>‹N°›</a:t>
             </a:fld>
-            <a:endParaRPr lang="fr-FR"/>
+            <a:endParaRPr lang="fr-FR" dirty="0"/>
           </a:p>
         </p:txBody>
       </p:sp>
@@ -7600,7 +7600,7 @@
           <a:bodyPr wrap="none" anchor="ctr"/>
           <a:lstStyle/>
           <a:p>
-            <a:endParaRPr lang="fr-CH"/>
+            <a:endParaRPr lang="fr-CH" dirty="0"/>
           </a:p>
         </p:txBody>
       </p:sp>
@@ -7678,7 +7678,7 @@
           <a:bodyPr wrap="none" anchor="ctr"/>
           <a:lstStyle/>
           <a:p>
-            <a:endParaRPr lang="fr-CH"/>
+            <a:endParaRPr lang="fr-CH" dirty="0"/>
           </a:p>
         </p:txBody>
       </p:sp>
@@ -7723,7 +7723,7 @@
           <a:bodyPr wrap="none" anchor="ctr"/>
           <a:lstStyle/>
           <a:p>
-            <a:endParaRPr lang="fr-CH"/>
+            <a:endParaRPr lang="fr-CH" dirty="0"/>
           </a:p>
         </p:txBody>
       </p:sp>
@@ -8003,14 +8003,14 @@
           <a:p>
             <a:pPr algn="ctr"/>
             <a:r>
-              <a:rPr lang="fr-CH" sz="1400" u="none">
+              <a:rPr lang="fr-CH" sz="1400" u="none" dirty="0">
                 <a:solidFill>
                   <a:schemeClr val="bg1"/>
                 </a:solidFill>
               </a:rPr>
               <a:t>- 7 / 9 - </a:t>
             </a:r>
-            <a:endParaRPr lang="fr-FR" sz="1400" u="none">
+            <a:endParaRPr lang="fr-FR" sz="1400" u="none" dirty="0">
               <a:solidFill>
                 <a:schemeClr val="bg1"/>
               </a:solidFill>
@@ -8059,7 +8059,7 @@
           <a:bodyPr wrap="none" anchor="ctr"/>
           <a:lstStyle/>
           <a:p>
-            <a:endParaRPr lang="fr-CH"/>
+            <a:endParaRPr lang="fr-CH" dirty="0"/>
           </a:p>
         </p:txBody>
       </p:sp>
@@ -8104,7 +8104,7 @@
           <a:bodyPr wrap="none" anchor="ctr"/>
           <a:lstStyle/>
           <a:p>
-            <a:endParaRPr lang="fr-CH"/>
+            <a:endParaRPr lang="fr-CH" dirty="0"/>
           </a:p>
         </p:txBody>
       </p:sp>
@@ -8148,7 +8148,7 @@
           <a:bodyPr wrap="none" anchor="ctr"/>
           <a:lstStyle/>
           <a:p>
-            <a:endParaRPr lang="fr-CH"/>
+            <a:endParaRPr lang="fr-CH" dirty="0"/>
           </a:p>
         </p:txBody>
       </p:sp>
@@ -8196,7 +8196,21 @@
                 </a:effectLst>
                 <a:latin typeface="Trebuchet MS" pitchFamily="34" charset="0"/>
               </a:rPr>
-              <a:t>STRUCTURE DU CODE [AURELIEN]</a:t>
+              <a:t>STRUCTURE DU </a:t>
+            </a:r>
+            <a:r>
+              <a:rPr lang="fr-CH" sz="2000" b="1" u="none" dirty="0" smtClean="0">
+                <a:solidFill>
+                  <a:schemeClr val="bg1"/>
+                </a:solidFill>
+                <a:effectLst>
+                  <a:outerShdw blurRad="38100" dist="38100" dir="2700000" algn="tl">
+                    <a:srgbClr val="C0C0C0"/>
+                  </a:outerShdw>
+                </a:effectLst>
+                <a:latin typeface="Trebuchet MS" pitchFamily="34" charset="0"/>
+              </a:rPr>
+              <a:t>CODE</a:t>
             </a:r>
             <a:endParaRPr lang="fr-FR" sz="2000" b="1" u="none" dirty="0">
               <a:solidFill>
@@ -8298,7 +8312,7 @@
               <a:pPr/>
               <a:t>19.01.2010</a:t>
             </a:fld>
-            <a:endParaRPr lang="fr-FR">
+            <a:endParaRPr lang="fr-FR" dirty="0">
               <a:solidFill>
                 <a:schemeClr val="tx1">
                   <a:lumMod val="65000"/>
@@ -8330,7 +8344,7 @@
           <a:lstStyle/>
           <a:p>
             <a:r>
-              <a:rPr lang="fr-FR" smtClean="0">
+              <a:rPr lang="fr-FR" dirty="0" smtClean="0">
                 <a:solidFill>
                   <a:schemeClr val="tx1">
                     <a:lumMod val="65000"/>
@@ -8340,7 +8354,7 @@
               </a:rPr>
               <a:t>ADO - PPZ - LFH</a:t>
             </a:r>
-            <a:endParaRPr lang="fr-FR">
+            <a:endParaRPr lang="fr-FR" dirty="0">
               <a:solidFill>
                 <a:schemeClr val="tx1">
                   <a:lumMod val="65000"/>
@@ -8351,20 +8365,1722 @@
           </a:p>
         </p:txBody>
       </p:sp>
+      <p:sp>
+        <p:nvSpPr>
+          <p:cNvPr id="12" name="Rectangle à coins arrondis 11"/>
+          <p:cNvSpPr/>
+          <p:nvPr/>
+        </p:nvSpPr>
+        <p:spPr bwMode="auto">
+          <a:xfrm>
+            <a:off x="2078826" y="1379889"/>
+            <a:ext cx="1654983" cy="1688333"/>
+          </a:xfrm>
+          <a:prstGeom prst="roundRect">
+            <a:avLst/>
+          </a:prstGeom>
+          <a:solidFill>
+            <a:schemeClr val="accent2">
+              <a:lumMod val="40000"/>
+              <a:lumOff val="60000"/>
+            </a:schemeClr>
+          </a:solidFill>
+          <a:ln>
+            <a:headEnd type="none" w="med" len="med"/>
+            <a:tailEnd type="none" w="med" len="med"/>
+          </a:ln>
+        </p:spPr>
+        <p:style>
+          <a:lnRef idx="0">
+            <a:schemeClr val="accent2"/>
+          </a:lnRef>
+          <a:fillRef idx="3">
+            <a:schemeClr val="accent2"/>
+          </a:fillRef>
+          <a:effectRef idx="3">
+            <a:schemeClr val="accent2"/>
+          </a:effectRef>
+          <a:fontRef idx="minor">
+            <a:schemeClr val="lt1"/>
+          </a:fontRef>
+        </p:style>
+        <p:txBody>
+          <a:bodyPr vert="horz" wrap="square" lIns="91440" tIns="45720" rIns="91440" bIns="45720" numCol="1" rtlCol="0" anchor="t" anchorCtr="0" compatLnSpc="1">
+            <a:prstTxWarp prst="textNoShape">
+              <a:avLst/>
+            </a:prstTxWarp>
+          </a:bodyPr>
+          <a:lstStyle/>
+          <a:p>
+            <a:pPr marL="0" marR="0" indent="0" algn="ctr" defTabSz="914400" rtl="0" eaLnBrk="1" fontAlgn="base" latinLnBrk="0" hangingPunct="1">
+              <a:lnSpc>
+                <a:spcPct val="100000"/>
+              </a:lnSpc>
+              <a:spcBef>
+                <a:spcPct val="0"/>
+              </a:spcBef>
+              <a:spcAft>
+                <a:spcPct val="0"/>
+              </a:spcAft>
+              <a:buClrTx/>
+              <a:buSzTx/>
+              <a:buFontTx/>
+              <a:buNone/>
+              <a:tabLst/>
+            </a:pPr>
+            <a:r>
+              <a:rPr kumimoji="0" lang="fr-CH" sz="1800" b="0" i="0" u="none" strike="noStrike" cap="none" normalizeH="0" baseline="0" dirty="0" smtClean="0">
+                <a:ln>
+                  <a:noFill/>
+                </a:ln>
+                <a:solidFill>
+                  <a:schemeClr val="tx1"/>
+                </a:solidFill>
+                <a:effectLst/>
+                <a:latin typeface="Arial" charset="0"/>
+              </a:rPr>
+              <a:t>Jeu</a:t>
+            </a:r>
+            <a:endParaRPr kumimoji="0" lang="fr-CH" sz="1800" b="0" i="0" u="none" strike="noStrike" cap="none" normalizeH="0" baseline="0" dirty="0" smtClean="0">
+              <a:ln>
+                <a:noFill/>
+              </a:ln>
+              <a:solidFill>
+                <a:schemeClr val="tx1"/>
+              </a:solidFill>
+              <a:effectLst/>
+              <a:latin typeface="Arial" charset="0"/>
+            </a:endParaRPr>
+          </a:p>
+        </p:txBody>
+      </p:sp>
+      <p:sp>
+        <p:nvSpPr>
+          <p:cNvPr id="11" name="Rectangle à coins arrondis 10"/>
+          <p:cNvSpPr/>
+          <p:nvPr/>
+        </p:nvSpPr>
+        <p:spPr bwMode="auto">
+          <a:xfrm>
+            <a:off x="3298056" y="2516175"/>
+            <a:ext cx="1587493" cy="3614787"/>
+          </a:xfrm>
+          <a:prstGeom prst="roundRect">
+            <a:avLst/>
+          </a:prstGeom>
+          <a:solidFill>
+            <a:srgbClr val="00B400"/>
+          </a:solidFill>
+          <a:ln>
+            <a:headEnd type="none" w="med" len="med"/>
+            <a:tailEnd type="none" w="med" len="med"/>
+          </a:ln>
+        </p:spPr>
+        <p:style>
+          <a:lnRef idx="0">
+            <a:schemeClr val="accent2"/>
+          </a:lnRef>
+          <a:fillRef idx="3">
+            <a:schemeClr val="accent2"/>
+          </a:fillRef>
+          <a:effectRef idx="3">
+            <a:schemeClr val="accent2"/>
+          </a:effectRef>
+          <a:fontRef idx="minor">
+            <a:schemeClr val="lt1"/>
+          </a:fontRef>
+        </p:style>
+        <p:txBody>
+          <a:bodyPr vert="horz" wrap="square" lIns="91440" tIns="45720" rIns="91440" bIns="45720" numCol="1" rtlCol="0" anchor="t" anchorCtr="0" compatLnSpc="1">
+            <a:prstTxWarp prst="textNoShape">
+              <a:avLst/>
+            </a:prstTxWarp>
+          </a:bodyPr>
+          <a:lstStyle/>
+          <a:p>
+            <a:pPr marL="0" marR="0" indent="0" algn="ctr" defTabSz="914400" rtl="0" eaLnBrk="1" fontAlgn="base" latinLnBrk="0" hangingPunct="1">
+              <a:lnSpc>
+                <a:spcPct val="100000"/>
+              </a:lnSpc>
+              <a:spcBef>
+                <a:spcPct val="0"/>
+              </a:spcBef>
+              <a:spcAft>
+                <a:spcPct val="0"/>
+              </a:spcAft>
+              <a:buClrTx/>
+              <a:buSzTx/>
+              <a:buFontTx/>
+              <a:buNone/>
+              <a:tabLst/>
+            </a:pPr>
+            <a:r>
+              <a:rPr kumimoji="0" lang="fr-CH" sz="1800" b="0" i="0" u="none" strike="noStrike" cap="none" normalizeH="0" baseline="0" dirty="0" smtClean="0">
+                <a:ln>
+                  <a:noFill/>
+                </a:ln>
+                <a:solidFill>
+                  <a:schemeClr val="tx1"/>
+                </a:solidFill>
+                <a:effectLst/>
+                <a:latin typeface="Arial" charset="0"/>
+              </a:rPr>
+              <a:t>Terrain</a:t>
+            </a:r>
+            <a:endParaRPr kumimoji="0" lang="fr-CH" sz="1800" b="0" i="0" u="none" strike="noStrike" cap="none" normalizeH="0" baseline="0" dirty="0" smtClean="0">
+              <a:ln>
+                <a:noFill/>
+              </a:ln>
+              <a:solidFill>
+                <a:schemeClr val="tx1"/>
+              </a:solidFill>
+              <a:effectLst/>
+              <a:latin typeface="Arial" charset="0"/>
+            </a:endParaRPr>
+          </a:p>
+        </p:txBody>
+      </p:sp>
+      <p:sp>
+        <p:nvSpPr>
+          <p:cNvPr id="16" name="Rectangle à coins arrondis 15"/>
+          <p:cNvSpPr/>
+          <p:nvPr/>
+        </p:nvSpPr>
+        <p:spPr bwMode="auto">
+          <a:xfrm>
+            <a:off x="4642889" y="2753509"/>
+            <a:ext cx="2583487" cy="529439"/>
+          </a:xfrm>
+          <a:prstGeom prst="roundRect">
+            <a:avLst/>
+          </a:prstGeom>
+          <a:solidFill>
+            <a:schemeClr val="bg1">
+              <a:lumMod val="85000"/>
+            </a:schemeClr>
+          </a:solidFill>
+          <a:ln>
+            <a:headEnd type="none" w="med" len="med"/>
+            <a:tailEnd type="none" w="med" len="med"/>
+          </a:ln>
+        </p:spPr>
+        <p:style>
+          <a:lnRef idx="0">
+            <a:schemeClr val="accent2"/>
+          </a:lnRef>
+          <a:fillRef idx="3">
+            <a:schemeClr val="accent2"/>
+          </a:fillRef>
+          <a:effectRef idx="3">
+            <a:schemeClr val="accent2"/>
+          </a:effectRef>
+          <a:fontRef idx="minor">
+            <a:schemeClr val="lt1"/>
+          </a:fontRef>
+        </p:style>
+        <p:txBody>
+          <a:bodyPr vert="horz" wrap="square" lIns="91440" tIns="45720" rIns="91440" bIns="45720" numCol="1" rtlCol="0" anchor="t" anchorCtr="0" compatLnSpc="1">
+            <a:prstTxWarp prst="textNoShape">
+              <a:avLst/>
+            </a:prstTxWarp>
+          </a:bodyPr>
+          <a:lstStyle/>
+          <a:p>
+            <a:pPr marL="0" marR="0" indent="0" algn="ctr" defTabSz="914400" rtl="0" eaLnBrk="1" fontAlgn="base" latinLnBrk="0" hangingPunct="1">
+              <a:lnSpc>
+                <a:spcPct val="100000"/>
+              </a:lnSpc>
+              <a:spcBef>
+                <a:spcPct val="0"/>
+              </a:spcBef>
+              <a:spcAft>
+                <a:spcPct val="0"/>
+              </a:spcAft>
+              <a:buClrTx/>
+              <a:buSzTx/>
+              <a:buFontTx/>
+              <a:buNone/>
+              <a:tabLst/>
+            </a:pPr>
+            <a:r>
+              <a:rPr kumimoji="0" lang="fr-CH" sz="1800" b="0" i="0" u="none" strike="noStrike" cap="none" normalizeH="0" baseline="0" dirty="0" smtClean="0">
+                <a:ln>
+                  <a:noFill/>
+                </a:ln>
+                <a:solidFill>
+                  <a:schemeClr val="tx1"/>
+                </a:solidFill>
+                <a:effectLst/>
+                <a:latin typeface="Arial" charset="0"/>
+              </a:rPr>
+              <a:t>Vagues</a:t>
+            </a:r>
+            <a:r>
+              <a:rPr kumimoji="0" lang="fr-CH" sz="1800" b="0" i="0" u="none" strike="noStrike" cap="none" normalizeH="0" dirty="0" smtClean="0">
+                <a:ln>
+                  <a:noFill/>
+                </a:ln>
+                <a:solidFill>
+                  <a:schemeClr val="tx1"/>
+                </a:solidFill>
+                <a:effectLst/>
+                <a:latin typeface="Arial" charset="0"/>
+              </a:rPr>
+              <a:t> de créatures</a:t>
+            </a:r>
+            <a:endParaRPr kumimoji="0" lang="fr-CH" sz="1800" b="0" i="0" u="none" strike="noStrike" cap="none" normalizeH="0" baseline="0" dirty="0" smtClean="0">
+              <a:ln>
+                <a:noFill/>
+              </a:ln>
+              <a:solidFill>
+                <a:schemeClr val="tx1"/>
+              </a:solidFill>
+              <a:effectLst/>
+              <a:latin typeface="Arial" charset="0"/>
+            </a:endParaRPr>
+          </a:p>
+        </p:txBody>
+      </p:sp>
+      <p:sp>
+        <p:nvSpPr>
+          <p:cNvPr id="14" name="Rectangle à coins arrondis 13"/>
+          <p:cNvSpPr/>
+          <p:nvPr/>
+        </p:nvSpPr>
+        <p:spPr bwMode="auto">
+          <a:xfrm>
+            <a:off x="4633953" y="4323569"/>
+            <a:ext cx="2579703" cy="529438"/>
+          </a:xfrm>
+          <a:prstGeom prst="roundRect">
+            <a:avLst/>
+          </a:prstGeom>
+          <a:solidFill>
+            <a:srgbClr val="993300"/>
+          </a:solidFill>
+          <a:ln>
+            <a:headEnd type="none" w="med" len="med"/>
+            <a:tailEnd type="none" w="med" len="med"/>
+          </a:ln>
+        </p:spPr>
+        <p:style>
+          <a:lnRef idx="0">
+            <a:schemeClr val="accent2"/>
+          </a:lnRef>
+          <a:fillRef idx="3">
+            <a:schemeClr val="accent2"/>
+          </a:fillRef>
+          <a:effectRef idx="3">
+            <a:schemeClr val="accent2"/>
+          </a:effectRef>
+          <a:fontRef idx="minor">
+            <a:schemeClr val="lt1"/>
+          </a:fontRef>
+        </p:style>
+        <p:txBody>
+          <a:bodyPr vert="horz" wrap="square" lIns="91440" tIns="45720" rIns="91440" bIns="45720" numCol="1" rtlCol="0" anchor="t" anchorCtr="0" compatLnSpc="1">
+            <a:prstTxWarp prst="textNoShape">
+              <a:avLst/>
+            </a:prstTxWarp>
+          </a:bodyPr>
+          <a:lstStyle/>
+          <a:p>
+            <a:pPr marL="0" marR="0" indent="0" algn="ctr" defTabSz="914400" rtl="0" eaLnBrk="1" fontAlgn="base" latinLnBrk="0" hangingPunct="1">
+              <a:lnSpc>
+                <a:spcPct val="100000"/>
+              </a:lnSpc>
+              <a:spcBef>
+                <a:spcPct val="0"/>
+              </a:spcBef>
+              <a:spcAft>
+                <a:spcPct val="0"/>
+              </a:spcAft>
+              <a:buClrTx/>
+              <a:buSzTx/>
+              <a:buFontTx/>
+              <a:buNone/>
+              <a:tabLst/>
+            </a:pPr>
+            <a:r>
+              <a:rPr kumimoji="0" lang="fr-CH" sz="1800" b="0" i="0" u="none" strike="noStrike" cap="none" normalizeH="0" baseline="0" dirty="0" smtClean="0">
+                <a:ln>
+                  <a:noFill/>
+                </a:ln>
+                <a:solidFill>
+                  <a:schemeClr val="tx1"/>
+                </a:solidFill>
+                <a:effectLst/>
+                <a:latin typeface="Arial" charset="0"/>
+              </a:rPr>
+              <a:t>Tours</a:t>
+            </a:r>
+            <a:endParaRPr kumimoji="0" lang="fr-CH" sz="1800" b="0" i="0" u="none" strike="noStrike" cap="none" normalizeH="0" baseline="0" dirty="0" smtClean="0">
+              <a:ln>
+                <a:noFill/>
+              </a:ln>
+              <a:solidFill>
+                <a:schemeClr val="tx1"/>
+              </a:solidFill>
+              <a:effectLst/>
+              <a:latin typeface="Arial" charset="0"/>
+            </a:endParaRPr>
+          </a:p>
+        </p:txBody>
+      </p:sp>
+      <p:sp>
+        <p:nvSpPr>
+          <p:cNvPr id="15" name="Rectangle à coins arrondis 14"/>
+          <p:cNvSpPr/>
+          <p:nvPr/>
+        </p:nvSpPr>
+        <p:spPr bwMode="auto">
+          <a:xfrm>
+            <a:off x="4633953" y="5147710"/>
+            <a:ext cx="2579703" cy="570304"/>
+          </a:xfrm>
+          <a:prstGeom prst="roundRect">
+            <a:avLst/>
+          </a:prstGeom>
+          <a:solidFill>
+            <a:srgbClr val="FFFF00"/>
+          </a:solidFill>
+          <a:ln>
+            <a:headEnd type="none" w="med" len="med"/>
+            <a:tailEnd type="none" w="med" len="med"/>
+          </a:ln>
+        </p:spPr>
+        <p:style>
+          <a:lnRef idx="0">
+            <a:schemeClr val="accent2"/>
+          </a:lnRef>
+          <a:fillRef idx="3">
+            <a:schemeClr val="accent2"/>
+          </a:fillRef>
+          <a:effectRef idx="3">
+            <a:schemeClr val="accent2"/>
+          </a:effectRef>
+          <a:fontRef idx="minor">
+            <a:schemeClr val="lt1"/>
+          </a:fontRef>
+        </p:style>
+        <p:txBody>
+          <a:bodyPr vert="horz" wrap="square" lIns="91440" tIns="45720" rIns="91440" bIns="45720" numCol="1" rtlCol="0" anchor="t" anchorCtr="0" compatLnSpc="1">
+            <a:prstTxWarp prst="textNoShape">
+              <a:avLst/>
+            </a:prstTxWarp>
+          </a:bodyPr>
+          <a:lstStyle/>
+          <a:p>
+            <a:pPr marL="0" marR="0" indent="0" algn="ctr" defTabSz="914400" rtl="0" eaLnBrk="1" fontAlgn="base" latinLnBrk="0" hangingPunct="1">
+              <a:spcBef>
+                <a:spcPct val="0"/>
+              </a:spcBef>
+              <a:spcAft>
+                <a:spcPct val="0"/>
+              </a:spcAft>
+              <a:buClrTx/>
+              <a:buSzTx/>
+              <a:buFontTx/>
+              <a:buNone/>
+              <a:tabLst/>
+            </a:pPr>
+            <a:r>
+              <a:rPr kumimoji="0" lang="fr-CH" sz="1800" b="0" i="0" u="none" strike="noStrike" cap="none" normalizeH="0" baseline="0" dirty="0" smtClean="0">
+                <a:ln>
+                  <a:noFill/>
+                </a:ln>
+                <a:solidFill>
+                  <a:schemeClr val="tx1"/>
+                </a:solidFill>
+                <a:effectLst/>
+                <a:latin typeface="Arial" charset="0"/>
+              </a:rPr>
+              <a:t>Animations</a:t>
+            </a:r>
+            <a:endParaRPr kumimoji="0" lang="fr-CH" sz="1800" b="0" i="0" u="none" strike="noStrike" cap="none" normalizeH="0" baseline="0" dirty="0" smtClean="0">
+              <a:ln>
+                <a:noFill/>
+              </a:ln>
+              <a:solidFill>
+                <a:schemeClr val="tx1"/>
+              </a:solidFill>
+              <a:effectLst/>
+              <a:latin typeface="Arial" charset="0"/>
+            </a:endParaRPr>
+          </a:p>
+        </p:txBody>
+      </p:sp>
+      <p:sp>
+        <p:nvSpPr>
+          <p:cNvPr id="13" name="Rectangle à coins arrondis 12"/>
+          <p:cNvSpPr/>
+          <p:nvPr/>
+        </p:nvSpPr>
+        <p:spPr bwMode="auto">
+          <a:xfrm>
+            <a:off x="4633953" y="3538539"/>
+            <a:ext cx="2579703" cy="517484"/>
+          </a:xfrm>
+          <a:prstGeom prst="roundRect">
+            <a:avLst/>
+          </a:prstGeom>
+          <a:solidFill>
+            <a:srgbClr val="FF0000"/>
+          </a:solidFill>
+          <a:ln>
+            <a:headEnd type="none" w="med" len="med"/>
+            <a:tailEnd type="none" w="med" len="med"/>
+          </a:ln>
+        </p:spPr>
+        <p:style>
+          <a:lnRef idx="0">
+            <a:schemeClr val="accent2"/>
+          </a:lnRef>
+          <a:fillRef idx="3">
+            <a:schemeClr val="accent2"/>
+          </a:fillRef>
+          <a:effectRef idx="3">
+            <a:schemeClr val="accent2"/>
+          </a:effectRef>
+          <a:fontRef idx="minor">
+            <a:schemeClr val="lt1"/>
+          </a:fontRef>
+        </p:style>
+        <p:txBody>
+          <a:bodyPr vert="horz" wrap="square" lIns="91440" tIns="45720" rIns="91440" bIns="45720" numCol="1" rtlCol="0" anchor="t" anchorCtr="0" compatLnSpc="1">
+            <a:prstTxWarp prst="textNoShape">
+              <a:avLst/>
+            </a:prstTxWarp>
+          </a:bodyPr>
+          <a:lstStyle/>
+          <a:p>
+            <a:pPr marL="0" marR="0" indent="0" algn="ctr" defTabSz="914400" rtl="0" eaLnBrk="1" fontAlgn="base" latinLnBrk="0" hangingPunct="1">
+              <a:lnSpc>
+                <a:spcPct val="100000"/>
+              </a:lnSpc>
+              <a:spcBef>
+                <a:spcPct val="0"/>
+              </a:spcBef>
+              <a:spcAft>
+                <a:spcPct val="0"/>
+              </a:spcAft>
+              <a:buClrTx/>
+              <a:buSzTx/>
+              <a:buFontTx/>
+              <a:buNone/>
+              <a:tabLst/>
+            </a:pPr>
+            <a:r>
+              <a:rPr kumimoji="0" lang="fr-CH" sz="1800" b="0" i="0" u="none" strike="noStrike" cap="none" normalizeH="0" baseline="0" dirty="0" smtClean="0">
+                <a:ln>
+                  <a:noFill/>
+                </a:ln>
+                <a:solidFill>
+                  <a:schemeClr val="tx1"/>
+                </a:solidFill>
+                <a:effectLst/>
+                <a:latin typeface="Arial" charset="0"/>
+              </a:rPr>
+              <a:t>Créatures</a:t>
+            </a:r>
+            <a:endParaRPr kumimoji="0" lang="fr-CH" sz="1800" b="0" i="0" u="none" strike="noStrike" cap="none" normalizeH="0" baseline="0" dirty="0" smtClean="0">
+              <a:ln>
+                <a:noFill/>
+              </a:ln>
+              <a:solidFill>
+                <a:schemeClr val="tx1"/>
+              </a:solidFill>
+              <a:effectLst/>
+              <a:latin typeface="Arial" charset="0"/>
+            </a:endParaRPr>
+          </a:p>
+        </p:txBody>
+      </p:sp>
+      <p:sp>
+        <p:nvSpPr>
+          <p:cNvPr id="17" name="Rectangle à coins arrondis 16"/>
+          <p:cNvSpPr/>
+          <p:nvPr/>
+        </p:nvSpPr>
+        <p:spPr bwMode="auto">
+          <a:xfrm>
+            <a:off x="3319485" y="1594615"/>
+            <a:ext cx="2445588" cy="698113"/>
+          </a:xfrm>
+          <a:prstGeom prst="roundRect">
+            <a:avLst/>
+          </a:prstGeom>
+          <a:solidFill>
+            <a:schemeClr val="accent5">
+              <a:lumMod val="75000"/>
+            </a:schemeClr>
+          </a:solidFill>
+          <a:ln>
+            <a:headEnd type="none" w="med" len="med"/>
+            <a:tailEnd type="none" w="med" len="med"/>
+          </a:ln>
+        </p:spPr>
+        <p:style>
+          <a:lnRef idx="0">
+            <a:schemeClr val="accent2"/>
+          </a:lnRef>
+          <a:fillRef idx="3">
+            <a:schemeClr val="accent2"/>
+          </a:fillRef>
+          <a:effectRef idx="3">
+            <a:schemeClr val="accent2"/>
+          </a:effectRef>
+          <a:fontRef idx="minor">
+            <a:schemeClr val="lt1"/>
+          </a:fontRef>
+        </p:style>
+        <p:txBody>
+          <a:bodyPr vert="horz" wrap="square" lIns="91440" tIns="45720" rIns="91440" bIns="45720" numCol="1" rtlCol="0" anchor="t" anchorCtr="0" compatLnSpc="1">
+            <a:prstTxWarp prst="textNoShape">
+              <a:avLst/>
+            </a:prstTxWarp>
+          </a:bodyPr>
+          <a:lstStyle/>
+          <a:p>
+            <a:pPr marL="0" marR="0" indent="0" algn="ctr" defTabSz="914400" rtl="0" eaLnBrk="1" fontAlgn="base" latinLnBrk="0" hangingPunct="1">
+              <a:lnSpc>
+                <a:spcPct val="100000"/>
+              </a:lnSpc>
+              <a:spcBef>
+                <a:spcPct val="0"/>
+              </a:spcBef>
+              <a:spcAft>
+                <a:spcPct val="0"/>
+              </a:spcAft>
+              <a:buClrTx/>
+              <a:buSzTx/>
+              <a:buFontTx/>
+              <a:buNone/>
+              <a:tabLst/>
+            </a:pPr>
+            <a:r>
+              <a:rPr kumimoji="0" lang="fr-CH" sz="1800" b="0" i="0" u="none" strike="noStrike" cap="none" normalizeH="0" baseline="0" dirty="0" smtClean="0">
+                <a:ln>
+                  <a:noFill/>
+                </a:ln>
+                <a:solidFill>
+                  <a:schemeClr val="tx1"/>
+                </a:solidFill>
+                <a:effectLst/>
+                <a:latin typeface="Arial" charset="0"/>
+              </a:rPr>
+              <a:t>Données du joueur </a:t>
+            </a:r>
+          </a:p>
+          <a:p>
+            <a:pPr marL="0" marR="0" indent="0" algn="ctr" defTabSz="914400" rtl="0" eaLnBrk="1" fontAlgn="base" latinLnBrk="0" hangingPunct="1">
+              <a:lnSpc>
+                <a:spcPct val="100000"/>
+              </a:lnSpc>
+              <a:spcBef>
+                <a:spcPct val="0"/>
+              </a:spcBef>
+              <a:spcAft>
+                <a:spcPct val="0"/>
+              </a:spcAft>
+              <a:buClrTx/>
+              <a:buSzTx/>
+              <a:buFontTx/>
+              <a:buNone/>
+              <a:tabLst/>
+            </a:pPr>
+            <a:r>
+              <a:rPr kumimoji="0" lang="fr-CH" sz="1800" b="0" i="0" u="none" strike="noStrike" cap="none" normalizeH="0" baseline="0" dirty="0" smtClean="0">
+                <a:ln>
+                  <a:noFill/>
+                </a:ln>
+                <a:solidFill>
+                  <a:schemeClr val="tx1"/>
+                </a:solidFill>
+                <a:effectLst/>
+                <a:latin typeface="Arial" charset="0"/>
+              </a:rPr>
+              <a:t>et de la partie</a:t>
+            </a:r>
+            <a:endParaRPr kumimoji="0" lang="fr-CH" sz="1800" b="0" i="0" u="none" strike="noStrike" cap="none" normalizeH="0" baseline="0" dirty="0" smtClean="0">
+              <a:ln>
+                <a:noFill/>
+              </a:ln>
+              <a:solidFill>
+                <a:schemeClr val="tx1"/>
+              </a:solidFill>
+              <a:effectLst/>
+              <a:latin typeface="Arial" charset="0"/>
+            </a:endParaRPr>
+          </a:p>
+        </p:txBody>
+      </p:sp>
+      <p:sp>
+        <p:nvSpPr>
+          <p:cNvPr id="18" name="Rectangle à coins arrondis 17"/>
+          <p:cNvSpPr/>
+          <p:nvPr/>
+        </p:nvSpPr>
+        <p:spPr bwMode="auto">
+          <a:xfrm>
+            <a:off x="6191292" y="5560657"/>
+            <a:ext cx="1411287" cy="424253"/>
+          </a:xfrm>
+          <a:prstGeom prst="roundRect">
+            <a:avLst/>
+          </a:prstGeom>
+          <a:solidFill>
+            <a:srgbClr val="BB27A6"/>
+          </a:solidFill>
+          <a:ln>
+            <a:headEnd type="none" w="med" len="med"/>
+            <a:tailEnd type="none" w="med" len="med"/>
+          </a:ln>
+        </p:spPr>
+        <p:style>
+          <a:lnRef idx="0">
+            <a:schemeClr val="accent2"/>
+          </a:lnRef>
+          <a:fillRef idx="3">
+            <a:schemeClr val="accent2"/>
+          </a:fillRef>
+          <a:effectRef idx="3">
+            <a:schemeClr val="accent2"/>
+          </a:effectRef>
+          <a:fontRef idx="minor">
+            <a:schemeClr val="lt1"/>
+          </a:fontRef>
+        </p:style>
+        <p:txBody>
+          <a:bodyPr vert="horz" wrap="square" lIns="91440" tIns="45720" rIns="91440" bIns="45720" numCol="1" rtlCol="0" anchor="t" anchorCtr="0" compatLnSpc="1">
+            <a:prstTxWarp prst="textNoShape">
+              <a:avLst/>
+            </a:prstTxWarp>
+          </a:bodyPr>
+          <a:lstStyle/>
+          <a:p>
+            <a:pPr marL="0" marR="0" indent="0" algn="ctr" defTabSz="914400" rtl="0" eaLnBrk="1" fontAlgn="base" latinLnBrk="0" hangingPunct="1">
+              <a:spcBef>
+                <a:spcPct val="0"/>
+              </a:spcBef>
+              <a:spcAft>
+                <a:spcPct val="0"/>
+              </a:spcAft>
+              <a:buClrTx/>
+              <a:buSzTx/>
+              <a:buFontTx/>
+              <a:buNone/>
+              <a:tabLst/>
+            </a:pPr>
+            <a:r>
+              <a:rPr kumimoji="0" lang="fr-CH" sz="1800" b="0" i="0" u="none" strike="noStrike" cap="none" normalizeH="0" baseline="0" dirty="0" smtClean="0">
+                <a:ln>
+                  <a:noFill/>
+                </a:ln>
+                <a:solidFill>
+                  <a:schemeClr val="tx1"/>
+                </a:solidFill>
+                <a:effectLst/>
+                <a:latin typeface="Arial" charset="0"/>
+              </a:rPr>
+              <a:t>Attaques</a:t>
+            </a:r>
+            <a:endParaRPr kumimoji="0" lang="fr-CH" sz="1800" b="0" i="0" u="none" strike="noStrike" cap="none" normalizeH="0" baseline="0" dirty="0" smtClean="0">
+              <a:ln>
+                <a:noFill/>
+              </a:ln>
+              <a:solidFill>
+                <a:schemeClr val="tx1"/>
+              </a:solidFill>
+              <a:effectLst/>
+              <a:latin typeface="Arial" charset="0"/>
+            </a:endParaRPr>
+          </a:p>
+        </p:txBody>
+      </p:sp>
+      <p:sp>
+        <p:nvSpPr>
+          <p:cNvPr id="31" name="Rectangle à coins arrondis 30"/>
+          <p:cNvSpPr/>
+          <p:nvPr/>
+        </p:nvSpPr>
+        <p:spPr bwMode="auto">
+          <a:xfrm>
+            <a:off x="1444641" y="4633929"/>
+            <a:ext cx="2130435" cy="433804"/>
+          </a:xfrm>
+          <a:prstGeom prst="roundRect">
+            <a:avLst/>
+          </a:prstGeom>
+          <a:solidFill>
+            <a:srgbClr val="B3F6FF"/>
+          </a:solidFill>
+          <a:ln>
+            <a:headEnd type="none" w="med" len="med"/>
+            <a:tailEnd type="none" w="med" len="med"/>
+          </a:ln>
+        </p:spPr>
+        <p:style>
+          <a:lnRef idx="0">
+            <a:schemeClr val="accent2"/>
+          </a:lnRef>
+          <a:fillRef idx="3">
+            <a:schemeClr val="accent2"/>
+          </a:fillRef>
+          <a:effectRef idx="3">
+            <a:schemeClr val="accent2"/>
+          </a:effectRef>
+          <a:fontRef idx="minor">
+            <a:schemeClr val="lt1"/>
+          </a:fontRef>
+        </p:style>
+        <p:txBody>
+          <a:bodyPr vert="horz" wrap="square" lIns="91440" tIns="45720" rIns="91440" bIns="45720" numCol="1" rtlCol="0" anchor="t" anchorCtr="0" compatLnSpc="1">
+            <a:prstTxWarp prst="textNoShape">
+              <a:avLst/>
+            </a:prstTxWarp>
+          </a:bodyPr>
+          <a:lstStyle/>
+          <a:p>
+            <a:pPr marL="0" marR="0" indent="0" algn="ctr" defTabSz="914400" rtl="0" eaLnBrk="1" fontAlgn="base" latinLnBrk="0" hangingPunct="1">
+              <a:lnSpc>
+                <a:spcPct val="100000"/>
+              </a:lnSpc>
+              <a:spcBef>
+                <a:spcPct val="0"/>
+              </a:spcBef>
+              <a:spcAft>
+                <a:spcPct val="0"/>
+              </a:spcAft>
+              <a:buClrTx/>
+              <a:buSzTx/>
+              <a:buFontTx/>
+              <a:buNone/>
+              <a:tabLst/>
+            </a:pPr>
+            <a:r>
+              <a:rPr kumimoji="0" lang="fr-CH" sz="1800" b="0" i="0" u="none" strike="noStrike" cap="none" normalizeH="0" baseline="0" dirty="0" smtClean="0">
+                <a:ln>
+                  <a:noFill/>
+                </a:ln>
+                <a:solidFill>
+                  <a:schemeClr val="tx1"/>
+                </a:solidFill>
+                <a:effectLst/>
+                <a:latin typeface="Arial" charset="0"/>
+              </a:rPr>
+              <a:t>Maillage Terrien</a:t>
+            </a:r>
+            <a:endParaRPr kumimoji="0" lang="fr-CH" sz="1800" b="0" i="0" u="none" strike="noStrike" cap="none" normalizeH="0" baseline="0" dirty="0" smtClean="0">
+              <a:ln>
+                <a:noFill/>
+              </a:ln>
+              <a:solidFill>
+                <a:schemeClr val="tx1"/>
+              </a:solidFill>
+              <a:effectLst/>
+              <a:latin typeface="Arial" charset="0"/>
+            </a:endParaRPr>
+          </a:p>
+        </p:txBody>
+      </p:sp>
+      <p:sp>
+        <p:nvSpPr>
+          <p:cNvPr id="32" name="Rectangle à coins arrondis 31"/>
+          <p:cNvSpPr/>
+          <p:nvPr/>
+        </p:nvSpPr>
+        <p:spPr bwMode="auto">
+          <a:xfrm>
+            <a:off x="1444641" y="5291163"/>
+            <a:ext cx="2130435" cy="408596"/>
+          </a:xfrm>
+          <a:prstGeom prst="roundRect">
+            <a:avLst/>
+          </a:prstGeom>
+          <a:solidFill>
+            <a:srgbClr val="B3F6FF"/>
+          </a:solidFill>
+          <a:ln>
+            <a:headEnd type="none" w="med" len="med"/>
+            <a:tailEnd type="none" w="med" len="med"/>
+          </a:ln>
+        </p:spPr>
+        <p:style>
+          <a:lnRef idx="0">
+            <a:schemeClr val="accent2"/>
+          </a:lnRef>
+          <a:fillRef idx="3">
+            <a:schemeClr val="accent2"/>
+          </a:fillRef>
+          <a:effectRef idx="3">
+            <a:schemeClr val="accent2"/>
+          </a:effectRef>
+          <a:fontRef idx="minor">
+            <a:schemeClr val="lt1"/>
+          </a:fontRef>
+        </p:style>
+        <p:txBody>
+          <a:bodyPr vert="horz" wrap="square" lIns="91440" tIns="45720" rIns="91440" bIns="45720" numCol="1" rtlCol="0" anchor="t" anchorCtr="0" compatLnSpc="1">
+            <a:prstTxWarp prst="textNoShape">
+              <a:avLst/>
+            </a:prstTxWarp>
+          </a:bodyPr>
+          <a:lstStyle/>
+          <a:p>
+            <a:pPr marL="0" marR="0" indent="0" algn="ctr" defTabSz="914400" rtl="0" eaLnBrk="1" fontAlgn="base" latinLnBrk="0" hangingPunct="1">
+              <a:lnSpc>
+                <a:spcPct val="100000"/>
+              </a:lnSpc>
+              <a:spcBef>
+                <a:spcPct val="0"/>
+              </a:spcBef>
+              <a:spcAft>
+                <a:spcPct val="0"/>
+              </a:spcAft>
+              <a:buClrTx/>
+              <a:buSzTx/>
+              <a:buFontTx/>
+              <a:buNone/>
+              <a:tabLst/>
+            </a:pPr>
+            <a:r>
+              <a:rPr kumimoji="0" lang="fr-CH" sz="1800" b="0" i="0" u="none" strike="noStrike" cap="none" normalizeH="0" baseline="0" dirty="0" smtClean="0">
+                <a:ln>
+                  <a:noFill/>
+                </a:ln>
+                <a:solidFill>
+                  <a:schemeClr val="tx1"/>
+                </a:solidFill>
+                <a:effectLst/>
+                <a:latin typeface="Arial" charset="0"/>
+              </a:rPr>
+              <a:t>Chemin aérien</a:t>
+            </a:r>
+            <a:endParaRPr kumimoji="0" lang="fr-CH" sz="1800" b="0" i="0" u="none" strike="noStrike" cap="none" normalizeH="0" baseline="0" dirty="0" smtClean="0">
+              <a:ln>
+                <a:noFill/>
+              </a:ln>
+              <a:solidFill>
+                <a:schemeClr val="tx1"/>
+              </a:solidFill>
+              <a:effectLst/>
+              <a:latin typeface="Arial" charset="0"/>
+            </a:endParaRPr>
+          </a:p>
+        </p:txBody>
+      </p:sp>
+      <p:sp>
+        <p:nvSpPr>
+          <p:cNvPr id="33" name="Rectangle à coins arrondis 32"/>
+          <p:cNvSpPr/>
+          <p:nvPr/>
+        </p:nvSpPr>
+        <p:spPr bwMode="auto">
+          <a:xfrm>
+            <a:off x="1444641" y="4013208"/>
+            <a:ext cx="2130435" cy="425552"/>
+          </a:xfrm>
+          <a:prstGeom prst="roundRect">
+            <a:avLst/>
+          </a:prstGeom>
+          <a:solidFill>
+            <a:srgbClr val="FFC000"/>
+          </a:solidFill>
+          <a:ln>
+            <a:headEnd type="none" w="med" len="med"/>
+            <a:tailEnd type="none" w="med" len="med"/>
+          </a:ln>
+        </p:spPr>
+        <p:style>
+          <a:lnRef idx="0">
+            <a:schemeClr val="accent2"/>
+          </a:lnRef>
+          <a:fillRef idx="3">
+            <a:schemeClr val="accent2"/>
+          </a:fillRef>
+          <a:effectRef idx="3">
+            <a:schemeClr val="accent2"/>
+          </a:effectRef>
+          <a:fontRef idx="minor">
+            <a:schemeClr val="lt1"/>
+          </a:fontRef>
+        </p:style>
+        <p:txBody>
+          <a:bodyPr vert="horz" wrap="square" lIns="91440" tIns="45720" rIns="91440" bIns="45720" numCol="1" rtlCol="0" anchor="t" anchorCtr="0" compatLnSpc="1">
+            <a:prstTxWarp prst="textNoShape">
+              <a:avLst/>
+            </a:prstTxWarp>
+          </a:bodyPr>
+          <a:lstStyle/>
+          <a:p>
+            <a:pPr marL="0" marR="0" indent="0" algn="ctr" defTabSz="914400" rtl="0" eaLnBrk="1" fontAlgn="base" latinLnBrk="0" hangingPunct="1">
+              <a:lnSpc>
+                <a:spcPct val="100000"/>
+              </a:lnSpc>
+              <a:spcBef>
+                <a:spcPct val="0"/>
+              </a:spcBef>
+              <a:spcAft>
+                <a:spcPct val="0"/>
+              </a:spcAft>
+              <a:buClrTx/>
+              <a:buSzTx/>
+              <a:buFontTx/>
+              <a:buNone/>
+              <a:tabLst/>
+            </a:pPr>
+            <a:r>
+              <a:rPr lang="fr-CH" u="none" dirty="0" smtClean="0">
+                <a:solidFill>
+                  <a:schemeClr val="tx1"/>
+                </a:solidFill>
+                <a:latin typeface="Arial" charset="0"/>
+              </a:rPr>
+              <a:t>Zones spéciales</a:t>
+            </a:r>
+            <a:endParaRPr kumimoji="0" lang="fr-CH" sz="1800" b="0" i="0" u="none" strike="noStrike" cap="none" normalizeH="0" baseline="0" dirty="0" smtClean="0">
+              <a:ln>
+                <a:noFill/>
+              </a:ln>
+              <a:solidFill>
+                <a:schemeClr val="tx1"/>
+              </a:solidFill>
+              <a:effectLst/>
+              <a:latin typeface="Arial" charset="0"/>
+            </a:endParaRPr>
+          </a:p>
+        </p:txBody>
+      </p:sp>
     </p:spTree>
   </p:cSld>
   <p:clrMapOvr>
     <a:masterClrMapping/>
   </p:clrMapOvr>
-  <p:transition>
-    <p:fade/>
-  </p:transition>
+  <p:transition/>
   <p:timing>
     <p:tnLst>
       <p:par>
-        <p:cTn id="1" dur="indefinite" restart="never" nodeType="tmRoot"/>
+        <p:cTn id="1" dur="indefinite" restart="never" nodeType="tmRoot">
+          <p:childTnLst>
+            <p:seq concurrent="1" nextAc="seek">
+              <p:cTn id="2" dur="indefinite" nodeType="mainSeq">
+                <p:childTnLst>
+                  <p:par>
+                    <p:cTn id="3" fill="hold">
+                      <p:stCondLst>
+                        <p:cond delay="indefinite"/>
+                      </p:stCondLst>
+                      <p:childTnLst>
+                        <p:par>
+                          <p:cTn id="4" fill="hold">
+                            <p:stCondLst>
+                              <p:cond delay="0"/>
+                            </p:stCondLst>
+                            <p:childTnLst>
+                              <p:par>
+                                <p:cTn id="5" presetID="55" presetClass="entr" presetSubtype="0" fill="hold" grpId="0" nodeType="clickEffect">
+                                  <p:stCondLst>
+                                    <p:cond delay="0"/>
+                                  </p:stCondLst>
+                                  <p:childTnLst>
+                                    <p:set>
+                                      <p:cBhvr>
+                                        <p:cTn id="6" dur="1" fill="hold">
+                                          <p:stCondLst>
+                                            <p:cond delay="0"/>
+                                          </p:stCondLst>
+                                        </p:cTn>
+                                        <p:tgtEl>
+                                          <p:spTgt spid="31"/>
+                                        </p:tgtEl>
+                                        <p:attrNameLst>
+                                          <p:attrName>style.visibility</p:attrName>
+                                        </p:attrNameLst>
+                                      </p:cBhvr>
+                                      <p:to>
+                                        <p:strVal val="visible"/>
+                                      </p:to>
+                                    </p:set>
+                                    <p:anim calcmode="lin" valueType="num">
+                                      <p:cBhvr>
+                                        <p:cTn id="7" dur="1000" fill="hold"/>
+                                        <p:tgtEl>
+                                          <p:spTgt spid="31"/>
+                                        </p:tgtEl>
+                                        <p:attrNameLst>
+                                          <p:attrName>ppt_w</p:attrName>
+                                        </p:attrNameLst>
+                                      </p:cBhvr>
+                                      <p:tavLst>
+                                        <p:tav tm="0">
+                                          <p:val>
+                                            <p:strVal val="#ppt_w*0.70"/>
+                                          </p:val>
+                                        </p:tav>
+                                        <p:tav tm="100000">
+                                          <p:val>
+                                            <p:strVal val="#ppt_w"/>
+                                          </p:val>
+                                        </p:tav>
+                                      </p:tavLst>
+                                    </p:anim>
+                                    <p:anim calcmode="lin" valueType="num">
+                                      <p:cBhvr>
+                                        <p:cTn id="8" dur="1000" fill="hold"/>
+                                        <p:tgtEl>
+                                          <p:spTgt spid="31"/>
+                                        </p:tgtEl>
+                                        <p:attrNameLst>
+                                          <p:attrName>ppt_h</p:attrName>
+                                        </p:attrNameLst>
+                                      </p:cBhvr>
+                                      <p:tavLst>
+                                        <p:tav tm="0">
+                                          <p:val>
+                                            <p:strVal val="#ppt_h"/>
+                                          </p:val>
+                                        </p:tav>
+                                        <p:tav tm="100000">
+                                          <p:val>
+                                            <p:strVal val="#ppt_h"/>
+                                          </p:val>
+                                        </p:tav>
+                                      </p:tavLst>
+                                    </p:anim>
+                                    <p:animEffect transition="in" filter="fade">
+                                      <p:cBhvr>
+                                        <p:cTn id="9" dur="1000"/>
+                                        <p:tgtEl>
+                                          <p:spTgt spid="31"/>
+                                        </p:tgtEl>
+                                      </p:cBhvr>
+                                    </p:animEffect>
+                                  </p:childTnLst>
+                                </p:cTn>
+                              </p:par>
+                              <p:par>
+                                <p:cTn id="10" presetID="55" presetClass="entr" presetSubtype="0" fill="hold" grpId="0" nodeType="withEffect">
+                                  <p:stCondLst>
+                                    <p:cond delay="0"/>
+                                  </p:stCondLst>
+                                  <p:childTnLst>
+                                    <p:set>
+                                      <p:cBhvr>
+                                        <p:cTn id="11" dur="1" fill="hold">
+                                          <p:stCondLst>
+                                            <p:cond delay="0"/>
+                                          </p:stCondLst>
+                                        </p:cTn>
+                                        <p:tgtEl>
+                                          <p:spTgt spid="32"/>
+                                        </p:tgtEl>
+                                        <p:attrNameLst>
+                                          <p:attrName>style.visibility</p:attrName>
+                                        </p:attrNameLst>
+                                      </p:cBhvr>
+                                      <p:to>
+                                        <p:strVal val="visible"/>
+                                      </p:to>
+                                    </p:set>
+                                    <p:anim calcmode="lin" valueType="num">
+                                      <p:cBhvr>
+                                        <p:cTn id="12" dur="1000" fill="hold"/>
+                                        <p:tgtEl>
+                                          <p:spTgt spid="32"/>
+                                        </p:tgtEl>
+                                        <p:attrNameLst>
+                                          <p:attrName>ppt_w</p:attrName>
+                                        </p:attrNameLst>
+                                      </p:cBhvr>
+                                      <p:tavLst>
+                                        <p:tav tm="0">
+                                          <p:val>
+                                            <p:strVal val="#ppt_w*0.70"/>
+                                          </p:val>
+                                        </p:tav>
+                                        <p:tav tm="100000">
+                                          <p:val>
+                                            <p:strVal val="#ppt_w"/>
+                                          </p:val>
+                                        </p:tav>
+                                      </p:tavLst>
+                                    </p:anim>
+                                    <p:anim calcmode="lin" valueType="num">
+                                      <p:cBhvr>
+                                        <p:cTn id="13" dur="1000" fill="hold"/>
+                                        <p:tgtEl>
+                                          <p:spTgt spid="32"/>
+                                        </p:tgtEl>
+                                        <p:attrNameLst>
+                                          <p:attrName>ppt_h</p:attrName>
+                                        </p:attrNameLst>
+                                      </p:cBhvr>
+                                      <p:tavLst>
+                                        <p:tav tm="0">
+                                          <p:val>
+                                            <p:strVal val="#ppt_h"/>
+                                          </p:val>
+                                        </p:tav>
+                                        <p:tav tm="100000">
+                                          <p:val>
+                                            <p:strVal val="#ppt_h"/>
+                                          </p:val>
+                                        </p:tav>
+                                      </p:tavLst>
+                                    </p:anim>
+                                    <p:animEffect transition="in" filter="fade">
+                                      <p:cBhvr>
+                                        <p:cTn id="14" dur="1000"/>
+                                        <p:tgtEl>
+                                          <p:spTgt spid="32"/>
+                                        </p:tgtEl>
+                                      </p:cBhvr>
+                                    </p:animEffect>
+                                  </p:childTnLst>
+                                </p:cTn>
+                              </p:par>
+                              <p:par>
+                                <p:cTn id="15" presetID="55" presetClass="entr" presetSubtype="0" fill="hold" grpId="0" nodeType="withEffect">
+                                  <p:stCondLst>
+                                    <p:cond delay="0"/>
+                                  </p:stCondLst>
+                                  <p:childTnLst>
+                                    <p:set>
+                                      <p:cBhvr>
+                                        <p:cTn id="16" dur="1" fill="hold">
+                                          <p:stCondLst>
+                                            <p:cond delay="0"/>
+                                          </p:stCondLst>
+                                        </p:cTn>
+                                        <p:tgtEl>
+                                          <p:spTgt spid="33"/>
+                                        </p:tgtEl>
+                                        <p:attrNameLst>
+                                          <p:attrName>style.visibility</p:attrName>
+                                        </p:attrNameLst>
+                                      </p:cBhvr>
+                                      <p:to>
+                                        <p:strVal val="visible"/>
+                                      </p:to>
+                                    </p:set>
+                                    <p:anim calcmode="lin" valueType="num">
+                                      <p:cBhvr>
+                                        <p:cTn id="17" dur="1000" fill="hold"/>
+                                        <p:tgtEl>
+                                          <p:spTgt spid="33"/>
+                                        </p:tgtEl>
+                                        <p:attrNameLst>
+                                          <p:attrName>ppt_w</p:attrName>
+                                        </p:attrNameLst>
+                                      </p:cBhvr>
+                                      <p:tavLst>
+                                        <p:tav tm="0">
+                                          <p:val>
+                                            <p:strVal val="#ppt_w*0.70"/>
+                                          </p:val>
+                                        </p:tav>
+                                        <p:tav tm="100000">
+                                          <p:val>
+                                            <p:strVal val="#ppt_w"/>
+                                          </p:val>
+                                        </p:tav>
+                                      </p:tavLst>
+                                    </p:anim>
+                                    <p:anim calcmode="lin" valueType="num">
+                                      <p:cBhvr>
+                                        <p:cTn id="18" dur="1000" fill="hold"/>
+                                        <p:tgtEl>
+                                          <p:spTgt spid="33"/>
+                                        </p:tgtEl>
+                                        <p:attrNameLst>
+                                          <p:attrName>ppt_h</p:attrName>
+                                        </p:attrNameLst>
+                                      </p:cBhvr>
+                                      <p:tavLst>
+                                        <p:tav tm="0">
+                                          <p:val>
+                                            <p:strVal val="#ppt_h"/>
+                                          </p:val>
+                                        </p:tav>
+                                        <p:tav tm="100000">
+                                          <p:val>
+                                            <p:strVal val="#ppt_h"/>
+                                          </p:val>
+                                        </p:tav>
+                                      </p:tavLst>
+                                    </p:anim>
+                                    <p:animEffect transition="in" filter="fade">
+                                      <p:cBhvr>
+                                        <p:cTn id="19" dur="1000"/>
+                                        <p:tgtEl>
+                                          <p:spTgt spid="33"/>
+                                        </p:tgtEl>
+                                      </p:cBhvr>
+                                    </p:animEffect>
+                                  </p:childTnLst>
+                                </p:cTn>
+                              </p:par>
+                            </p:childTnLst>
+                          </p:cTn>
+                        </p:par>
+                      </p:childTnLst>
+                    </p:cTn>
+                  </p:par>
+                  <p:par>
+                    <p:cTn id="20" fill="hold">
+                      <p:stCondLst>
+                        <p:cond delay="indefinite"/>
+                      </p:stCondLst>
+                      <p:childTnLst>
+                        <p:par>
+                          <p:cTn id="21" fill="hold">
+                            <p:stCondLst>
+                              <p:cond delay="0"/>
+                            </p:stCondLst>
+                            <p:childTnLst>
+                              <p:par>
+                                <p:cTn id="22" presetID="55" presetClass="entr" presetSubtype="0" fill="hold" grpId="0" nodeType="clickEffect">
+                                  <p:stCondLst>
+                                    <p:cond delay="0"/>
+                                  </p:stCondLst>
+                                  <p:childTnLst>
+                                    <p:set>
+                                      <p:cBhvr>
+                                        <p:cTn id="23" dur="1" fill="hold">
+                                          <p:stCondLst>
+                                            <p:cond delay="0"/>
+                                          </p:stCondLst>
+                                        </p:cTn>
+                                        <p:tgtEl>
+                                          <p:spTgt spid="16"/>
+                                        </p:tgtEl>
+                                        <p:attrNameLst>
+                                          <p:attrName>style.visibility</p:attrName>
+                                        </p:attrNameLst>
+                                      </p:cBhvr>
+                                      <p:to>
+                                        <p:strVal val="visible"/>
+                                      </p:to>
+                                    </p:set>
+                                    <p:anim calcmode="lin" valueType="num">
+                                      <p:cBhvr>
+                                        <p:cTn id="24" dur="1000" fill="hold"/>
+                                        <p:tgtEl>
+                                          <p:spTgt spid="16"/>
+                                        </p:tgtEl>
+                                        <p:attrNameLst>
+                                          <p:attrName>ppt_w</p:attrName>
+                                        </p:attrNameLst>
+                                      </p:cBhvr>
+                                      <p:tavLst>
+                                        <p:tav tm="0">
+                                          <p:val>
+                                            <p:strVal val="#ppt_w*0.70"/>
+                                          </p:val>
+                                        </p:tav>
+                                        <p:tav tm="100000">
+                                          <p:val>
+                                            <p:strVal val="#ppt_w"/>
+                                          </p:val>
+                                        </p:tav>
+                                      </p:tavLst>
+                                    </p:anim>
+                                    <p:anim calcmode="lin" valueType="num">
+                                      <p:cBhvr>
+                                        <p:cTn id="25" dur="1000" fill="hold"/>
+                                        <p:tgtEl>
+                                          <p:spTgt spid="16"/>
+                                        </p:tgtEl>
+                                        <p:attrNameLst>
+                                          <p:attrName>ppt_h</p:attrName>
+                                        </p:attrNameLst>
+                                      </p:cBhvr>
+                                      <p:tavLst>
+                                        <p:tav tm="0">
+                                          <p:val>
+                                            <p:strVal val="#ppt_h"/>
+                                          </p:val>
+                                        </p:tav>
+                                        <p:tav tm="100000">
+                                          <p:val>
+                                            <p:strVal val="#ppt_h"/>
+                                          </p:val>
+                                        </p:tav>
+                                      </p:tavLst>
+                                    </p:anim>
+                                    <p:animEffect transition="in" filter="fade">
+                                      <p:cBhvr>
+                                        <p:cTn id="26" dur="1000"/>
+                                        <p:tgtEl>
+                                          <p:spTgt spid="16"/>
+                                        </p:tgtEl>
+                                      </p:cBhvr>
+                                    </p:animEffect>
+                                  </p:childTnLst>
+                                </p:cTn>
+                              </p:par>
+                              <p:par>
+                                <p:cTn id="27" presetID="55" presetClass="entr" presetSubtype="0" fill="hold" grpId="0" nodeType="withEffect">
+                                  <p:stCondLst>
+                                    <p:cond delay="0"/>
+                                  </p:stCondLst>
+                                  <p:childTnLst>
+                                    <p:set>
+                                      <p:cBhvr>
+                                        <p:cTn id="28" dur="1" fill="hold">
+                                          <p:stCondLst>
+                                            <p:cond delay="0"/>
+                                          </p:stCondLst>
+                                        </p:cTn>
+                                        <p:tgtEl>
+                                          <p:spTgt spid="14"/>
+                                        </p:tgtEl>
+                                        <p:attrNameLst>
+                                          <p:attrName>style.visibility</p:attrName>
+                                        </p:attrNameLst>
+                                      </p:cBhvr>
+                                      <p:to>
+                                        <p:strVal val="visible"/>
+                                      </p:to>
+                                    </p:set>
+                                    <p:anim calcmode="lin" valueType="num">
+                                      <p:cBhvr>
+                                        <p:cTn id="29" dur="1000" fill="hold"/>
+                                        <p:tgtEl>
+                                          <p:spTgt spid="14"/>
+                                        </p:tgtEl>
+                                        <p:attrNameLst>
+                                          <p:attrName>ppt_w</p:attrName>
+                                        </p:attrNameLst>
+                                      </p:cBhvr>
+                                      <p:tavLst>
+                                        <p:tav tm="0">
+                                          <p:val>
+                                            <p:strVal val="#ppt_w*0.70"/>
+                                          </p:val>
+                                        </p:tav>
+                                        <p:tav tm="100000">
+                                          <p:val>
+                                            <p:strVal val="#ppt_w"/>
+                                          </p:val>
+                                        </p:tav>
+                                      </p:tavLst>
+                                    </p:anim>
+                                    <p:anim calcmode="lin" valueType="num">
+                                      <p:cBhvr>
+                                        <p:cTn id="30" dur="1000" fill="hold"/>
+                                        <p:tgtEl>
+                                          <p:spTgt spid="14"/>
+                                        </p:tgtEl>
+                                        <p:attrNameLst>
+                                          <p:attrName>ppt_h</p:attrName>
+                                        </p:attrNameLst>
+                                      </p:cBhvr>
+                                      <p:tavLst>
+                                        <p:tav tm="0">
+                                          <p:val>
+                                            <p:strVal val="#ppt_h"/>
+                                          </p:val>
+                                        </p:tav>
+                                        <p:tav tm="100000">
+                                          <p:val>
+                                            <p:strVal val="#ppt_h"/>
+                                          </p:val>
+                                        </p:tav>
+                                      </p:tavLst>
+                                    </p:anim>
+                                    <p:animEffect transition="in" filter="fade">
+                                      <p:cBhvr>
+                                        <p:cTn id="31" dur="1000"/>
+                                        <p:tgtEl>
+                                          <p:spTgt spid="14"/>
+                                        </p:tgtEl>
+                                      </p:cBhvr>
+                                    </p:animEffect>
+                                  </p:childTnLst>
+                                </p:cTn>
+                              </p:par>
+                              <p:par>
+                                <p:cTn id="32" presetID="55" presetClass="entr" presetSubtype="0" fill="hold" grpId="0" nodeType="withEffect">
+                                  <p:stCondLst>
+                                    <p:cond delay="0"/>
+                                  </p:stCondLst>
+                                  <p:childTnLst>
+                                    <p:set>
+                                      <p:cBhvr>
+                                        <p:cTn id="33" dur="1" fill="hold">
+                                          <p:stCondLst>
+                                            <p:cond delay="0"/>
+                                          </p:stCondLst>
+                                        </p:cTn>
+                                        <p:tgtEl>
+                                          <p:spTgt spid="15"/>
+                                        </p:tgtEl>
+                                        <p:attrNameLst>
+                                          <p:attrName>style.visibility</p:attrName>
+                                        </p:attrNameLst>
+                                      </p:cBhvr>
+                                      <p:to>
+                                        <p:strVal val="visible"/>
+                                      </p:to>
+                                    </p:set>
+                                    <p:anim calcmode="lin" valueType="num">
+                                      <p:cBhvr>
+                                        <p:cTn id="34" dur="1000" fill="hold"/>
+                                        <p:tgtEl>
+                                          <p:spTgt spid="15"/>
+                                        </p:tgtEl>
+                                        <p:attrNameLst>
+                                          <p:attrName>ppt_w</p:attrName>
+                                        </p:attrNameLst>
+                                      </p:cBhvr>
+                                      <p:tavLst>
+                                        <p:tav tm="0">
+                                          <p:val>
+                                            <p:strVal val="#ppt_w*0.70"/>
+                                          </p:val>
+                                        </p:tav>
+                                        <p:tav tm="100000">
+                                          <p:val>
+                                            <p:strVal val="#ppt_w"/>
+                                          </p:val>
+                                        </p:tav>
+                                      </p:tavLst>
+                                    </p:anim>
+                                    <p:anim calcmode="lin" valueType="num">
+                                      <p:cBhvr>
+                                        <p:cTn id="35" dur="1000" fill="hold"/>
+                                        <p:tgtEl>
+                                          <p:spTgt spid="15"/>
+                                        </p:tgtEl>
+                                        <p:attrNameLst>
+                                          <p:attrName>ppt_h</p:attrName>
+                                        </p:attrNameLst>
+                                      </p:cBhvr>
+                                      <p:tavLst>
+                                        <p:tav tm="0">
+                                          <p:val>
+                                            <p:strVal val="#ppt_h"/>
+                                          </p:val>
+                                        </p:tav>
+                                        <p:tav tm="100000">
+                                          <p:val>
+                                            <p:strVal val="#ppt_h"/>
+                                          </p:val>
+                                        </p:tav>
+                                      </p:tavLst>
+                                    </p:anim>
+                                    <p:animEffect transition="in" filter="fade">
+                                      <p:cBhvr>
+                                        <p:cTn id="36" dur="1000"/>
+                                        <p:tgtEl>
+                                          <p:spTgt spid="15"/>
+                                        </p:tgtEl>
+                                      </p:cBhvr>
+                                    </p:animEffect>
+                                  </p:childTnLst>
+                                </p:cTn>
+                              </p:par>
+                              <p:par>
+                                <p:cTn id="37" presetID="55" presetClass="entr" presetSubtype="0" fill="hold" grpId="0" nodeType="withEffect">
+                                  <p:stCondLst>
+                                    <p:cond delay="0"/>
+                                  </p:stCondLst>
+                                  <p:childTnLst>
+                                    <p:set>
+                                      <p:cBhvr>
+                                        <p:cTn id="38" dur="1" fill="hold">
+                                          <p:stCondLst>
+                                            <p:cond delay="0"/>
+                                          </p:stCondLst>
+                                        </p:cTn>
+                                        <p:tgtEl>
+                                          <p:spTgt spid="13"/>
+                                        </p:tgtEl>
+                                        <p:attrNameLst>
+                                          <p:attrName>style.visibility</p:attrName>
+                                        </p:attrNameLst>
+                                      </p:cBhvr>
+                                      <p:to>
+                                        <p:strVal val="visible"/>
+                                      </p:to>
+                                    </p:set>
+                                    <p:anim calcmode="lin" valueType="num">
+                                      <p:cBhvr>
+                                        <p:cTn id="39" dur="1000" fill="hold"/>
+                                        <p:tgtEl>
+                                          <p:spTgt spid="13"/>
+                                        </p:tgtEl>
+                                        <p:attrNameLst>
+                                          <p:attrName>ppt_w</p:attrName>
+                                        </p:attrNameLst>
+                                      </p:cBhvr>
+                                      <p:tavLst>
+                                        <p:tav tm="0">
+                                          <p:val>
+                                            <p:strVal val="#ppt_w*0.70"/>
+                                          </p:val>
+                                        </p:tav>
+                                        <p:tav tm="100000">
+                                          <p:val>
+                                            <p:strVal val="#ppt_w"/>
+                                          </p:val>
+                                        </p:tav>
+                                      </p:tavLst>
+                                    </p:anim>
+                                    <p:anim calcmode="lin" valueType="num">
+                                      <p:cBhvr>
+                                        <p:cTn id="40" dur="1000" fill="hold"/>
+                                        <p:tgtEl>
+                                          <p:spTgt spid="13"/>
+                                        </p:tgtEl>
+                                        <p:attrNameLst>
+                                          <p:attrName>ppt_h</p:attrName>
+                                        </p:attrNameLst>
+                                      </p:cBhvr>
+                                      <p:tavLst>
+                                        <p:tav tm="0">
+                                          <p:val>
+                                            <p:strVal val="#ppt_h"/>
+                                          </p:val>
+                                        </p:tav>
+                                        <p:tav tm="100000">
+                                          <p:val>
+                                            <p:strVal val="#ppt_h"/>
+                                          </p:val>
+                                        </p:tav>
+                                      </p:tavLst>
+                                    </p:anim>
+                                    <p:animEffect transition="in" filter="fade">
+                                      <p:cBhvr>
+                                        <p:cTn id="41" dur="1000"/>
+                                        <p:tgtEl>
+                                          <p:spTgt spid="13"/>
+                                        </p:tgtEl>
+                                      </p:cBhvr>
+                                    </p:animEffect>
+                                  </p:childTnLst>
+                                </p:cTn>
+                              </p:par>
+                              <p:par>
+                                <p:cTn id="42" presetID="55" presetClass="entr" presetSubtype="0" fill="hold" grpId="0" nodeType="withEffect">
+                                  <p:stCondLst>
+                                    <p:cond delay="0"/>
+                                  </p:stCondLst>
+                                  <p:childTnLst>
+                                    <p:set>
+                                      <p:cBhvr>
+                                        <p:cTn id="43" dur="1" fill="hold">
+                                          <p:stCondLst>
+                                            <p:cond delay="0"/>
+                                          </p:stCondLst>
+                                        </p:cTn>
+                                        <p:tgtEl>
+                                          <p:spTgt spid="18"/>
+                                        </p:tgtEl>
+                                        <p:attrNameLst>
+                                          <p:attrName>style.visibility</p:attrName>
+                                        </p:attrNameLst>
+                                      </p:cBhvr>
+                                      <p:to>
+                                        <p:strVal val="visible"/>
+                                      </p:to>
+                                    </p:set>
+                                    <p:anim calcmode="lin" valueType="num">
+                                      <p:cBhvr>
+                                        <p:cTn id="44" dur="1000" fill="hold"/>
+                                        <p:tgtEl>
+                                          <p:spTgt spid="18"/>
+                                        </p:tgtEl>
+                                        <p:attrNameLst>
+                                          <p:attrName>ppt_w</p:attrName>
+                                        </p:attrNameLst>
+                                      </p:cBhvr>
+                                      <p:tavLst>
+                                        <p:tav tm="0">
+                                          <p:val>
+                                            <p:strVal val="#ppt_w*0.70"/>
+                                          </p:val>
+                                        </p:tav>
+                                        <p:tav tm="100000">
+                                          <p:val>
+                                            <p:strVal val="#ppt_w"/>
+                                          </p:val>
+                                        </p:tav>
+                                      </p:tavLst>
+                                    </p:anim>
+                                    <p:anim calcmode="lin" valueType="num">
+                                      <p:cBhvr>
+                                        <p:cTn id="45" dur="1000" fill="hold"/>
+                                        <p:tgtEl>
+                                          <p:spTgt spid="18"/>
+                                        </p:tgtEl>
+                                        <p:attrNameLst>
+                                          <p:attrName>ppt_h</p:attrName>
+                                        </p:attrNameLst>
+                                      </p:cBhvr>
+                                      <p:tavLst>
+                                        <p:tav tm="0">
+                                          <p:val>
+                                            <p:strVal val="#ppt_h"/>
+                                          </p:val>
+                                        </p:tav>
+                                        <p:tav tm="100000">
+                                          <p:val>
+                                            <p:strVal val="#ppt_h"/>
+                                          </p:val>
+                                        </p:tav>
+                                      </p:tavLst>
+                                    </p:anim>
+                                    <p:animEffect transition="in" filter="fade">
+                                      <p:cBhvr>
+                                        <p:cTn id="46" dur="1000"/>
+                                        <p:tgtEl>
+                                          <p:spTgt spid="18"/>
+                                        </p:tgtEl>
+                                      </p:cBhvr>
+                                    </p:animEffect>
+                                  </p:childTnLst>
+                                </p:cTn>
+                              </p:par>
+                            </p:childTnLst>
+                          </p:cTn>
+                        </p:par>
+                      </p:childTnLst>
+                    </p:cTn>
+                  </p:par>
+                </p:childTnLst>
+              </p:cTn>
+              <p:prevCondLst>
+                <p:cond evt="onPrev" delay="0">
+                  <p:tgtEl>
+                    <p:sldTgt/>
+                  </p:tgtEl>
+                </p:cond>
+              </p:prevCondLst>
+              <p:nextCondLst>
+                <p:cond evt="onNext" delay="0">
+                  <p:tgtEl>
+                    <p:sldTgt/>
+                  </p:tgtEl>
+                </p:cond>
+              </p:nextCondLst>
+            </p:seq>
+          </p:childTnLst>
+        </p:cTn>
       </p:par>
     </p:tnLst>
+    <p:bldLst>
+      <p:bldP spid="16" grpId="0" animBg="1"/>
+      <p:bldP spid="14" grpId="0" animBg="1"/>
+      <p:bldP spid="15" grpId="0" animBg="1"/>
+      <p:bldP spid="13" grpId="0" animBg="1"/>
+      <p:bldP spid="18" grpId="0" animBg="1"/>
+      <p:bldP spid="31" grpId="0" animBg="1"/>
+      <p:bldP spid="32" grpId="0" animBg="1"/>
+      <p:bldP spid="33" grpId="0" animBg="1"/>
+    </p:bldLst>
   </p:timing>
 </p:sld>
 </file>
@@ -8426,7 +10142,7 @@
           <a:bodyPr wrap="none" anchor="ctr"/>
           <a:lstStyle/>
           <a:p>
-            <a:endParaRPr lang="fr-CH"/>
+            <a:endParaRPr lang="fr-CH" dirty="0"/>
           </a:p>
         </p:txBody>
       </p:sp>
@@ -8463,7 +10179,7 @@
           <a:p>
             <a:pPr algn="ctr"/>
             <a:r>
-              <a:rPr lang="fr-CH" sz="2000" b="1" u="none">
+              <a:rPr lang="fr-CH" sz="2000" b="1" u="none" dirty="0">
                 <a:solidFill>
                   <a:schemeClr val="bg1"/>
                 </a:solidFill>
@@ -8476,7 +10192,7 @@
               </a:rPr>
               <a:t>CONCLUSION</a:t>
             </a:r>
-            <a:endParaRPr lang="fr-FR" sz="2000" b="1" u="none">
+            <a:endParaRPr lang="fr-FR" sz="2000" b="1" u="none" dirty="0">
               <a:solidFill>
                 <a:schemeClr val="bg1"/>
               </a:solidFill>
@@ -8521,7 +10237,7 @@
           </a:bodyPr>
           <a:lstStyle/>
           <a:p>
-            <a:endParaRPr lang="fr-FR" u="none">
+            <a:endParaRPr lang="fr-FR" u="none" dirty="0">
               <a:latin typeface="Trebuchet MS" pitchFamily="34" charset="0"/>
             </a:endParaRPr>
           </a:p>
@@ -8568,7 +10284,7 @@
           <a:bodyPr wrap="none" anchor="ctr"/>
           <a:lstStyle/>
           <a:p>
-            <a:endParaRPr lang="fr-CH"/>
+            <a:endParaRPr lang="fr-CH" dirty="0"/>
           </a:p>
         </p:txBody>
       </p:sp>
@@ -8613,7 +10329,7 @@
           <a:bodyPr wrap="none" anchor="ctr"/>
           <a:lstStyle/>
           <a:p>
-            <a:endParaRPr lang="fr-CH"/>
+            <a:endParaRPr lang="fr-CH" dirty="0"/>
           </a:p>
         </p:txBody>
       </p:sp>
@@ -8650,7 +10366,7 @@
               <a:t>11</a:t>
             </a:fld>
             <a:r>
-              <a:rPr lang="fr-FR" smtClean="0">
+              <a:rPr lang="fr-FR" dirty="0" smtClean="0">
                 <a:solidFill>
                   <a:schemeClr val="tx1">
                     <a:lumMod val="65000"/>
@@ -8735,7 +10451,7 @@
           <a:lstStyle/>
           <a:p>
             <a:r>
-              <a:rPr lang="fr-FR" smtClean="0">
+              <a:rPr lang="fr-FR" dirty="0" smtClean="0">
                 <a:solidFill>
                   <a:schemeClr val="tx1">
                     <a:lumMod val="65000"/>
@@ -8745,7 +10461,7 @@
               </a:rPr>
               <a:t>ADO - PPZ - LFH</a:t>
             </a:r>
-            <a:endParaRPr lang="fr-FR">
+            <a:endParaRPr lang="fr-FR" dirty="0">
               <a:solidFill>
                 <a:schemeClr val="tx1">
                   <a:lumMod val="65000"/>
@@ -9268,7 +10984,7 @@
           <a:bodyPr wrap="none" anchor="ctr"/>
           <a:lstStyle/>
           <a:p>
-            <a:endParaRPr lang="fr-CH"/>
+            <a:endParaRPr lang="fr-CH" dirty="0"/>
           </a:p>
         </p:txBody>
       </p:sp>
@@ -9316,7 +11032,7 @@
                 </a:effectLst>
                 <a:latin typeface="Trebuchet MS" pitchFamily="34" charset="0"/>
               </a:rPr>
-              <a:t>DEMONSTRATION [AURELIEN]</a:t>
+              <a:t>DEMONSTRATION</a:t>
             </a:r>
             <a:endParaRPr lang="fr-FR" sz="2000" b="1" u="none" dirty="0">
               <a:solidFill>
@@ -9363,7 +11079,7 @@
           </a:bodyPr>
           <a:lstStyle/>
           <a:p>
-            <a:endParaRPr lang="fr-FR" u="none">
+            <a:endParaRPr lang="fr-FR" u="none" dirty="0">
               <a:latin typeface="Trebuchet MS" pitchFamily="34" charset="0"/>
             </a:endParaRPr>
           </a:p>
@@ -9410,7 +11126,7 @@
           <a:bodyPr wrap="none" anchor="ctr"/>
           <a:lstStyle/>
           <a:p>
-            <a:endParaRPr lang="fr-CH"/>
+            <a:endParaRPr lang="fr-CH" dirty="0"/>
           </a:p>
         </p:txBody>
       </p:sp>
@@ -9455,7 +11171,7 @@
           <a:bodyPr wrap="none" anchor="ctr"/>
           <a:lstStyle/>
           <a:p>
-            <a:endParaRPr lang="fr-CH"/>
+            <a:endParaRPr lang="fr-CH" dirty="0"/>
           </a:p>
         </p:txBody>
       </p:sp>
@@ -9500,7 +11216,7 @@
                   </a:schemeClr>
                 </a:solidFill>
               </a:rPr>
-              <a:t>/11</a:t>
+              <a:t>/13</a:t>
             </a:r>
             <a:endParaRPr lang="fr-FR" dirty="0">
               <a:solidFill>
@@ -9577,7 +11293,7 @@
           <a:lstStyle/>
           <a:p>
             <a:r>
-              <a:rPr lang="fr-FR" smtClean="0">
+              <a:rPr lang="fr-FR" dirty="0" smtClean="0">
                 <a:solidFill>
                   <a:schemeClr val="tx1">
                     <a:lumMod val="65000"/>
@@ -9587,7 +11303,7 @@
               </a:rPr>
               <a:t>ADO - PPZ - LFH</a:t>
             </a:r>
-            <a:endParaRPr lang="fr-FR">
+            <a:endParaRPr lang="fr-FR" dirty="0">
               <a:solidFill>
                 <a:schemeClr val="tx1">
                   <a:lumMod val="65000"/>
@@ -9699,7 +11415,7 @@
           <a:bodyPr wrap="none" anchor="ctr"/>
           <a:lstStyle/>
           <a:p>
-            <a:endParaRPr lang="fr-CH"/>
+            <a:endParaRPr lang="fr-CH" dirty="0"/>
           </a:p>
         </p:txBody>
       </p:sp>
@@ -9736,7 +11452,7 @@
           <a:p>
             <a:pPr algn="ctr"/>
             <a:r>
-              <a:rPr lang="fr-CH" sz="2000" b="1" u="none">
+              <a:rPr lang="fr-CH" sz="2000" b="1" u="none" dirty="0">
                 <a:solidFill>
                   <a:schemeClr val="bg1"/>
                 </a:solidFill>
@@ -9749,7 +11465,7 @@
               </a:rPr>
               <a:t>QUESTIONS ?</a:t>
             </a:r>
-            <a:endParaRPr lang="fr-FR" sz="2000" b="1" u="none">
+            <a:endParaRPr lang="fr-FR" sz="2000" b="1" u="none" dirty="0">
               <a:solidFill>
                 <a:schemeClr val="bg1"/>
               </a:solidFill>
@@ -9804,7 +11520,7 @@
           <a:bodyPr wrap="none" anchor="ctr"/>
           <a:lstStyle/>
           <a:p>
-            <a:endParaRPr lang="fr-CH"/>
+            <a:endParaRPr lang="fr-CH" dirty="0"/>
           </a:p>
         </p:txBody>
       </p:sp>
@@ -9849,7 +11565,7 @@
           <a:bodyPr wrap="none" anchor="ctr"/>
           <a:lstStyle/>
           <a:p>
-            <a:endParaRPr lang="fr-CH"/>
+            <a:endParaRPr lang="fr-CH" dirty="0"/>
           </a:p>
         </p:txBody>
       </p:sp>
@@ -9901,7 +11617,7 @@
             <a:lstStyle/>
             <a:p>
               <a:r>
-                <a:rPr lang="fr-CH" sz="4000" b="1" u="none">
+                <a:rPr lang="fr-CH" sz="4000" b="1" u="none" dirty="0">
                   <a:solidFill>
                     <a:srgbClr val="5F5F5F"/>
                   </a:solidFill>
@@ -9914,7 +11630,7 @@
                 </a:rPr>
                 <a:t>?</a:t>
               </a:r>
-              <a:endParaRPr lang="fr-FR" sz="4000" b="1" u="none">
+              <a:endParaRPr lang="fr-FR" sz="4000" b="1" u="none" dirty="0">
                 <a:solidFill>
                   <a:srgbClr val="5F5F5F"/>
                 </a:solidFill>
@@ -9960,7 +11676,7 @@
             <a:lstStyle/>
             <a:p>
               <a:r>
-                <a:rPr lang="fr-CH" sz="4400" b="1" u="none">
+                <a:rPr lang="fr-CH" sz="4400" b="1" u="none" dirty="0">
                   <a:solidFill>
                     <a:srgbClr val="5F5F5F"/>
                   </a:solidFill>
@@ -9973,7 +11689,7 @@
                 </a:rPr>
                 <a:t>?</a:t>
               </a:r>
-              <a:endParaRPr lang="fr-FR" sz="4400" b="1" u="none">
+              <a:endParaRPr lang="fr-FR" sz="4400" b="1" u="none" dirty="0">
                 <a:solidFill>
                   <a:srgbClr val="5F5F5F"/>
                 </a:solidFill>
@@ -10019,7 +11735,7 @@
             <a:lstStyle/>
             <a:p>
               <a:r>
-                <a:rPr lang="fr-CH" b="1" u="none">
+                <a:rPr lang="fr-CH" b="1" u="none" dirty="0">
                   <a:solidFill>
                     <a:srgbClr val="5F5F5F"/>
                   </a:solidFill>
@@ -10032,7 +11748,7 @@
                 </a:rPr>
                 <a:t>?</a:t>
               </a:r>
-              <a:endParaRPr lang="fr-FR" b="1" u="none">
+              <a:endParaRPr lang="fr-FR" b="1" u="none" dirty="0">
                 <a:solidFill>
                   <a:srgbClr val="5F5F5F"/>
                 </a:solidFill>
@@ -10196,7 +11912,7 @@
             <a:lstStyle/>
             <a:p>
               <a:r>
-                <a:rPr lang="fr-CH" sz="8000" b="1" u="none">
+                <a:rPr lang="fr-CH" sz="8000" b="1" u="none" dirty="0">
                   <a:solidFill>
                     <a:srgbClr val="5F5F5F"/>
                   </a:solidFill>
@@ -10209,7 +11925,7 @@
                 </a:rPr>
                 <a:t>?</a:t>
               </a:r>
-              <a:endParaRPr lang="fr-FR" sz="8000" b="1" u="none">
+              <a:endParaRPr lang="fr-FR" sz="8000" b="1" u="none" dirty="0">
                 <a:solidFill>
                   <a:srgbClr val="5F5F5F"/>
                 </a:solidFill>
@@ -10314,7 +12030,7 @@
             <a:lstStyle/>
             <a:p>
               <a:r>
-                <a:rPr lang="fr-CH" sz="5400" b="1" u="none">
+                <a:rPr lang="fr-CH" sz="5400" b="1" u="none" dirty="0">
                   <a:solidFill>
                     <a:srgbClr val="5F5F5F"/>
                   </a:solidFill>
@@ -10327,7 +12043,7 @@
                 </a:rPr>
                 <a:t>?</a:t>
               </a:r>
-              <a:endParaRPr lang="fr-FR" sz="5400" b="1" u="none">
+              <a:endParaRPr lang="fr-FR" sz="5400" b="1" u="none" dirty="0">
                 <a:solidFill>
                   <a:srgbClr val="5F5F5F"/>
                 </a:solidFill>
@@ -10373,7 +12089,7 @@
             <a:lstStyle/>
             <a:p>
               <a:r>
-                <a:rPr lang="fr-CH" b="1" u="none">
+                <a:rPr lang="fr-CH" b="1" u="none" dirty="0">
                   <a:solidFill>
                     <a:srgbClr val="5F5F5F"/>
                   </a:solidFill>
@@ -10386,7 +12102,7 @@
                 </a:rPr>
                 <a:t>?</a:t>
               </a:r>
-              <a:endParaRPr lang="fr-FR" b="1" u="none">
+              <a:endParaRPr lang="fr-FR" b="1" u="none" dirty="0">
                 <a:solidFill>
                   <a:srgbClr val="5F5F5F"/>
                 </a:solidFill>
@@ -10432,7 +12148,7 @@
             <a:lstStyle/>
             <a:p>
               <a:r>
-                <a:rPr lang="fr-CH" sz="4000" b="1" u="none">
+                <a:rPr lang="fr-CH" sz="4000" b="1" u="none" dirty="0">
                   <a:solidFill>
                     <a:srgbClr val="5F5F5F"/>
                   </a:solidFill>
@@ -10445,7 +12161,7 @@
                 </a:rPr>
                 <a:t>?</a:t>
               </a:r>
-              <a:endParaRPr lang="fr-FR" sz="4000" b="1" u="none">
+              <a:endParaRPr lang="fr-FR" sz="4000" b="1" u="none" dirty="0">
                 <a:solidFill>
                   <a:srgbClr val="5F5F5F"/>
                 </a:solidFill>
@@ -10491,7 +12207,7 @@
             <a:lstStyle/>
             <a:p>
               <a:r>
-                <a:rPr lang="fr-CH" b="1" u="none">
+                <a:rPr lang="fr-CH" b="1" u="none" dirty="0">
                   <a:solidFill>
                     <a:srgbClr val="5F5F5F"/>
                   </a:solidFill>
@@ -10504,7 +12220,7 @@
                 </a:rPr>
                 <a:t>?</a:t>
               </a:r>
-              <a:endParaRPr lang="fr-FR" b="1" u="none">
+              <a:endParaRPr lang="fr-FR" b="1" u="none" dirty="0">
                 <a:solidFill>
                   <a:srgbClr val="5F5F5F"/>
                 </a:solidFill>
@@ -10723,7 +12439,7 @@
               <a:pPr/>
               <a:t>19.01.2010</a:t>
             </a:fld>
-            <a:endParaRPr lang="fr-FR">
+            <a:endParaRPr lang="fr-FR" dirty="0">
               <a:solidFill>
                 <a:schemeClr val="tx1">
                   <a:lumMod val="65000"/>
@@ -10755,7 +12471,7 @@
           <a:lstStyle/>
           <a:p>
             <a:r>
-              <a:rPr lang="fr-FR" smtClean="0">
+              <a:rPr lang="fr-FR" dirty="0" smtClean="0">
                 <a:solidFill>
                   <a:schemeClr val="tx1">
                     <a:lumMod val="65000"/>
@@ -10765,7 +12481,7 @@
               </a:rPr>
               <a:t>ADO - PPZ - LFH</a:t>
             </a:r>
-            <a:endParaRPr lang="fr-FR">
+            <a:endParaRPr lang="fr-FR" dirty="0">
               <a:solidFill>
                 <a:schemeClr val="tx1">
                   <a:lumMod val="65000"/>
@@ -14085,7 +15801,15 @@
             </a:pPr>
             <a:r>
               <a:rPr lang="fr-CH" u="none" dirty="0" smtClean="0"/>
-              <a:t> Très largement rependu dans l’industrie et toutes les applications incluant des </a:t>
+              <a:t> Très largement </a:t>
+            </a:r>
+            <a:r>
+              <a:rPr lang="fr-CH" u="none" dirty="0" smtClean="0"/>
+              <a:t>répandu dans </a:t>
+            </a:r>
+            <a:r>
+              <a:rPr lang="fr-CH" u="none" dirty="0" smtClean="0"/>
+              <a:t>l’industrie et toutes les applications incluant des </a:t>
             </a:r>
             <a:r>
               <a:rPr lang="fr-CH" b="1" u="none" dirty="0" smtClean="0"/>
@@ -18239,6 +19963,13 @@
   <p:transition>
     <p:fade/>
   </p:transition>
+  <p:timing>
+    <p:tnLst>
+      <p:par>
+        <p:cTn id="1" dur="indefinite" restart="never" nodeType="tmRoot"/>
+      </p:par>
+    </p:tnLst>
+  </p:timing>
 </p:sld>
 </file>
 
@@ -18575,7 +20306,21 @@
                 </a:effectLst>
                 <a:latin typeface="Trebuchet MS" pitchFamily="34" charset="0"/>
               </a:rPr>
-              <a:t>MODELE MVC [AURELIEN]</a:t>
+              <a:t>MODELE </a:t>
+            </a:r>
+            <a:r>
+              <a:rPr lang="fr-FR" sz="2000" b="1" u="none" dirty="0" smtClean="0">
+                <a:solidFill>
+                  <a:schemeClr val="bg1"/>
+                </a:solidFill>
+                <a:effectLst>
+                  <a:outerShdw blurRad="38100" dist="38100" dir="2700000" algn="tl">
+                    <a:srgbClr val="C0C0C0"/>
+                  </a:outerShdw>
+                </a:effectLst>
+                <a:latin typeface="Trebuchet MS" pitchFamily="34" charset="0"/>
+              </a:rPr>
+              <a:t>MVC</a:t>
             </a:r>
             <a:endParaRPr lang="fr-FR" sz="2000" b="1" u="none" dirty="0">
               <a:solidFill>
@@ -18591,6 +20336,38 @@
           </a:p>
         </p:txBody>
       </p:sp>
+      <p:pic>
+        <p:nvPicPr>
+          <p:cNvPr id="1027" name="Picture 3"/>
+          <p:cNvPicPr>
+            <a:picLocks noChangeAspect="1" noChangeArrowheads="1"/>
+          </p:cNvPicPr>
+          <p:nvPr/>
+        </p:nvPicPr>
+        <p:blipFill>
+          <a:blip r:embed="rId2" cstate="print"/>
+          <a:srcRect/>
+          <a:stretch>
+            <a:fillRect/>
+          </a:stretch>
+        </p:blipFill>
+        <p:spPr bwMode="auto">
+          <a:xfrm>
+            <a:off x="153927" y="2653930"/>
+            <a:ext cx="8686800" cy="2272103"/>
+          </a:xfrm>
+          <a:prstGeom prst="rect">
+            <a:avLst/>
+          </a:prstGeom>
+          <a:noFill/>
+          <a:ln w="9525">
+            <a:noFill/>
+            <a:miter lim="800000"/>
+            <a:headEnd/>
+            <a:tailEnd/>
+          </a:ln>
+        </p:spPr>
+      </p:pic>
     </p:spTree>
   </p:cSld>
   <p:clrMapOvr>

</xml_diff>